<commit_message>
Intro and mob 1 notes complete
</commit_message>
<xml_diff>
--- a/a-mob-mentality.pptx
+++ b/a-mob-mentality.pptx
@@ -1516,7 +1516,7 @@
           <a:p>
             <a:r>
               <a:rPr lang="en-US" dirty="0"/>
-              <a:t>There may or may not be actual unicorns. Certainly I would not rule out unicorns being able to contribute to a mob.</a:t>
+              <a:t>There may or may not be actual unicorns. But I wouldn’t rule out unicorns being able to contribute to a mob.</a:t>
             </a:r>
           </a:p>
         </p:txBody>
@@ -2074,10 +2074,9 @@
           </a:p>
           <a:p>
             <a:r>
-              <a:rPr lang="en-US"/>
+              <a:rPr lang="en-US" dirty="0"/>
               <a:t>and stronger</a:t>
             </a:r>
-            <a:endParaRPr lang="en-US" dirty="0"/>
           </a:p>
         </p:txBody>
       </p:sp>
@@ -2108,6 +2107,788 @@
     <p:extLst>
       <p:ext uri="{BB962C8B-B14F-4D97-AF65-F5344CB8AC3E}">
         <p14:creationId xmlns:p14="http://schemas.microsoft.com/office/powerpoint/2010/main" val="1554729048"/>
+      </p:ext>
+    </p:extLst>
+  </p:cSld>
+  <p:clrMapOvr>
+    <a:masterClrMapping/>
+  </p:clrMapOvr>
+</p:notes>
+</file>
+
+<file path=ppt/notesSlides/notesSlide21.xml><?xml version="1.0" encoding="utf-8"?>
+<p:notes xmlns:a="http://schemas.openxmlformats.org/drawingml/2006/main" xmlns:r="http://schemas.openxmlformats.org/officeDocument/2006/relationships" xmlns:p="http://schemas.openxmlformats.org/presentationml/2006/main">
+  <p:cSld>
+    <p:spTree>
+      <p:nvGrpSpPr>
+        <p:cNvPr id="1" name=""/>
+        <p:cNvGrpSpPr/>
+        <p:nvPr/>
+      </p:nvGrpSpPr>
+      <p:grpSpPr>
+        <a:xfrm>
+          <a:off x="0" y="0"/>
+          <a:ext cx="0" cy="0"/>
+          <a:chOff x="0" y="0"/>
+          <a:chExt cx="0" cy="0"/>
+        </a:xfrm>
+      </p:grpSpPr>
+      <p:sp>
+        <p:nvSpPr>
+          <p:cNvPr id="2" name="Slide Image Placeholder 1"/>
+          <p:cNvSpPr>
+            <a:spLocks noGrp="1" noRot="1" noChangeAspect="1"/>
+          </p:cNvSpPr>
+          <p:nvPr>
+            <p:ph type="sldImg"/>
+          </p:nvPr>
+        </p:nvSpPr>
+        <p:spPr/>
+      </p:sp>
+      <p:sp>
+        <p:nvSpPr>
+          <p:cNvPr id="3" name="Notes Placeholder 2"/>
+          <p:cNvSpPr>
+            <a:spLocks noGrp="1"/>
+          </p:cNvSpPr>
+          <p:nvPr>
+            <p:ph type="body" idx="1"/>
+          </p:nvPr>
+        </p:nvSpPr>
+        <p:spPr/>
+        <p:txBody>
+          <a:bodyPr/>
+          <a:lstStyle/>
+          <a:p>
+            <a:r>
+              <a:rPr lang="en-GB" dirty="0"/>
+              <a:t>code quality - all eyes on every line, more chance of spotting better ways</a:t>
+            </a:r>
+          </a:p>
+          <a:p>
+            <a:endParaRPr lang="en-GB" dirty="0"/>
+          </a:p>
+          <a:p>
+            <a:r>
+              <a:rPr lang="en-GB" dirty="0"/>
+              <a:t>everyone's context of domain, tech, techniques - the wisdom of the crowd etc</a:t>
+            </a:r>
+            <a:endParaRPr lang="en-US" dirty="0"/>
+          </a:p>
+        </p:txBody>
+      </p:sp>
+      <p:sp>
+        <p:nvSpPr>
+          <p:cNvPr id="4" name="Slide Number Placeholder 3"/>
+          <p:cNvSpPr>
+            <a:spLocks noGrp="1"/>
+          </p:cNvSpPr>
+          <p:nvPr>
+            <p:ph type="sldNum" sz="quarter" idx="5"/>
+          </p:nvPr>
+        </p:nvSpPr>
+        <p:spPr/>
+        <p:txBody>
+          <a:bodyPr/>
+          <a:lstStyle/>
+          <a:p>
+            <a:fld id="{B99E8012-7AEC-4AAD-B52C-DF7E1601EEFE}" type="slidenum">
+              <a:rPr lang="en-GB" smtClean="0"/>
+              <a:t>21</a:t>
+            </a:fld>
+            <a:endParaRPr lang="en-GB"/>
+          </a:p>
+        </p:txBody>
+      </p:sp>
+    </p:spTree>
+    <p:extLst>
+      <p:ext uri="{BB962C8B-B14F-4D97-AF65-F5344CB8AC3E}">
+        <p14:creationId xmlns:p14="http://schemas.microsoft.com/office/powerpoint/2010/main" val="27252846"/>
+      </p:ext>
+    </p:extLst>
+  </p:cSld>
+  <p:clrMapOvr>
+    <a:masterClrMapping/>
+  </p:clrMapOvr>
+</p:notes>
+</file>
+
+<file path=ppt/notesSlides/notesSlide22.xml><?xml version="1.0" encoding="utf-8"?>
+<p:notes xmlns:a="http://schemas.openxmlformats.org/drawingml/2006/main" xmlns:r="http://schemas.openxmlformats.org/officeDocument/2006/relationships" xmlns:p="http://schemas.openxmlformats.org/presentationml/2006/main">
+  <p:cSld>
+    <p:spTree>
+      <p:nvGrpSpPr>
+        <p:cNvPr id="1" name=""/>
+        <p:cNvGrpSpPr/>
+        <p:nvPr/>
+      </p:nvGrpSpPr>
+      <p:grpSpPr>
+        <a:xfrm>
+          <a:off x="0" y="0"/>
+          <a:ext cx="0" cy="0"/>
+          <a:chOff x="0" y="0"/>
+          <a:chExt cx="0" cy="0"/>
+        </a:xfrm>
+      </p:grpSpPr>
+      <p:sp>
+        <p:nvSpPr>
+          <p:cNvPr id="2" name="Slide Image Placeholder 1"/>
+          <p:cNvSpPr>
+            <a:spLocks noGrp="1" noRot="1" noChangeAspect="1"/>
+          </p:cNvSpPr>
+          <p:nvPr>
+            <p:ph type="sldImg"/>
+          </p:nvPr>
+        </p:nvSpPr>
+        <p:spPr/>
+      </p:sp>
+      <p:sp>
+        <p:nvSpPr>
+          <p:cNvPr id="3" name="Notes Placeholder 2"/>
+          <p:cNvSpPr>
+            <a:spLocks noGrp="1"/>
+          </p:cNvSpPr>
+          <p:nvPr>
+            <p:ph type="body" idx="1"/>
+          </p:nvPr>
+        </p:nvSpPr>
+        <p:spPr/>
+        <p:txBody>
+          <a:bodyPr/>
+          <a:lstStyle/>
+          <a:p>
+            <a:r>
+              <a:rPr lang="en-GB" dirty="0"/>
+              <a:t>Mobbing is a way of shortening feedback loops</a:t>
+            </a:r>
+          </a:p>
+          <a:p>
+            <a:endParaRPr lang="en-GB" dirty="0"/>
+          </a:p>
+          <a:p>
+            <a:r>
+              <a:rPr lang="en-GB" dirty="0"/>
+              <a:t>Decision making in real time instead of meetings</a:t>
+            </a:r>
+          </a:p>
+          <a:p>
+            <a:r>
+              <a:rPr lang="en-GB" dirty="0"/>
+              <a:t>Code reviews in real time instead of a bottleneck</a:t>
+            </a:r>
+            <a:endParaRPr lang="en-US" dirty="0"/>
+          </a:p>
+        </p:txBody>
+      </p:sp>
+      <p:sp>
+        <p:nvSpPr>
+          <p:cNvPr id="4" name="Slide Number Placeholder 3"/>
+          <p:cNvSpPr>
+            <a:spLocks noGrp="1"/>
+          </p:cNvSpPr>
+          <p:nvPr>
+            <p:ph type="sldNum" sz="quarter" idx="5"/>
+          </p:nvPr>
+        </p:nvSpPr>
+        <p:spPr/>
+        <p:txBody>
+          <a:bodyPr/>
+          <a:lstStyle/>
+          <a:p>
+            <a:fld id="{B99E8012-7AEC-4AAD-B52C-DF7E1601EEFE}" type="slidenum">
+              <a:rPr lang="en-GB" smtClean="0"/>
+              <a:t>22</a:t>
+            </a:fld>
+            <a:endParaRPr lang="en-GB"/>
+          </a:p>
+        </p:txBody>
+      </p:sp>
+    </p:spTree>
+    <p:extLst>
+      <p:ext uri="{BB962C8B-B14F-4D97-AF65-F5344CB8AC3E}">
+        <p14:creationId xmlns:p14="http://schemas.microsoft.com/office/powerpoint/2010/main" val="2601500182"/>
+      </p:ext>
+    </p:extLst>
+  </p:cSld>
+  <p:clrMapOvr>
+    <a:masterClrMapping/>
+  </p:clrMapOvr>
+</p:notes>
+</file>
+
+<file path=ppt/notesSlides/notesSlide23.xml><?xml version="1.0" encoding="utf-8"?>
+<p:notes xmlns:a="http://schemas.openxmlformats.org/drawingml/2006/main" xmlns:r="http://schemas.openxmlformats.org/officeDocument/2006/relationships" xmlns:p="http://schemas.openxmlformats.org/presentationml/2006/main">
+  <p:cSld>
+    <p:spTree>
+      <p:nvGrpSpPr>
+        <p:cNvPr id="1" name=""/>
+        <p:cNvGrpSpPr/>
+        <p:nvPr/>
+      </p:nvGrpSpPr>
+      <p:grpSpPr>
+        <a:xfrm>
+          <a:off x="0" y="0"/>
+          <a:ext cx="0" cy="0"/>
+          <a:chOff x="0" y="0"/>
+          <a:chExt cx="0" cy="0"/>
+        </a:xfrm>
+      </p:grpSpPr>
+      <p:sp>
+        <p:nvSpPr>
+          <p:cNvPr id="2" name="Slide Image Placeholder 1"/>
+          <p:cNvSpPr>
+            <a:spLocks noGrp="1" noRot="1" noChangeAspect="1"/>
+          </p:cNvSpPr>
+          <p:nvPr>
+            <p:ph type="sldImg"/>
+          </p:nvPr>
+        </p:nvSpPr>
+        <p:spPr/>
+      </p:sp>
+      <p:sp>
+        <p:nvSpPr>
+          <p:cNvPr id="3" name="Notes Placeholder 2"/>
+          <p:cNvSpPr>
+            <a:spLocks noGrp="1"/>
+          </p:cNvSpPr>
+          <p:nvPr>
+            <p:ph type="body" idx="1"/>
+          </p:nvPr>
+        </p:nvSpPr>
+        <p:spPr/>
+        <p:txBody>
+          <a:bodyPr/>
+          <a:lstStyle/>
+          <a:p>
+            <a:r>
+              <a:rPr lang="en-US" dirty="0"/>
+              <a:t>Bus factor improved, everyone has context all the time</a:t>
+            </a:r>
+          </a:p>
+          <a:p>
+            <a:r>
+              <a:rPr lang="en-US" dirty="0"/>
+              <a:t>Less impact when people are off</a:t>
+            </a:r>
+          </a:p>
+          <a:p>
+            <a:endParaRPr lang="en-US" dirty="0"/>
+          </a:p>
+          <a:p>
+            <a:r>
+              <a:rPr lang="en-US" dirty="0"/>
+              <a:t>Team is new but we get to know each other quicker by working together so much</a:t>
+            </a:r>
+          </a:p>
+        </p:txBody>
+      </p:sp>
+      <p:sp>
+        <p:nvSpPr>
+          <p:cNvPr id="4" name="Slide Number Placeholder 3"/>
+          <p:cNvSpPr>
+            <a:spLocks noGrp="1"/>
+          </p:cNvSpPr>
+          <p:nvPr>
+            <p:ph type="sldNum" sz="quarter" idx="5"/>
+          </p:nvPr>
+        </p:nvSpPr>
+        <p:spPr/>
+        <p:txBody>
+          <a:bodyPr/>
+          <a:lstStyle/>
+          <a:p>
+            <a:fld id="{B99E8012-7AEC-4AAD-B52C-DF7E1601EEFE}" type="slidenum">
+              <a:rPr lang="en-GB" smtClean="0"/>
+              <a:t>23</a:t>
+            </a:fld>
+            <a:endParaRPr lang="en-GB"/>
+          </a:p>
+        </p:txBody>
+      </p:sp>
+    </p:spTree>
+    <p:extLst>
+      <p:ext uri="{BB962C8B-B14F-4D97-AF65-F5344CB8AC3E}">
+        <p14:creationId xmlns:p14="http://schemas.microsoft.com/office/powerpoint/2010/main" val="620386410"/>
+      </p:ext>
+    </p:extLst>
+  </p:cSld>
+  <p:clrMapOvr>
+    <a:masterClrMapping/>
+  </p:clrMapOvr>
+</p:notes>
+</file>
+
+<file path=ppt/notesSlides/notesSlide24.xml><?xml version="1.0" encoding="utf-8"?>
+<p:notes xmlns:a="http://schemas.openxmlformats.org/drawingml/2006/main" xmlns:r="http://schemas.openxmlformats.org/officeDocument/2006/relationships" xmlns:p="http://schemas.openxmlformats.org/presentationml/2006/main">
+  <p:cSld>
+    <p:spTree>
+      <p:nvGrpSpPr>
+        <p:cNvPr id="1" name=""/>
+        <p:cNvGrpSpPr/>
+        <p:nvPr/>
+      </p:nvGrpSpPr>
+      <p:grpSpPr>
+        <a:xfrm>
+          <a:off x="0" y="0"/>
+          <a:ext cx="0" cy="0"/>
+          <a:chOff x="0" y="0"/>
+          <a:chExt cx="0" cy="0"/>
+        </a:xfrm>
+      </p:grpSpPr>
+      <p:sp>
+        <p:nvSpPr>
+          <p:cNvPr id="2" name="Slide Image Placeholder 1"/>
+          <p:cNvSpPr>
+            <a:spLocks noGrp="1" noRot="1" noChangeAspect="1"/>
+          </p:cNvSpPr>
+          <p:nvPr>
+            <p:ph type="sldImg"/>
+          </p:nvPr>
+        </p:nvSpPr>
+        <p:spPr/>
+      </p:sp>
+      <p:sp>
+        <p:nvSpPr>
+          <p:cNvPr id="3" name="Notes Placeholder 2"/>
+          <p:cNvSpPr>
+            <a:spLocks noGrp="1"/>
+          </p:cNvSpPr>
+          <p:nvPr>
+            <p:ph type="body" idx="1"/>
+          </p:nvPr>
+        </p:nvSpPr>
+        <p:spPr/>
+        <p:txBody>
+          <a:bodyPr/>
+          <a:lstStyle/>
+          <a:p>
+            <a:r>
+              <a:rPr lang="en-US" dirty="0"/>
+              <a:t>But we started to find there were some tricky aspects about mobbing</a:t>
+            </a:r>
+          </a:p>
+        </p:txBody>
+      </p:sp>
+      <p:sp>
+        <p:nvSpPr>
+          <p:cNvPr id="4" name="Slide Number Placeholder 3"/>
+          <p:cNvSpPr>
+            <a:spLocks noGrp="1"/>
+          </p:cNvSpPr>
+          <p:nvPr>
+            <p:ph type="sldNum" sz="quarter" idx="5"/>
+          </p:nvPr>
+        </p:nvSpPr>
+        <p:spPr/>
+        <p:txBody>
+          <a:bodyPr/>
+          <a:lstStyle/>
+          <a:p>
+            <a:fld id="{B99E8012-7AEC-4AAD-B52C-DF7E1601EEFE}" type="slidenum">
+              <a:rPr lang="en-GB" smtClean="0"/>
+              <a:t>24</a:t>
+            </a:fld>
+            <a:endParaRPr lang="en-GB"/>
+          </a:p>
+        </p:txBody>
+      </p:sp>
+    </p:spTree>
+    <p:extLst>
+      <p:ext uri="{BB962C8B-B14F-4D97-AF65-F5344CB8AC3E}">
+        <p14:creationId xmlns:p14="http://schemas.microsoft.com/office/powerpoint/2010/main" val="3358445165"/>
+      </p:ext>
+    </p:extLst>
+  </p:cSld>
+  <p:clrMapOvr>
+    <a:masterClrMapping/>
+  </p:clrMapOvr>
+</p:notes>
+</file>
+
+<file path=ppt/notesSlides/notesSlide25.xml><?xml version="1.0" encoding="utf-8"?>
+<p:notes xmlns:a="http://schemas.openxmlformats.org/drawingml/2006/main" xmlns:r="http://schemas.openxmlformats.org/officeDocument/2006/relationships" xmlns:p="http://schemas.openxmlformats.org/presentationml/2006/main">
+  <p:cSld>
+    <p:spTree>
+      <p:nvGrpSpPr>
+        <p:cNvPr id="1" name=""/>
+        <p:cNvGrpSpPr/>
+        <p:nvPr/>
+      </p:nvGrpSpPr>
+      <p:grpSpPr>
+        <a:xfrm>
+          <a:off x="0" y="0"/>
+          <a:ext cx="0" cy="0"/>
+          <a:chOff x="0" y="0"/>
+          <a:chExt cx="0" cy="0"/>
+        </a:xfrm>
+      </p:grpSpPr>
+      <p:sp>
+        <p:nvSpPr>
+          <p:cNvPr id="2" name="Slide Image Placeholder 1"/>
+          <p:cNvSpPr>
+            <a:spLocks noGrp="1" noRot="1" noChangeAspect="1"/>
+          </p:cNvSpPr>
+          <p:nvPr>
+            <p:ph type="sldImg"/>
+          </p:nvPr>
+        </p:nvSpPr>
+        <p:spPr/>
+      </p:sp>
+      <p:sp>
+        <p:nvSpPr>
+          <p:cNvPr id="3" name="Notes Placeholder 2"/>
+          <p:cNvSpPr>
+            <a:spLocks noGrp="1"/>
+          </p:cNvSpPr>
+          <p:nvPr>
+            <p:ph type="body" idx="1"/>
+          </p:nvPr>
+        </p:nvSpPr>
+        <p:spPr/>
+        <p:txBody>
+          <a:bodyPr/>
+          <a:lstStyle/>
+          <a:p>
+            <a:r>
+              <a:rPr lang="en-GB" dirty="0"/>
+              <a:t>Mobbing is intense</a:t>
+            </a:r>
+          </a:p>
+          <a:p>
+            <a:endParaRPr lang="en-GB" dirty="0"/>
+          </a:p>
+          <a:p>
+            <a:r>
+              <a:rPr lang="en-GB" dirty="0"/>
+              <a:t>Conversation with multiple people instead of just your pair</a:t>
+            </a:r>
+          </a:p>
+          <a:p>
+            <a:r>
+              <a:rPr lang="en-GB" dirty="0"/>
+              <a:t>Going on for too long, we’d get exhausted</a:t>
+            </a:r>
+          </a:p>
+          <a:p>
+            <a:endParaRPr lang="en-GB" dirty="0"/>
+          </a:p>
+          <a:p>
+            <a:r>
+              <a:rPr lang="en-GB" dirty="0"/>
+              <a:t>So we started to take regular breaks</a:t>
+            </a:r>
+          </a:p>
+          <a:p>
+            <a:r>
+              <a:rPr lang="en-GB" dirty="0"/>
+              <a:t>And keep sessions short, say 30 minutes.</a:t>
+            </a:r>
+            <a:endParaRPr lang="en-US" dirty="0"/>
+          </a:p>
+        </p:txBody>
+      </p:sp>
+      <p:sp>
+        <p:nvSpPr>
+          <p:cNvPr id="4" name="Slide Number Placeholder 3"/>
+          <p:cNvSpPr>
+            <a:spLocks noGrp="1"/>
+          </p:cNvSpPr>
+          <p:nvPr>
+            <p:ph type="sldNum" sz="quarter" idx="5"/>
+          </p:nvPr>
+        </p:nvSpPr>
+        <p:spPr/>
+        <p:txBody>
+          <a:bodyPr/>
+          <a:lstStyle/>
+          <a:p>
+            <a:fld id="{B99E8012-7AEC-4AAD-B52C-DF7E1601EEFE}" type="slidenum">
+              <a:rPr lang="en-GB" smtClean="0"/>
+              <a:t>25</a:t>
+            </a:fld>
+            <a:endParaRPr lang="en-GB"/>
+          </a:p>
+        </p:txBody>
+      </p:sp>
+    </p:spTree>
+    <p:extLst>
+      <p:ext uri="{BB962C8B-B14F-4D97-AF65-F5344CB8AC3E}">
+        <p14:creationId xmlns:p14="http://schemas.microsoft.com/office/powerpoint/2010/main" val="1279656155"/>
+      </p:ext>
+    </p:extLst>
+  </p:cSld>
+  <p:clrMapOvr>
+    <a:masterClrMapping/>
+  </p:clrMapOvr>
+</p:notes>
+</file>
+
+<file path=ppt/notesSlides/notesSlide26.xml><?xml version="1.0" encoding="utf-8"?>
+<p:notes xmlns:a="http://schemas.openxmlformats.org/drawingml/2006/main" xmlns:r="http://schemas.openxmlformats.org/officeDocument/2006/relationships" xmlns:p="http://schemas.openxmlformats.org/presentationml/2006/main">
+  <p:cSld>
+    <p:spTree>
+      <p:nvGrpSpPr>
+        <p:cNvPr id="1" name=""/>
+        <p:cNvGrpSpPr/>
+        <p:nvPr/>
+      </p:nvGrpSpPr>
+      <p:grpSpPr>
+        <a:xfrm>
+          <a:off x="0" y="0"/>
+          <a:ext cx="0" cy="0"/>
+          <a:chOff x="0" y="0"/>
+          <a:chExt cx="0" cy="0"/>
+        </a:xfrm>
+      </p:grpSpPr>
+      <p:sp>
+        <p:nvSpPr>
+          <p:cNvPr id="2" name="Slide Image Placeholder 1"/>
+          <p:cNvSpPr>
+            <a:spLocks noGrp="1" noRot="1" noChangeAspect="1"/>
+          </p:cNvSpPr>
+          <p:nvPr>
+            <p:ph type="sldImg"/>
+          </p:nvPr>
+        </p:nvSpPr>
+        <p:spPr/>
+      </p:sp>
+      <p:sp>
+        <p:nvSpPr>
+          <p:cNvPr id="3" name="Notes Placeholder 2"/>
+          <p:cNvSpPr>
+            <a:spLocks noGrp="1"/>
+          </p:cNvSpPr>
+          <p:nvPr>
+            <p:ph type="body" idx="1"/>
+          </p:nvPr>
+        </p:nvSpPr>
+        <p:spPr/>
+        <p:txBody>
+          <a:bodyPr/>
+          <a:lstStyle/>
+          <a:p>
+            <a:r>
+              <a:rPr lang="en-US" dirty="0"/>
+              <a:t>Mobbing can be intimidating</a:t>
+            </a:r>
+          </a:p>
+          <a:p>
+            <a:endParaRPr lang="en-US" dirty="0"/>
+          </a:p>
+          <a:p>
+            <a:r>
+              <a:rPr lang="en-US" dirty="0"/>
+              <a:t>Imagine if you are new to a particular language, or framework</a:t>
+            </a:r>
+          </a:p>
+          <a:p>
+            <a:r>
+              <a:rPr lang="en-US" dirty="0"/>
+              <a:t>And you’re asked to code with the entire team watching</a:t>
+            </a:r>
+          </a:p>
+          <a:p>
+            <a:r>
+              <a:rPr lang="en-US" dirty="0"/>
+              <a:t>And the experienced people are saying “do this, do that, no like that”</a:t>
+            </a:r>
+          </a:p>
+          <a:p>
+            <a:endParaRPr lang="en-US" dirty="0"/>
+          </a:p>
+          <a:p>
+            <a:r>
+              <a:rPr lang="en-US" dirty="0"/>
+              <a:t>We don’t want people to feel stressed or nervous</a:t>
+            </a:r>
+          </a:p>
+          <a:p>
+            <a:r>
+              <a:rPr lang="en-US" dirty="0"/>
+              <a:t>We want people to be at ease so they do their best work</a:t>
+            </a:r>
+          </a:p>
+          <a:p>
+            <a:endParaRPr lang="en-US" dirty="0"/>
+          </a:p>
+          <a:p>
+            <a:r>
+              <a:rPr lang="en-US" dirty="0"/>
+              <a:t>We found it important to have psychological safety</a:t>
+            </a:r>
+          </a:p>
+          <a:p>
+            <a:r>
+              <a:rPr lang="en-US" dirty="0"/>
+              <a:t>To be kind with the driver</a:t>
+            </a:r>
+          </a:p>
+          <a:p>
+            <a:r>
+              <a:rPr lang="en-US" dirty="0"/>
+              <a:t>To be patient with the driver</a:t>
+            </a:r>
+          </a:p>
+          <a:p>
+            <a:r>
+              <a:rPr lang="en-US" dirty="0"/>
+              <a:t>Pairing well is a skill. This is even more important in a mob</a:t>
+            </a:r>
+          </a:p>
+        </p:txBody>
+      </p:sp>
+      <p:sp>
+        <p:nvSpPr>
+          <p:cNvPr id="4" name="Slide Number Placeholder 3"/>
+          <p:cNvSpPr>
+            <a:spLocks noGrp="1"/>
+          </p:cNvSpPr>
+          <p:nvPr>
+            <p:ph type="sldNum" sz="quarter" idx="5"/>
+          </p:nvPr>
+        </p:nvSpPr>
+        <p:spPr/>
+        <p:txBody>
+          <a:bodyPr/>
+          <a:lstStyle/>
+          <a:p>
+            <a:fld id="{B99E8012-7AEC-4AAD-B52C-DF7E1601EEFE}" type="slidenum">
+              <a:rPr lang="en-GB" smtClean="0"/>
+              <a:t>26</a:t>
+            </a:fld>
+            <a:endParaRPr lang="en-GB"/>
+          </a:p>
+        </p:txBody>
+      </p:sp>
+    </p:spTree>
+    <p:extLst>
+      <p:ext uri="{BB962C8B-B14F-4D97-AF65-F5344CB8AC3E}">
+        <p14:creationId xmlns:p14="http://schemas.microsoft.com/office/powerpoint/2010/main" val="514739828"/>
+      </p:ext>
+    </p:extLst>
+  </p:cSld>
+  <p:clrMapOvr>
+    <a:masterClrMapping/>
+  </p:clrMapOvr>
+</p:notes>
+</file>
+
+<file path=ppt/notesSlides/notesSlide27.xml><?xml version="1.0" encoding="utf-8"?>
+<p:notes xmlns:a="http://schemas.openxmlformats.org/drawingml/2006/main" xmlns:r="http://schemas.openxmlformats.org/officeDocument/2006/relationships" xmlns:p="http://schemas.openxmlformats.org/presentationml/2006/main">
+  <p:cSld>
+    <p:spTree>
+      <p:nvGrpSpPr>
+        <p:cNvPr id="1" name=""/>
+        <p:cNvGrpSpPr/>
+        <p:nvPr/>
+      </p:nvGrpSpPr>
+      <p:grpSpPr>
+        <a:xfrm>
+          <a:off x="0" y="0"/>
+          <a:ext cx="0" cy="0"/>
+          <a:chOff x="0" y="0"/>
+          <a:chExt cx="0" cy="0"/>
+        </a:xfrm>
+      </p:grpSpPr>
+      <p:sp>
+        <p:nvSpPr>
+          <p:cNvPr id="2" name="Slide Image Placeholder 1"/>
+          <p:cNvSpPr>
+            <a:spLocks noGrp="1" noRot="1" noChangeAspect="1"/>
+          </p:cNvSpPr>
+          <p:nvPr>
+            <p:ph type="sldImg"/>
+          </p:nvPr>
+        </p:nvSpPr>
+        <p:spPr/>
+      </p:sp>
+      <p:sp>
+        <p:nvSpPr>
+          <p:cNvPr id="3" name="Notes Placeholder 2"/>
+          <p:cNvSpPr>
+            <a:spLocks noGrp="1"/>
+          </p:cNvSpPr>
+          <p:nvPr>
+            <p:ph type="body" idx="1"/>
+          </p:nvPr>
+        </p:nvSpPr>
+        <p:spPr/>
+        <p:txBody>
+          <a:bodyPr/>
+          <a:lstStyle/>
+          <a:p>
+            <a:r>
+              <a:rPr lang="en-GB" dirty="0"/>
+              <a:t>So we learned how to mob</a:t>
+            </a:r>
+          </a:p>
+          <a:p>
+            <a:r>
+              <a:rPr lang="en-GB" dirty="0"/>
+              <a:t>and we love it!</a:t>
+            </a:r>
+          </a:p>
+          <a:p>
+            <a:r>
+              <a:rPr lang="en-GB" dirty="0"/>
+              <a:t>Better code</a:t>
+            </a:r>
+          </a:p>
+          <a:p>
+            <a:r>
+              <a:rPr lang="en-GB" dirty="0"/>
+              <a:t>Happy team</a:t>
+            </a:r>
+          </a:p>
+          <a:p>
+            <a:endParaRPr lang="en-GB" dirty="0"/>
+          </a:p>
+          <a:p>
+            <a:r>
+              <a:rPr lang="en-GB"/>
+              <a:t>Mobbing </a:t>
+            </a:r>
+            <a:r>
+              <a:rPr lang="en-GB" dirty="0"/>
+              <a:t>takes all the good things about pair programming and amplifies them</a:t>
+            </a:r>
+          </a:p>
+          <a:p>
+            <a:r>
+              <a:rPr lang="en-GB" dirty="0"/>
+              <a:t>But, if you’re not careful, it can amplify the bad things too</a:t>
+            </a:r>
+            <a:endParaRPr lang="en-US" dirty="0"/>
+          </a:p>
+        </p:txBody>
+      </p:sp>
+      <p:sp>
+        <p:nvSpPr>
+          <p:cNvPr id="4" name="Slide Number Placeholder 3"/>
+          <p:cNvSpPr>
+            <a:spLocks noGrp="1"/>
+          </p:cNvSpPr>
+          <p:nvPr>
+            <p:ph type="sldNum" sz="quarter" idx="5"/>
+          </p:nvPr>
+        </p:nvSpPr>
+        <p:spPr/>
+        <p:txBody>
+          <a:bodyPr/>
+          <a:lstStyle/>
+          <a:p>
+            <a:fld id="{B99E8012-7AEC-4AAD-B52C-DF7E1601EEFE}" type="slidenum">
+              <a:rPr lang="en-GB" smtClean="0"/>
+              <a:t>27</a:t>
+            </a:fld>
+            <a:endParaRPr lang="en-GB"/>
+          </a:p>
+        </p:txBody>
+      </p:sp>
+    </p:spTree>
+    <p:extLst>
+      <p:ext uri="{BB962C8B-B14F-4D97-AF65-F5344CB8AC3E}">
+        <p14:creationId xmlns:p14="http://schemas.microsoft.com/office/powerpoint/2010/main" val="1842680016"/>
       </p:ext>
     </p:extLst>
   </p:cSld>

</xml_diff>

<commit_message>
Notes for mob 2
</commit_message>
<xml_diff>
--- a/a-mob-mentality.pptx
+++ b/a-mob-mentality.pptx
@@ -1637,6 +1637,15 @@
               <a:t>And I guess that applies to techniques as well.</a:t>
             </a:r>
           </a:p>
+          <a:p>
+            <a:endParaRPr lang="en-US" dirty="0"/>
+          </a:p>
+          <a:p>
+            <a:r>
+              <a:rPr lang="en-US" dirty="0"/>
+              <a:t>But...I think we're stuck with the name </a:t>
+            </a:r>
+          </a:p>
         </p:txBody>
       </p:sp>
       <p:sp>
@@ -2911,6 +2920,260 @@
 </p:notes>
 </file>
 
+<file path=ppt/notesSlides/notesSlide28.xml><?xml version="1.0" encoding="utf-8"?>
+<p:notes xmlns:a="http://schemas.openxmlformats.org/drawingml/2006/main" xmlns:r="http://schemas.openxmlformats.org/officeDocument/2006/relationships" xmlns:p="http://schemas.openxmlformats.org/presentationml/2006/main">
+  <p:cSld>
+    <p:spTree>
+      <p:nvGrpSpPr>
+        <p:cNvPr id="1" name=""/>
+        <p:cNvGrpSpPr/>
+        <p:nvPr/>
+      </p:nvGrpSpPr>
+      <p:grpSpPr>
+        <a:xfrm>
+          <a:off x="0" y="0"/>
+          <a:ext cx="0" cy="0"/>
+          <a:chOff x="0" y="0"/>
+          <a:chExt cx="0" cy="0"/>
+        </a:xfrm>
+      </p:grpSpPr>
+      <p:sp>
+        <p:nvSpPr>
+          <p:cNvPr id="2" name="Slide Image Placeholder 1"/>
+          <p:cNvSpPr>
+            <a:spLocks noGrp="1" noRot="1" noChangeAspect="1"/>
+          </p:cNvSpPr>
+          <p:nvPr>
+            <p:ph type="sldImg"/>
+          </p:nvPr>
+        </p:nvSpPr>
+        <p:spPr/>
+      </p:sp>
+      <p:sp>
+        <p:nvSpPr>
+          <p:cNvPr id="3" name="Notes Placeholder 2"/>
+          <p:cNvSpPr>
+            <a:spLocks noGrp="1"/>
+          </p:cNvSpPr>
+          <p:nvPr>
+            <p:ph type="body" idx="1"/>
+          </p:nvPr>
+        </p:nvSpPr>
+        <p:spPr/>
+        <p:txBody>
+          <a:bodyPr/>
+          <a:lstStyle/>
+          <a:p>
+            <a:r>
+              <a:rPr lang="en-US" dirty="0"/>
+              <a:t>Now onto the second mob</a:t>
+            </a:r>
+          </a:p>
+          <a:p>
+            <a:endParaRPr lang="en-US" dirty="0"/>
+          </a:p>
+          <a:p>
+            <a:r>
+              <a:rPr lang="en-US" dirty="0"/>
+              <a:t>This time they were an established team</a:t>
+            </a:r>
+          </a:p>
+          <a:p>
+            <a:br>
+              <a:rPr lang="en-US" dirty="0"/>
+            </a:br>
+            <a:r>
+              <a:rPr lang="en-US" dirty="0"/>
+              <a:t>It’s a bit later on, and I was in a new role. A tech lead.</a:t>
+            </a:r>
+          </a:p>
+          <a:p>
+            <a:endParaRPr lang="en-US" dirty="0"/>
+          </a:p>
+          <a:p>
+            <a:r>
+              <a:rPr lang="en-US" dirty="0"/>
+              <a:t>I was really pleased because the team have heard about mobbing and are starting to try it out.</a:t>
+            </a:r>
+          </a:p>
+          <a:p>
+            <a:r>
+              <a:rPr lang="en-US" dirty="0"/>
+              <a:t>They like it too.</a:t>
+            </a:r>
+          </a:p>
+          <a:p>
+            <a:endParaRPr lang="en-US" dirty="0"/>
+          </a:p>
+          <a:p>
+            <a:pPr marL="0" marR="0" lvl="0" indent="0" algn="l" defTabSz="914400" rtl="0" eaLnBrk="1" fontAlgn="auto" latinLnBrk="0" hangingPunct="1">
+              <a:lnSpc>
+                <a:spcPct val="100000"/>
+              </a:lnSpc>
+              <a:spcBef>
+                <a:spcPts val="0"/>
+              </a:spcBef>
+              <a:spcAft>
+                <a:spcPts val="0"/>
+              </a:spcAft>
+              <a:buClrTx/>
+              <a:buSzTx/>
+              <a:buFontTx/>
+              <a:buNone/>
+              <a:tabLst/>
+              <a:defRPr/>
+            </a:pPr>
+            <a:r>
+              <a:rPr lang="en-US" dirty="0"/>
+              <a:t>And also, as a tech lead, the team mobbing suited me, because...</a:t>
+            </a:r>
+          </a:p>
+        </p:txBody>
+      </p:sp>
+      <p:sp>
+        <p:nvSpPr>
+          <p:cNvPr id="4" name="Slide Number Placeholder 3"/>
+          <p:cNvSpPr>
+            <a:spLocks noGrp="1"/>
+          </p:cNvSpPr>
+          <p:nvPr>
+            <p:ph type="sldNum" sz="quarter" idx="5"/>
+          </p:nvPr>
+        </p:nvSpPr>
+        <p:spPr/>
+        <p:txBody>
+          <a:bodyPr/>
+          <a:lstStyle/>
+          <a:p>
+            <a:fld id="{B99E8012-7AEC-4AAD-B52C-DF7E1601EEFE}" type="slidenum">
+              <a:rPr lang="en-GB" smtClean="0"/>
+              <a:t>28</a:t>
+            </a:fld>
+            <a:endParaRPr lang="en-GB"/>
+          </a:p>
+        </p:txBody>
+      </p:sp>
+    </p:spTree>
+    <p:extLst>
+      <p:ext uri="{BB962C8B-B14F-4D97-AF65-F5344CB8AC3E}">
+        <p14:creationId xmlns:p14="http://schemas.microsoft.com/office/powerpoint/2010/main" val="3133027634"/>
+      </p:ext>
+    </p:extLst>
+  </p:cSld>
+  <p:clrMapOvr>
+    <a:masterClrMapping/>
+  </p:clrMapOvr>
+</p:notes>
+</file>
+
+<file path=ppt/notesSlides/notesSlide29.xml><?xml version="1.0" encoding="utf-8"?>
+<p:notes xmlns:a="http://schemas.openxmlformats.org/drawingml/2006/main" xmlns:r="http://schemas.openxmlformats.org/officeDocument/2006/relationships" xmlns:p="http://schemas.openxmlformats.org/presentationml/2006/main">
+  <p:cSld>
+    <p:spTree>
+      <p:nvGrpSpPr>
+        <p:cNvPr id="1" name=""/>
+        <p:cNvGrpSpPr/>
+        <p:nvPr/>
+      </p:nvGrpSpPr>
+      <p:grpSpPr>
+        <a:xfrm>
+          <a:off x="0" y="0"/>
+          <a:ext cx="0" cy="0"/>
+          <a:chOff x="0" y="0"/>
+          <a:chExt cx="0" cy="0"/>
+        </a:xfrm>
+      </p:grpSpPr>
+      <p:sp>
+        <p:nvSpPr>
+          <p:cNvPr id="2" name="Slide Image Placeholder 1"/>
+          <p:cNvSpPr>
+            <a:spLocks noGrp="1" noRot="1" noChangeAspect="1"/>
+          </p:cNvSpPr>
+          <p:nvPr>
+            <p:ph type="sldImg"/>
+          </p:nvPr>
+        </p:nvSpPr>
+        <p:spPr/>
+      </p:sp>
+      <p:sp>
+        <p:nvSpPr>
+          <p:cNvPr id="3" name="Notes Placeholder 2"/>
+          <p:cNvSpPr>
+            <a:spLocks noGrp="1"/>
+          </p:cNvSpPr>
+          <p:nvPr>
+            <p:ph type="body" idx="1"/>
+          </p:nvPr>
+        </p:nvSpPr>
+        <p:spPr/>
+        <p:txBody>
+          <a:bodyPr/>
+          <a:lstStyle/>
+          <a:p>
+            <a:r>
+              <a:rPr lang="en-US" dirty="0"/>
+              <a:t>There’s much less context switching.</a:t>
+            </a:r>
+          </a:p>
+          <a:p>
+            <a:endParaRPr lang="en-US" dirty="0"/>
+          </a:p>
+          <a:p>
+            <a:r>
+              <a:rPr lang="en-US" dirty="0"/>
+              <a:t>With pairing, I need to keep an eye on multiple pairs, to see if they need help or are going down a wrong path.</a:t>
+            </a:r>
+          </a:p>
+          <a:p>
+            <a:r>
+              <a:rPr lang="en-US" dirty="0"/>
+              <a:t>With pairing, we can have multiple stories in flight that need to be coordinated and deployed and so on.</a:t>
+            </a:r>
+          </a:p>
+          <a:p>
+            <a:r>
+              <a:rPr lang="en-US" dirty="0"/>
+              <a:t>But with mobbing, there’s one thing going on at a time.</a:t>
+            </a:r>
+          </a:p>
+        </p:txBody>
+      </p:sp>
+      <p:sp>
+        <p:nvSpPr>
+          <p:cNvPr id="4" name="Slide Number Placeholder 3"/>
+          <p:cNvSpPr>
+            <a:spLocks noGrp="1"/>
+          </p:cNvSpPr>
+          <p:nvPr>
+            <p:ph type="sldNum" sz="quarter" idx="5"/>
+          </p:nvPr>
+        </p:nvSpPr>
+        <p:spPr/>
+        <p:txBody>
+          <a:bodyPr/>
+          <a:lstStyle/>
+          <a:p>
+            <a:fld id="{B99E8012-7AEC-4AAD-B52C-DF7E1601EEFE}" type="slidenum">
+              <a:rPr lang="en-GB" smtClean="0"/>
+              <a:t>29</a:t>
+            </a:fld>
+            <a:endParaRPr lang="en-GB"/>
+          </a:p>
+        </p:txBody>
+      </p:sp>
+    </p:spTree>
+    <p:extLst>
+      <p:ext uri="{BB962C8B-B14F-4D97-AF65-F5344CB8AC3E}">
+        <p14:creationId xmlns:p14="http://schemas.microsoft.com/office/powerpoint/2010/main" val="3709854531"/>
+      </p:ext>
+    </p:extLst>
+  </p:cSld>
+  <p:clrMapOvr>
+    <a:masterClrMapping/>
+  </p:clrMapOvr>
+</p:notes>
+</file>
+
 <file path=ppt/notesSlides/notesSlide3.xml><?xml version="1.0" encoding="utf-8"?>
 <p:notes xmlns:a="http://schemas.openxmlformats.org/drawingml/2006/main" xmlns:r="http://schemas.openxmlformats.org/officeDocument/2006/relationships" xmlns:p="http://schemas.openxmlformats.org/presentationml/2006/main">
   <p:cSld>
@@ -3043,6 +3306,1152 @@
     <p:extLst>
       <p:ext uri="{BB962C8B-B14F-4D97-AF65-F5344CB8AC3E}">
         <p14:creationId xmlns:p14="http://schemas.microsoft.com/office/powerpoint/2010/main" val="1956514631"/>
+      </p:ext>
+    </p:extLst>
+  </p:cSld>
+  <p:clrMapOvr>
+    <a:masterClrMapping/>
+  </p:clrMapOvr>
+</p:notes>
+</file>
+
+<file path=ppt/notesSlides/notesSlide30.xml><?xml version="1.0" encoding="utf-8"?>
+<p:notes xmlns:a="http://schemas.openxmlformats.org/drawingml/2006/main" xmlns:r="http://schemas.openxmlformats.org/officeDocument/2006/relationships" xmlns:p="http://schemas.openxmlformats.org/presentationml/2006/main">
+  <p:cSld>
+    <p:spTree>
+      <p:nvGrpSpPr>
+        <p:cNvPr id="1" name=""/>
+        <p:cNvGrpSpPr/>
+        <p:nvPr/>
+      </p:nvGrpSpPr>
+      <p:grpSpPr>
+        <a:xfrm>
+          <a:off x="0" y="0"/>
+          <a:ext cx="0" cy="0"/>
+          <a:chOff x="0" y="0"/>
+          <a:chExt cx="0" cy="0"/>
+        </a:xfrm>
+      </p:grpSpPr>
+      <p:sp>
+        <p:nvSpPr>
+          <p:cNvPr id="2" name="Slide Image Placeholder 1"/>
+          <p:cNvSpPr>
+            <a:spLocks noGrp="1" noRot="1" noChangeAspect="1"/>
+          </p:cNvSpPr>
+          <p:nvPr>
+            <p:ph type="sldImg"/>
+          </p:nvPr>
+        </p:nvSpPr>
+        <p:spPr/>
+      </p:sp>
+      <p:sp>
+        <p:nvSpPr>
+          <p:cNvPr id="3" name="Notes Placeholder 2"/>
+          <p:cNvSpPr>
+            <a:spLocks noGrp="1"/>
+          </p:cNvSpPr>
+          <p:nvPr>
+            <p:ph type="body" idx="1"/>
+          </p:nvPr>
+        </p:nvSpPr>
+        <p:spPr/>
+        <p:txBody>
+          <a:bodyPr/>
+          <a:lstStyle/>
+          <a:p>
+            <a:r>
+              <a:rPr lang="en-US" dirty="0"/>
+              <a:t>As a tech lead, I’m often popping out to meetings</a:t>
+            </a:r>
+          </a:p>
+          <a:p>
+            <a:r>
+              <a:rPr lang="en-US" dirty="0"/>
+              <a:t>If I keep leaving a pair, it can be disruptive.</a:t>
+            </a:r>
+          </a:p>
+          <a:p>
+            <a:r>
+              <a:rPr lang="en-US" dirty="0"/>
+              <a:t>So to avoid this I’ll often find myself picking up small jobs on my own, rather than being a bad pairing partner.</a:t>
+            </a:r>
+          </a:p>
+          <a:p>
+            <a:endParaRPr lang="en-US" dirty="0"/>
+          </a:p>
+          <a:p>
+            <a:r>
+              <a:rPr lang="en-US" dirty="0"/>
+              <a:t>But with a mob, it’s much easier to dip in and out.</a:t>
+            </a:r>
+          </a:p>
+          <a:p>
+            <a:r>
+              <a:rPr lang="en-US" dirty="0"/>
+              <a:t>Because when I leave there’s much less of an impact.</a:t>
+            </a:r>
+          </a:p>
+          <a:p>
+            <a:r>
+              <a:rPr lang="en-US" dirty="0"/>
+              <a:t>And so mobbing helps me stay technical.</a:t>
+            </a:r>
+          </a:p>
+        </p:txBody>
+      </p:sp>
+      <p:sp>
+        <p:nvSpPr>
+          <p:cNvPr id="4" name="Slide Number Placeholder 3"/>
+          <p:cNvSpPr>
+            <a:spLocks noGrp="1"/>
+          </p:cNvSpPr>
+          <p:nvPr>
+            <p:ph type="sldNum" sz="quarter" idx="5"/>
+          </p:nvPr>
+        </p:nvSpPr>
+        <p:spPr/>
+        <p:txBody>
+          <a:bodyPr/>
+          <a:lstStyle/>
+          <a:p>
+            <a:fld id="{B99E8012-7AEC-4AAD-B52C-DF7E1601EEFE}" type="slidenum">
+              <a:rPr lang="en-GB" smtClean="0"/>
+              <a:t>30</a:t>
+            </a:fld>
+            <a:endParaRPr lang="en-GB"/>
+          </a:p>
+        </p:txBody>
+      </p:sp>
+    </p:spTree>
+    <p:extLst>
+      <p:ext uri="{BB962C8B-B14F-4D97-AF65-F5344CB8AC3E}">
+        <p14:creationId xmlns:p14="http://schemas.microsoft.com/office/powerpoint/2010/main" val="3476170492"/>
+      </p:ext>
+    </p:extLst>
+  </p:cSld>
+  <p:clrMapOvr>
+    <a:masterClrMapping/>
+  </p:clrMapOvr>
+</p:notes>
+</file>
+
+<file path=ppt/notesSlides/notesSlide31.xml><?xml version="1.0" encoding="utf-8"?>
+<p:notes xmlns:a="http://schemas.openxmlformats.org/drawingml/2006/main" xmlns:r="http://schemas.openxmlformats.org/officeDocument/2006/relationships" xmlns:p="http://schemas.openxmlformats.org/presentationml/2006/main">
+  <p:cSld>
+    <p:spTree>
+      <p:nvGrpSpPr>
+        <p:cNvPr id="1" name=""/>
+        <p:cNvGrpSpPr/>
+        <p:nvPr/>
+      </p:nvGrpSpPr>
+      <p:grpSpPr>
+        <a:xfrm>
+          <a:off x="0" y="0"/>
+          <a:ext cx="0" cy="0"/>
+          <a:chOff x="0" y="0"/>
+          <a:chExt cx="0" cy="0"/>
+        </a:xfrm>
+      </p:grpSpPr>
+      <p:sp>
+        <p:nvSpPr>
+          <p:cNvPr id="2" name="Slide Image Placeholder 1"/>
+          <p:cNvSpPr>
+            <a:spLocks noGrp="1" noRot="1" noChangeAspect="1"/>
+          </p:cNvSpPr>
+          <p:nvPr>
+            <p:ph type="sldImg"/>
+          </p:nvPr>
+        </p:nvSpPr>
+        <p:spPr/>
+      </p:sp>
+      <p:sp>
+        <p:nvSpPr>
+          <p:cNvPr id="3" name="Notes Placeholder 2"/>
+          <p:cNvSpPr>
+            <a:spLocks noGrp="1"/>
+          </p:cNvSpPr>
+          <p:nvPr>
+            <p:ph type="body" idx="1"/>
+          </p:nvPr>
+        </p:nvSpPr>
+        <p:spPr/>
+        <p:txBody>
+          <a:bodyPr/>
+          <a:lstStyle/>
+          <a:p>
+            <a:r>
+              <a:rPr lang="en-US" dirty="0"/>
+              <a:t>Part of my job is to help the developers on the team improve.</a:t>
+            </a:r>
+          </a:p>
+          <a:p>
+            <a:r>
+              <a:rPr lang="en-US" dirty="0"/>
+              <a:t>With pairing, I don’t get much of a chance to see how they work</a:t>
+            </a:r>
+          </a:p>
+          <a:p>
+            <a:r>
+              <a:rPr lang="en-US" dirty="0"/>
+              <a:t>But with mobbing, I can see the entire team at once.</a:t>
+            </a:r>
+          </a:p>
+        </p:txBody>
+      </p:sp>
+      <p:sp>
+        <p:nvSpPr>
+          <p:cNvPr id="4" name="Slide Number Placeholder 3"/>
+          <p:cNvSpPr>
+            <a:spLocks noGrp="1"/>
+          </p:cNvSpPr>
+          <p:nvPr>
+            <p:ph type="sldNum" sz="quarter" idx="5"/>
+          </p:nvPr>
+        </p:nvSpPr>
+        <p:spPr/>
+        <p:txBody>
+          <a:bodyPr/>
+          <a:lstStyle/>
+          <a:p>
+            <a:fld id="{B99E8012-7AEC-4AAD-B52C-DF7E1601EEFE}" type="slidenum">
+              <a:rPr lang="en-GB" smtClean="0"/>
+              <a:t>31</a:t>
+            </a:fld>
+            <a:endParaRPr lang="en-GB"/>
+          </a:p>
+        </p:txBody>
+      </p:sp>
+    </p:spTree>
+    <p:extLst>
+      <p:ext uri="{BB962C8B-B14F-4D97-AF65-F5344CB8AC3E}">
+        <p14:creationId xmlns:p14="http://schemas.microsoft.com/office/powerpoint/2010/main" val="240641244"/>
+      </p:ext>
+    </p:extLst>
+  </p:cSld>
+  <p:clrMapOvr>
+    <a:masterClrMapping/>
+  </p:clrMapOvr>
+</p:notes>
+</file>
+
+<file path=ppt/notesSlides/notesSlide32.xml><?xml version="1.0" encoding="utf-8"?>
+<p:notes xmlns:a="http://schemas.openxmlformats.org/drawingml/2006/main" xmlns:r="http://schemas.openxmlformats.org/officeDocument/2006/relationships" xmlns:p="http://schemas.openxmlformats.org/presentationml/2006/main">
+  <p:cSld>
+    <p:spTree>
+      <p:nvGrpSpPr>
+        <p:cNvPr id="1" name=""/>
+        <p:cNvGrpSpPr/>
+        <p:nvPr/>
+      </p:nvGrpSpPr>
+      <p:grpSpPr>
+        <a:xfrm>
+          <a:off x="0" y="0"/>
+          <a:ext cx="0" cy="0"/>
+          <a:chOff x="0" y="0"/>
+          <a:chExt cx="0" cy="0"/>
+        </a:xfrm>
+      </p:grpSpPr>
+      <p:sp>
+        <p:nvSpPr>
+          <p:cNvPr id="2" name="Slide Image Placeholder 1"/>
+          <p:cNvSpPr>
+            <a:spLocks noGrp="1" noRot="1" noChangeAspect="1"/>
+          </p:cNvSpPr>
+          <p:nvPr>
+            <p:ph type="sldImg"/>
+          </p:nvPr>
+        </p:nvSpPr>
+        <p:spPr/>
+      </p:sp>
+      <p:sp>
+        <p:nvSpPr>
+          <p:cNvPr id="3" name="Notes Placeholder 2"/>
+          <p:cNvSpPr>
+            <a:spLocks noGrp="1"/>
+          </p:cNvSpPr>
+          <p:nvPr>
+            <p:ph type="body" idx="1"/>
+          </p:nvPr>
+        </p:nvSpPr>
+        <p:spPr/>
+        <p:txBody>
+          <a:bodyPr/>
+          <a:lstStyle/>
+          <a:p>
+            <a:r>
+              <a:rPr lang="en-US" dirty="0"/>
+              <a:t>But we came across some problems I hadn’t seen before</a:t>
+            </a:r>
+          </a:p>
+        </p:txBody>
+      </p:sp>
+      <p:sp>
+        <p:nvSpPr>
+          <p:cNvPr id="4" name="Slide Number Placeholder 3"/>
+          <p:cNvSpPr>
+            <a:spLocks noGrp="1"/>
+          </p:cNvSpPr>
+          <p:nvPr>
+            <p:ph type="sldNum" sz="quarter" idx="5"/>
+          </p:nvPr>
+        </p:nvSpPr>
+        <p:spPr/>
+        <p:txBody>
+          <a:bodyPr/>
+          <a:lstStyle/>
+          <a:p>
+            <a:fld id="{B99E8012-7AEC-4AAD-B52C-DF7E1601EEFE}" type="slidenum">
+              <a:rPr lang="en-GB" smtClean="0"/>
+              <a:t>32</a:t>
+            </a:fld>
+            <a:endParaRPr lang="en-GB"/>
+          </a:p>
+        </p:txBody>
+      </p:sp>
+    </p:spTree>
+    <p:extLst>
+      <p:ext uri="{BB962C8B-B14F-4D97-AF65-F5344CB8AC3E}">
+        <p14:creationId xmlns:p14="http://schemas.microsoft.com/office/powerpoint/2010/main" val="2667468400"/>
+      </p:ext>
+    </p:extLst>
+  </p:cSld>
+  <p:clrMapOvr>
+    <a:masterClrMapping/>
+  </p:clrMapOvr>
+</p:notes>
+</file>
+
+<file path=ppt/notesSlides/notesSlide33.xml><?xml version="1.0" encoding="utf-8"?>
+<p:notes xmlns:a="http://schemas.openxmlformats.org/drawingml/2006/main" xmlns:r="http://schemas.openxmlformats.org/officeDocument/2006/relationships" xmlns:p="http://schemas.openxmlformats.org/presentationml/2006/main">
+  <p:cSld>
+    <p:spTree>
+      <p:nvGrpSpPr>
+        <p:cNvPr id="1" name=""/>
+        <p:cNvGrpSpPr/>
+        <p:nvPr/>
+      </p:nvGrpSpPr>
+      <p:grpSpPr>
+        <a:xfrm>
+          <a:off x="0" y="0"/>
+          <a:ext cx="0" cy="0"/>
+          <a:chOff x="0" y="0"/>
+          <a:chExt cx="0" cy="0"/>
+        </a:xfrm>
+      </p:grpSpPr>
+      <p:sp>
+        <p:nvSpPr>
+          <p:cNvPr id="2" name="Slide Image Placeholder 1"/>
+          <p:cNvSpPr>
+            <a:spLocks noGrp="1" noRot="1" noChangeAspect="1"/>
+          </p:cNvSpPr>
+          <p:nvPr>
+            <p:ph type="sldImg"/>
+          </p:nvPr>
+        </p:nvSpPr>
+        <p:spPr/>
+      </p:sp>
+      <p:sp>
+        <p:nvSpPr>
+          <p:cNvPr id="3" name="Notes Placeholder 2"/>
+          <p:cNvSpPr>
+            <a:spLocks noGrp="1"/>
+          </p:cNvSpPr>
+          <p:nvPr>
+            <p:ph type="body" idx="1"/>
+          </p:nvPr>
+        </p:nvSpPr>
+        <p:spPr/>
+        <p:txBody>
+          <a:bodyPr/>
+          <a:lstStyle/>
+          <a:p>
+            <a:r>
+              <a:rPr lang="en-US" dirty="0"/>
+              <a:t>The team needed some specialists, and it started to grow.</a:t>
+            </a:r>
+          </a:p>
+          <a:p>
+            <a:r>
+              <a:rPr lang="en-US" dirty="0"/>
+              <a:t>Our first reaction was to get them to join the mob.</a:t>
+            </a:r>
+          </a:p>
+          <a:p>
+            <a:r>
+              <a:rPr lang="en-US" dirty="0"/>
+              <a:t>But it started to feel crowded</a:t>
+            </a:r>
+          </a:p>
+          <a:p>
+            <a:endParaRPr lang="en-US" dirty="0"/>
+          </a:p>
+          <a:p>
+            <a:r>
+              <a:rPr lang="en-US" dirty="0"/>
+              <a:t>Hard for everyone to contribute</a:t>
+            </a:r>
+          </a:p>
+          <a:p>
+            <a:r>
+              <a:rPr lang="en-US" dirty="0"/>
+              <a:t>People were starting to disengage</a:t>
+            </a:r>
+          </a:p>
+          <a:p>
+            <a:r>
+              <a:rPr lang="en-US" dirty="0"/>
+              <a:t>And it was hard to physically fit everyone around the screen (it was a big screen!)</a:t>
+            </a:r>
+          </a:p>
+        </p:txBody>
+      </p:sp>
+      <p:sp>
+        <p:nvSpPr>
+          <p:cNvPr id="4" name="Slide Number Placeholder 3"/>
+          <p:cNvSpPr>
+            <a:spLocks noGrp="1"/>
+          </p:cNvSpPr>
+          <p:nvPr>
+            <p:ph type="sldNum" sz="quarter" idx="5"/>
+          </p:nvPr>
+        </p:nvSpPr>
+        <p:spPr/>
+        <p:txBody>
+          <a:bodyPr/>
+          <a:lstStyle/>
+          <a:p>
+            <a:fld id="{B99E8012-7AEC-4AAD-B52C-DF7E1601EEFE}" type="slidenum">
+              <a:rPr lang="en-GB" smtClean="0"/>
+              <a:t>33</a:t>
+            </a:fld>
+            <a:endParaRPr lang="en-GB"/>
+          </a:p>
+        </p:txBody>
+      </p:sp>
+    </p:spTree>
+    <p:extLst>
+      <p:ext uri="{BB962C8B-B14F-4D97-AF65-F5344CB8AC3E}">
+        <p14:creationId xmlns:p14="http://schemas.microsoft.com/office/powerpoint/2010/main" val="3533604543"/>
+      </p:ext>
+    </p:extLst>
+  </p:cSld>
+  <p:clrMapOvr>
+    <a:masterClrMapping/>
+  </p:clrMapOvr>
+</p:notes>
+</file>
+
+<file path=ppt/notesSlides/notesSlide34.xml><?xml version="1.0" encoding="utf-8"?>
+<p:notes xmlns:a="http://schemas.openxmlformats.org/drawingml/2006/main" xmlns:r="http://schemas.openxmlformats.org/officeDocument/2006/relationships" xmlns:p="http://schemas.openxmlformats.org/presentationml/2006/main">
+  <p:cSld>
+    <p:spTree>
+      <p:nvGrpSpPr>
+        <p:cNvPr id="1" name=""/>
+        <p:cNvGrpSpPr/>
+        <p:nvPr/>
+      </p:nvGrpSpPr>
+      <p:grpSpPr>
+        <a:xfrm>
+          <a:off x="0" y="0"/>
+          <a:ext cx="0" cy="0"/>
+          <a:chOff x="0" y="0"/>
+          <a:chExt cx="0" cy="0"/>
+        </a:xfrm>
+      </p:grpSpPr>
+      <p:sp>
+        <p:nvSpPr>
+          <p:cNvPr id="2" name="Slide Image Placeholder 1"/>
+          <p:cNvSpPr>
+            <a:spLocks noGrp="1" noRot="1" noChangeAspect="1"/>
+          </p:cNvSpPr>
+          <p:nvPr>
+            <p:ph type="sldImg"/>
+          </p:nvPr>
+        </p:nvSpPr>
+        <p:spPr/>
+      </p:sp>
+      <p:sp>
+        <p:nvSpPr>
+          <p:cNvPr id="3" name="Notes Placeholder 2"/>
+          <p:cNvSpPr>
+            <a:spLocks noGrp="1"/>
+          </p:cNvSpPr>
+          <p:nvPr>
+            <p:ph type="body" idx="1"/>
+          </p:nvPr>
+        </p:nvSpPr>
+        <p:spPr/>
+        <p:txBody>
+          <a:bodyPr/>
+          <a:lstStyle/>
+          <a:p>
+            <a:r>
+              <a:rPr lang="en-US" dirty="0"/>
+              <a:t>Established team, existing systems that needed small updates</a:t>
+            </a:r>
+          </a:p>
+          <a:p>
+            <a:r>
+              <a:rPr lang="en-US" dirty="0"/>
+              <a:t>Mobbing not as valuable because it was well known, established, not interesting</a:t>
+            </a:r>
+          </a:p>
+          <a:p>
+            <a:r>
+              <a:rPr lang="en-US" dirty="0"/>
+              <a:t>The team tried mobbing on these, but it was quite dull. Again it was hard to stay engaged.</a:t>
+            </a:r>
+          </a:p>
+          <a:p>
+            <a:endParaRPr lang="en-US" dirty="0"/>
+          </a:p>
+        </p:txBody>
+      </p:sp>
+      <p:sp>
+        <p:nvSpPr>
+          <p:cNvPr id="4" name="Slide Number Placeholder 3"/>
+          <p:cNvSpPr>
+            <a:spLocks noGrp="1"/>
+          </p:cNvSpPr>
+          <p:nvPr>
+            <p:ph type="sldNum" sz="quarter" idx="5"/>
+          </p:nvPr>
+        </p:nvSpPr>
+        <p:spPr/>
+        <p:txBody>
+          <a:bodyPr/>
+          <a:lstStyle/>
+          <a:p>
+            <a:fld id="{B99E8012-7AEC-4AAD-B52C-DF7E1601EEFE}" type="slidenum">
+              <a:rPr lang="en-GB" smtClean="0"/>
+              <a:t>34</a:t>
+            </a:fld>
+            <a:endParaRPr lang="en-GB"/>
+          </a:p>
+        </p:txBody>
+      </p:sp>
+    </p:spTree>
+    <p:extLst>
+      <p:ext uri="{BB962C8B-B14F-4D97-AF65-F5344CB8AC3E}">
+        <p14:creationId xmlns:p14="http://schemas.microsoft.com/office/powerpoint/2010/main" val="2110756514"/>
+      </p:ext>
+    </p:extLst>
+  </p:cSld>
+  <p:clrMapOvr>
+    <a:masterClrMapping/>
+  </p:clrMapOvr>
+</p:notes>
+</file>
+
+<file path=ppt/notesSlides/notesSlide35.xml><?xml version="1.0" encoding="utf-8"?>
+<p:notes xmlns:a="http://schemas.openxmlformats.org/drawingml/2006/main" xmlns:r="http://schemas.openxmlformats.org/officeDocument/2006/relationships" xmlns:p="http://schemas.openxmlformats.org/presentationml/2006/main">
+  <p:cSld>
+    <p:spTree>
+      <p:nvGrpSpPr>
+        <p:cNvPr id="1" name=""/>
+        <p:cNvGrpSpPr/>
+        <p:nvPr/>
+      </p:nvGrpSpPr>
+      <p:grpSpPr>
+        <a:xfrm>
+          <a:off x="0" y="0"/>
+          <a:ext cx="0" cy="0"/>
+          <a:chOff x="0" y="0"/>
+          <a:chExt cx="0" cy="0"/>
+        </a:xfrm>
+      </p:grpSpPr>
+      <p:sp>
+        <p:nvSpPr>
+          <p:cNvPr id="2" name="Slide Image Placeholder 1"/>
+          <p:cNvSpPr>
+            <a:spLocks noGrp="1" noRot="1" noChangeAspect="1"/>
+          </p:cNvSpPr>
+          <p:nvPr>
+            <p:ph type="sldImg"/>
+          </p:nvPr>
+        </p:nvSpPr>
+        <p:spPr/>
+      </p:sp>
+      <p:sp>
+        <p:nvSpPr>
+          <p:cNvPr id="3" name="Notes Placeholder 2"/>
+          <p:cNvSpPr>
+            <a:spLocks noGrp="1"/>
+          </p:cNvSpPr>
+          <p:nvPr>
+            <p:ph type="body" idx="1"/>
+          </p:nvPr>
+        </p:nvSpPr>
+        <p:spPr/>
+        <p:txBody>
+          <a:bodyPr/>
+          <a:lstStyle/>
+          <a:p>
+            <a:r>
+              <a:rPr lang="en-US" dirty="0"/>
+              <a:t>Things we were all new to</a:t>
+            </a:r>
+          </a:p>
+          <a:p>
+            <a:r>
+              <a:rPr lang="en-US" dirty="0"/>
+              <a:t>Research</a:t>
+            </a:r>
+          </a:p>
+        </p:txBody>
+      </p:sp>
+      <p:sp>
+        <p:nvSpPr>
+          <p:cNvPr id="4" name="Slide Number Placeholder 3"/>
+          <p:cNvSpPr>
+            <a:spLocks noGrp="1"/>
+          </p:cNvSpPr>
+          <p:nvPr>
+            <p:ph type="sldNum" sz="quarter" idx="5"/>
+          </p:nvPr>
+        </p:nvSpPr>
+        <p:spPr/>
+        <p:txBody>
+          <a:bodyPr/>
+          <a:lstStyle/>
+          <a:p>
+            <a:fld id="{B99E8012-7AEC-4AAD-B52C-DF7E1601EEFE}" type="slidenum">
+              <a:rPr lang="en-GB" smtClean="0"/>
+              <a:t>35</a:t>
+            </a:fld>
+            <a:endParaRPr lang="en-GB"/>
+          </a:p>
+        </p:txBody>
+      </p:sp>
+    </p:spTree>
+    <p:extLst>
+      <p:ext uri="{BB962C8B-B14F-4D97-AF65-F5344CB8AC3E}">
+        <p14:creationId xmlns:p14="http://schemas.microsoft.com/office/powerpoint/2010/main" val="3212380702"/>
+      </p:ext>
+    </p:extLst>
+  </p:cSld>
+  <p:clrMapOvr>
+    <a:masterClrMapping/>
+  </p:clrMapOvr>
+</p:notes>
+</file>
+
+<file path=ppt/notesSlides/notesSlide36.xml><?xml version="1.0" encoding="utf-8"?>
+<p:notes xmlns:a="http://schemas.openxmlformats.org/drawingml/2006/main" xmlns:r="http://schemas.openxmlformats.org/officeDocument/2006/relationships" xmlns:p="http://schemas.openxmlformats.org/presentationml/2006/main">
+  <p:cSld>
+    <p:spTree>
+      <p:nvGrpSpPr>
+        <p:cNvPr id="1" name=""/>
+        <p:cNvGrpSpPr/>
+        <p:nvPr/>
+      </p:nvGrpSpPr>
+      <p:grpSpPr>
+        <a:xfrm>
+          <a:off x="0" y="0"/>
+          <a:ext cx="0" cy="0"/>
+          <a:chOff x="0" y="0"/>
+          <a:chExt cx="0" cy="0"/>
+        </a:xfrm>
+      </p:grpSpPr>
+      <p:sp>
+        <p:nvSpPr>
+          <p:cNvPr id="2" name="Slide Image Placeholder 1"/>
+          <p:cNvSpPr>
+            <a:spLocks noGrp="1" noRot="1" noChangeAspect="1"/>
+          </p:cNvSpPr>
+          <p:nvPr>
+            <p:ph type="sldImg"/>
+          </p:nvPr>
+        </p:nvSpPr>
+        <p:spPr/>
+      </p:sp>
+      <p:sp>
+        <p:nvSpPr>
+          <p:cNvPr id="3" name="Notes Placeholder 2"/>
+          <p:cNvSpPr>
+            <a:spLocks noGrp="1"/>
+          </p:cNvSpPr>
+          <p:nvPr>
+            <p:ph type="body" idx="1"/>
+          </p:nvPr>
+        </p:nvSpPr>
+        <p:spPr/>
+        <p:txBody>
+          <a:bodyPr/>
+          <a:lstStyle/>
+          <a:p>
+            <a:r>
+              <a:rPr lang="en-US" dirty="0"/>
+              <a:t>Luckily we found ways to solve these problems.</a:t>
+            </a:r>
+          </a:p>
+          <a:p>
+            <a:endParaRPr lang="en-US" dirty="0"/>
+          </a:p>
+          <a:p>
+            <a:r>
+              <a:rPr lang="en-US" dirty="0"/>
+              <a:t>These are best summed up by a couple of phrases to our team’s vocabulary.</a:t>
+            </a:r>
+          </a:p>
+        </p:txBody>
+      </p:sp>
+      <p:sp>
+        <p:nvSpPr>
+          <p:cNvPr id="4" name="Slide Number Placeholder 3"/>
+          <p:cNvSpPr>
+            <a:spLocks noGrp="1"/>
+          </p:cNvSpPr>
+          <p:nvPr>
+            <p:ph type="sldNum" sz="quarter" idx="5"/>
+          </p:nvPr>
+        </p:nvSpPr>
+        <p:spPr/>
+        <p:txBody>
+          <a:bodyPr/>
+          <a:lstStyle/>
+          <a:p>
+            <a:fld id="{B99E8012-7AEC-4AAD-B52C-DF7E1601EEFE}" type="slidenum">
+              <a:rPr lang="en-GB" smtClean="0"/>
+              <a:t>36</a:t>
+            </a:fld>
+            <a:endParaRPr lang="en-GB"/>
+          </a:p>
+        </p:txBody>
+      </p:sp>
+    </p:spTree>
+    <p:extLst>
+      <p:ext uri="{BB962C8B-B14F-4D97-AF65-F5344CB8AC3E}">
+        <p14:creationId xmlns:p14="http://schemas.microsoft.com/office/powerpoint/2010/main" val="4253530394"/>
+      </p:ext>
+    </p:extLst>
+  </p:cSld>
+  <p:clrMapOvr>
+    <a:masterClrMapping/>
+  </p:clrMapOvr>
+</p:notes>
+</file>
+
+<file path=ppt/notesSlides/notesSlide37.xml><?xml version="1.0" encoding="utf-8"?>
+<p:notes xmlns:a="http://schemas.openxmlformats.org/drawingml/2006/main" xmlns:r="http://schemas.openxmlformats.org/officeDocument/2006/relationships" xmlns:p="http://schemas.openxmlformats.org/presentationml/2006/main">
+  <p:cSld>
+    <p:spTree>
+      <p:nvGrpSpPr>
+        <p:cNvPr id="1" name=""/>
+        <p:cNvGrpSpPr/>
+        <p:nvPr/>
+      </p:nvGrpSpPr>
+      <p:grpSpPr>
+        <a:xfrm>
+          <a:off x="0" y="0"/>
+          <a:ext cx="0" cy="0"/>
+          <a:chOff x="0" y="0"/>
+          <a:chExt cx="0" cy="0"/>
+        </a:xfrm>
+      </p:grpSpPr>
+      <p:sp>
+        <p:nvSpPr>
+          <p:cNvPr id="2" name="Slide Image Placeholder 1"/>
+          <p:cNvSpPr>
+            <a:spLocks noGrp="1" noRot="1" noChangeAspect="1"/>
+          </p:cNvSpPr>
+          <p:nvPr>
+            <p:ph type="sldImg"/>
+          </p:nvPr>
+        </p:nvSpPr>
+        <p:spPr/>
+      </p:sp>
+      <p:sp>
+        <p:nvSpPr>
+          <p:cNvPr id="3" name="Notes Placeholder 2"/>
+          <p:cNvSpPr>
+            <a:spLocks noGrp="1"/>
+          </p:cNvSpPr>
+          <p:nvPr>
+            <p:ph type="body" idx="1"/>
+          </p:nvPr>
+        </p:nvSpPr>
+        <p:spPr/>
+        <p:txBody>
+          <a:bodyPr/>
+          <a:lstStyle/>
+          <a:p>
+            <a:r>
+              <a:rPr lang="en-US" dirty="0"/>
+              <a:t>The first was “</a:t>
+            </a:r>
+            <a:r>
+              <a:rPr lang="en-US" dirty="0" err="1"/>
+              <a:t>demob</a:t>
+            </a:r>
+            <a:r>
+              <a:rPr lang="en-US" dirty="0"/>
+              <a:t>”</a:t>
+            </a:r>
+          </a:p>
+          <a:p>
+            <a:r>
+              <a:rPr lang="en-US" dirty="0"/>
+              <a:t>Which means to split up a mob</a:t>
+            </a:r>
+          </a:p>
+          <a:p>
+            <a:endParaRPr lang="en-US" dirty="0"/>
+          </a:p>
+          <a:p>
+            <a:r>
+              <a:rPr lang="en-US" dirty="0"/>
+              <a:t>I think we’ve got a good idea of how this will work end-to-end now. Let’s </a:t>
+            </a:r>
+            <a:r>
+              <a:rPr lang="en-US" dirty="0" err="1"/>
+              <a:t>demob</a:t>
+            </a:r>
+            <a:r>
+              <a:rPr lang="en-US" dirty="0"/>
+              <a:t>, one pair finish the frontend, one finish the backend.</a:t>
+            </a:r>
+          </a:p>
+          <a:p>
+            <a:endParaRPr lang="en-US" dirty="0"/>
+          </a:p>
+          <a:p>
+            <a:r>
+              <a:rPr lang="en-US" dirty="0"/>
+              <a:t>If we need to use an </a:t>
+            </a:r>
+            <a:r>
+              <a:rPr lang="en-US" dirty="0" err="1"/>
+              <a:t>unfamilar</a:t>
+            </a:r>
+            <a:r>
+              <a:rPr lang="en-US" dirty="0"/>
+              <a:t> bit of tech – lets </a:t>
+            </a:r>
+            <a:r>
+              <a:rPr lang="en-US" dirty="0" err="1"/>
+              <a:t>demob</a:t>
+            </a:r>
+            <a:r>
+              <a:rPr lang="en-US" dirty="0"/>
+              <a:t>, read the docs, then come back later and share what we found</a:t>
+            </a:r>
+          </a:p>
+          <a:p>
+            <a:endParaRPr lang="en-US" dirty="0"/>
+          </a:p>
+          <a:p>
+            <a:r>
+              <a:rPr lang="en-US" dirty="0"/>
+              <a:t>Someone from another team has a question about the library that we wrote – I’ll </a:t>
+            </a:r>
+            <a:r>
+              <a:rPr lang="en-US" dirty="0" err="1"/>
+              <a:t>demob</a:t>
+            </a:r>
+            <a:r>
+              <a:rPr lang="en-US" dirty="0"/>
+              <a:t> and show them, you folks carry on mobbing</a:t>
+            </a:r>
+          </a:p>
+        </p:txBody>
+      </p:sp>
+      <p:sp>
+        <p:nvSpPr>
+          <p:cNvPr id="4" name="Slide Number Placeholder 3"/>
+          <p:cNvSpPr>
+            <a:spLocks noGrp="1"/>
+          </p:cNvSpPr>
+          <p:nvPr>
+            <p:ph type="sldNum" sz="quarter" idx="5"/>
+          </p:nvPr>
+        </p:nvSpPr>
+        <p:spPr/>
+        <p:txBody>
+          <a:bodyPr/>
+          <a:lstStyle/>
+          <a:p>
+            <a:fld id="{B99E8012-7AEC-4AAD-B52C-DF7E1601EEFE}" type="slidenum">
+              <a:rPr lang="en-GB" smtClean="0"/>
+              <a:t>37</a:t>
+            </a:fld>
+            <a:endParaRPr lang="en-GB"/>
+          </a:p>
+        </p:txBody>
+      </p:sp>
+    </p:spTree>
+    <p:extLst>
+      <p:ext uri="{BB962C8B-B14F-4D97-AF65-F5344CB8AC3E}">
+        <p14:creationId xmlns:p14="http://schemas.microsoft.com/office/powerpoint/2010/main" val="1394015817"/>
+      </p:ext>
+    </p:extLst>
+  </p:cSld>
+  <p:clrMapOvr>
+    <a:masterClrMapping/>
+  </p:clrMapOvr>
+</p:notes>
+</file>
+
+<file path=ppt/notesSlides/notesSlide38.xml><?xml version="1.0" encoding="utf-8"?>
+<p:notes xmlns:a="http://schemas.openxmlformats.org/drawingml/2006/main" xmlns:r="http://schemas.openxmlformats.org/officeDocument/2006/relationships" xmlns:p="http://schemas.openxmlformats.org/presentationml/2006/main">
+  <p:cSld>
+    <p:spTree>
+      <p:nvGrpSpPr>
+        <p:cNvPr id="1" name=""/>
+        <p:cNvGrpSpPr/>
+        <p:nvPr/>
+      </p:nvGrpSpPr>
+      <p:grpSpPr>
+        <a:xfrm>
+          <a:off x="0" y="0"/>
+          <a:ext cx="0" cy="0"/>
+          <a:chOff x="0" y="0"/>
+          <a:chExt cx="0" cy="0"/>
+        </a:xfrm>
+      </p:grpSpPr>
+      <p:sp>
+        <p:nvSpPr>
+          <p:cNvPr id="2" name="Slide Image Placeholder 1"/>
+          <p:cNvSpPr>
+            <a:spLocks noGrp="1" noRot="1" noChangeAspect="1"/>
+          </p:cNvSpPr>
+          <p:nvPr>
+            <p:ph type="sldImg"/>
+          </p:nvPr>
+        </p:nvSpPr>
+        <p:spPr/>
+      </p:sp>
+      <p:sp>
+        <p:nvSpPr>
+          <p:cNvPr id="3" name="Notes Placeholder 2"/>
+          <p:cNvSpPr>
+            <a:spLocks noGrp="1"/>
+          </p:cNvSpPr>
+          <p:nvPr>
+            <p:ph type="body" idx="1"/>
+          </p:nvPr>
+        </p:nvSpPr>
+        <p:spPr/>
+        <p:txBody>
+          <a:bodyPr/>
+          <a:lstStyle/>
+          <a:p>
+            <a:r>
+              <a:rPr lang="en-US" dirty="0"/>
+              <a:t>The other term was “</a:t>
+            </a:r>
+            <a:r>
+              <a:rPr lang="en-US" dirty="0" err="1"/>
+              <a:t>mobbable</a:t>
+            </a:r>
+            <a:r>
+              <a:rPr lang="en-US" dirty="0"/>
+              <a:t>”</a:t>
+            </a:r>
+          </a:p>
+          <a:p>
+            <a:r>
+              <a:rPr lang="en-US" dirty="0"/>
+              <a:t>Whether a story is worth mobbing on.</a:t>
+            </a:r>
+          </a:p>
+          <a:p>
+            <a:endParaRPr lang="en-US" dirty="0"/>
+          </a:p>
+          <a:p>
+            <a:r>
+              <a:rPr lang="en-US" dirty="0"/>
+              <a:t>This story coming up in the next sprint will require a big refactor, it’s definitely </a:t>
+            </a:r>
+            <a:r>
+              <a:rPr lang="en-US" dirty="0" err="1"/>
+              <a:t>mobbable</a:t>
+            </a:r>
+            <a:r>
+              <a:rPr lang="en-US" dirty="0"/>
+              <a:t>.</a:t>
+            </a:r>
+          </a:p>
+          <a:p>
+            <a:endParaRPr lang="en-US" dirty="0"/>
+          </a:p>
+          <a:p>
+            <a:r>
+              <a:rPr lang="en-US" dirty="0"/>
+              <a:t>I thought this story would be easy, so started it on my own. But there’s lots of edge cases I hadn’t considered. I think it’s </a:t>
+            </a:r>
+            <a:r>
+              <a:rPr lang="en-US" dirty="0" err="1"/>
+              <a:t>mobabble</a:t>
+            </a:r>
+            <a:r>
+              <a:rPr lang="en-US" dirty="0"/>
+              <a:t> now.</a:t>
+            </a:r>
+          </a:p>
+        </p:txBody>
+      </p:sp>
+      <p:sp>
+        <p:nvSpPr>
+          <p:cNvPr id="4" name="Slide Number Placeholder 3"/>
+          <p:cNvSpPr>
+            <a:spLocks noGrp="1"/>
+          </p:cNvSpPr>
+          <p:nvPr>
+            <p:ph type="sldNum" sz="quarter" idx="5"/>
+          </p:nvPr>
+        </p:nvSpPr>
+        <p:spPr/>
+        <p:txBody>
+          <a:bodyPr/>
+          <a:lstStyle/>
+          <a:p>
+            <a:fld id="{B99E8012-7AEC-4AAD-B52C-DF7E1601EEFE}" type="slidenum">
+              <a:rPr lang="en-GB" smtClean="0"/>
+              <a:t>38</a:t>
+            </a:fld>
+            <a:endParaRPr lang="en-GB"/>
+          </a:p>
+        </p:txBody>
+      </p:sp>
+    </p:spTree>
+    <p:extLst>
+      <p:ext uri="{BB962C8B-B14F-4D97-AF65-F5344CB8AC3E}">
+        <p14:creationId xmlns:p14="http://schemas.microsoft.com/office/powerpoint/2010/main" val="2094516133"/>
+      </p:ext>
+    </p:extLst>
+  </p:cSld>
+  <p:clrMapOvr>
+    <a:masterClrMapping/>
+  </p:clrMapOvr>
+</p:notes>
+</file>
+
+<file path=ppt/notesSlides/notesSlide39.xml><?xml version="1.0" encoding="utf-8"?>
+<p:notes xmlns:a="http://schemas.openxmlformats.org/drawingml/2006/main" xmlns:r="http://schemas.openxmlformats.org/officeDocument/2006/relationships" xmlns:p="http://schemas.openxmlformats.org/presentationml/2006/main">
+  <p:cSld>
+    <p:spTree>
+      <p:nvGrpSpPr>
+        <p:cNvPr id="1" name=""/>
+        <p:cNvGrpSpPr/>
+        <p:nvPr/>
+      </p:nvGrpSpPr>
+      <p:grpSpPr>
+        <a:xfrm>
+          <a:off x="0" y="0"/>
+          <a:ext cx="0" cy="0"/>
+          <a:chOff x="0" y="0"/>
+          <a:chExt cx="0" cy="0"/>
+        </a:xfrm>
+      </p:grpSpPr>
+      <p:sp>
+        <p:nvSpPr>
+          <p:cNvPr id="2" name="Slide Image Placeholder 1"/>
+          <p:cNvSpPr>
+            <a:spLocks noGrp="1" noRot="1" noChangeAspect="1"/>
+          </p:cNvSpPr>
+          <p:nvPr>
+            <p:ph type="sldImg"/>
+          </p:nvPr>
+        </p:nvSpPr>
+        <p:spPr/>
+      </p:sp>
+      <p:sp>
+        <p:nvSpPr>
+          <p:cNvPr id="3" name="Notes Placeholder 2"/>
+          <p:cNvSpPr>
+            <a:spLocks noGrp="1"/>
+          </p:cNvSpPr>
+          <p:nvPr>
+            <p:ph type="body" idx="1"/>
+          </p:nvPr>
+        </p:nvSpPr>
+        <p:spPr/>
+        <p:txBody>
+          <a:bodyPr/>
+          <a:lstStyle/>
+          <a:p>
+            <a:r>
+              <a:rPr lang="en-US" dirty="0"/>
+              <a:t>So mobbing has started to spread.</a:t>
+            </a:r>
+          </a:p>
+          <a:p>
+            <a:r>
+              <a:rPr lang="en-US" dirty="0"/>
+              <a:t>It works in multiple teams</a:t>
+            </a:r>
+          </a:p>
+          <a:p>
+            <a:r>
+              <a:rPr lang="en-US" dirty="0"/>
+              <a:t>It helps teams and those on the edge of teams, like myself as a tech lead.</a:t>
+            </a:r>
+          </a:p>
+          <a:p>
+            <a:endParaRPr lang="en-US" dirty="0"/>
+          </a:p>
+          <a:p>
+            <a:r>
+              <a:rPr lang="en-US" dirty="0"/>
+              <a:t>But a flaw was that we got fixated on mobbing as being the only way to work.</a:t>
+            </a:r>
+          </a:p>
+          <a:p>
+            <a:r>
+              <a:rPr lang="en-US" dirty="0"/>
+              <a:t>We had a hammer, and everything we saw was a nail.</a:t>
+            </a:r>
+          </a:p>
+          <a:p>
+            <a:endParaRPr lang="en-US" dirty="0"/>
+          </a:p>
+          <a:p>
+            <a:r>
+              <a:rPr lang="en-US" dirty="0"/>
+              <a:t>We got better when we started treating mobbing as a tool, </a:t>
+            </a:r>
+          </a:p>
+          <a:p>
+            <a:r>
+              <a:rPr lang="en-US" dirty="0"/>
+              <a:t>and continually thinking: what size team is right </a:t>
+            </a:r>
+            <a:r>
+              <a:rPr lang="en-US"/>
+              <a:t>for this job, right now</a:t>
+            </a:r>
+            <a:endParaRPr lang="en-US" dirty="0"/>
+          </a:p>
+        </p:txBody>
+      </p:sp>
+      <p:sp>
+        <p:nvSpPr>
+          <p:cNvPr id="4" name="Slide Number Placeholder 3"/>
+          <p:cNvSpPr>
+            <a:spLocks noGrp="1"/>
+          </p:cNvSpPr>
+          <p:nvPr>
+            <p:ph type="sldNum" sz="quarter" idx="5"/>
+          </p:nvPr>
+        </p:nvSpPr>
+        <p:spPr/>
+        <p:txBody>
+          <a:bodyPr/>
+          <a:lstStyle/>
+          <a:p>
+            <a:fld id="{B99E8012-7AEC-4AAD-B52C-DF7E1601EEFE}" type="slidenum">
+              <a:rPr lang="en-GB" smtClean="0"/>
+              <a:t>39</a:t>
+            </a:fld>
+            <a:endParaRPr lang="en-GB"/>
+          </a:p>
+        </p:txBody>
+      </p:sp>
+    </p:spTree>
+    <p:extLst>
+      <p:ext uri="{BB962C8B-B14F-4D97-AF65-F5344CB8AC3E}">
+        <p14:creationId xmlns:p14="http://schemas.microsoft.com/office/powerpoint/2010/main" val="1882471405"/>
       </p:ext>
     </p:extLst>
   </p:cSld>

</xml_diff>

<commit_message>
Notes for mob 3
</commit_message>
<xml_diff>
--- a/a-mob-mentality.pptx
+++ b/a-mob-mentality.pptx
@@ -5,10 +5,10 @@
     <p:sldMasterId id="2147483648" r:id="rId4"/>
   </p:sldMasterIdLst>
   <p:notesMasterIdLst>
-    <p:notesMasterId r:id="rId63"/>
+    <p:notesMasterId r:id="rId64"/>
   </p:notesMasterIdLst>
   <p:handoutMasterIdLst>
-    <p:handoutMasterId r:id="rId64"/>
+    <p:handoutMasterId r:id="rId65"/>
   </p:handoutMasterIdLst>
   <p:sldIdLst>
     <p:sldId id="314" r:id="rId5"/>
@@ -57,18 +57,19 @@
     <p:sldId id="360" r:id="rId48"/>
     <p:sldId id="362" r:id="rId49"/>
     <p:sldId id="361" r:id="rId50"/>
-    <p:sldId id="363" r:id="rId51"/>
-    <p:sldId id="364" r:id="rId52"/>
-    <p:sldId id="365" r:id="rId53"/>
-    <p:sldId id="368" r:id="rId54"/>
-    <p:sldId id="367" r:id="rId55"/>
-    <p:sldId id="370" r:id="rId56"/>
-    <p:sldId id="369" r:id="rId57"/>
-    <p:sldId id="371" r:id="rId58"/>
-    <p:sldId id="372" r:id="rId59"/>
-    <p:sldId id="373" r:id="rId60"/>
-    <p:sldId id="374" r:id="rId61"/>
-    <p:sldId id="375" r:id="rId62"/>
+    <p:sldId id="376" r:id="rId51"/>
+    <p:sldId id="363" r:id="rId52"/>
+    <p:sldId id="364" r:id="rId53"/>
+    <p:sldId id="365" r:id="rId54"/>
+    <p:sldId id="368" r:id="rId55"/>
+    <p:sldId id="367" r:id="rId56"/>
+    <p:sldId id="370" r:id="rId57"/>
+    <p:sldId id="369" r:id="rId58"/>
+    <p:sldId id="371" r:id="rId59"/>
+    <p:sldId id="372" r:id="rId60"/>
+    <p:sldId id="373" r:id="rId61"/>
+    <p:sldId id="374" r:id="rId62"/>
+    <p:sldId id="375" r:id="rId63"/>
   </p:sldIdLst>
   <p:sldSz cx="12192000" cy="6858000"/>
   <p:notesSz cx="6858000" cy="9144000"/>
@@ -271,7 +272,7 @@
           <a:p>
             <a:fld id="{7BBE8AEC-3485-8F42-8DAA-65AC687FA28D}" type="datetimeFigureOut">
               <a:rPr lang="en-US" smtClean="0"/>
-              <a:t>9/25/19</a:t>
+              <a:t>9/26/19</a:t>
             </a:fld>
             <a:endParaRPr lang="en-US"/>
           </a:p>
@@ -436,7 +437,7 @@
           <a:p>
             <a:fld id="{F8C37668-4783-4882-B2E6-3A4D0BC25785}" type="datetimeFigureOut">
               <a:rPr lang="en-GB" smtClean="0"/>
-              <a:t>25/09/2019</a:t>
+              <a:t>26/09/2019</a:t>
             </a:fld>
             <a:endParaRPr lang="en-GB"/>
           </a:p>
@@ -2298,7 +2299,9 @@
               <a:rPr lang="en-GB" dirty="0"/>
               <a:t>Code reviews in real time instead of a bottleneck</a:t>
             </a:r>
-            <a:endParaRPr lang="en-US" dirty="0"/>
+          </a:p>
+          <a:p>
+            <a:endParaRPr lang="en-GB" dirty="0"/>
           </a:p>
         </p:txBody>
       </p:sp>
@@ -4415,13 +4418,8 @@
           <a:p>
             <a:r>
               <a:rPr lang="en-US" dirty="0"/>
-              <a:t>and continually thinking: what size team is right </a:t>
-            </a:r>
-            <a:r>
-              <a:rPr lang="en-US"/>
-              <a:t>for this job, right now</a:t>
-            </a:r>
-            <a:endParaRPr lang="en-US" dirty="0"/>
+              <a:t>and continually thinking: what size team is right for this job, right now</a:t>
+            </a:r>
           </a:p>
         </p:txBody>
       </p:sp>
@@ -4551,6 +4549,1095 @@
 </p:notes>
 </file>
 
+<file path=ppt/notesSlides/notesSlide40.xml><?xml version="1.0" encoding="utf-8"?>
+<p:notes xmlns:a="http://schemas.openxmlformats.org/drawingml/2006/main" xmlns:r="http://schemas.openxmlformats.org/officeDocument/2006/relationships" xmlns:p="http://schemas.openxmlformats.org/presentationml/2006/main">
+  <p:cSld>
+    <p:spTree>
+      <p:nvGrpSpPr>
+        <p:cNvPr id="1" name=""/>
+        <p:cNvGrpSpPr/>
+        <p:nvPr/>
+      </p:nvGrpSpPr>
+      <p:grpSpPr>
+        <a:xfrm>
+          <a:off x="0" y="0"/>
+          <a:ext cx="0" cy="0"/>
+          <a:chOff x="0" y="0"/>
+          <a:chExt cx="0" cy="0"/>
+        </a:xfrm>
+      </p:grpSpPr>
+      <p:sp>
+        <p:nvSpPr>
+          <p:cNvPr id="2" name="Slide Image Placeholder 1"/>
+          <p:cNvSpPr>
+            <a:spLocks noGrp="1" noRot="1" noChangeAspect="1"/>
+          </p:cNvSpPr>
+          <p:nvPr>
+            <p:ph type="sldImg"/>
+          </p:nvPr>
+        </p:nvSpPr>
+        <p:spPr/>
+      </p:sp>
+      <p:sp>
+        <p:nvSpPr>
+          <p:cNvPr id="3" name="Notes Placeholder 2"/>
+          <p:cNvSpPr>
+            <a:spLocks noGrp="1"/>
+          </p:cNvSpPr>
+          <p:nvPr>
+            <p:ph type="body" idx="1"/>
+          </p:nvPr>
+        </p:nvSpPr>
+        <p:spPr/>
+        <p:txBody>
+          <a:bodyPr/>
+          <a:lstStyle/>
+          <a:p>
+            <a:r>
+              <a:rPr lang="en-US" dirty="0"/>
+              <a:t>So the next mob isn’t a team in the traditional sense</a:t>
+            </a:r>
+          </a:p>
+          <a:p>
+            <a:r>
+              <a:rPr lang="en-US" dirty="0"/>
+              <a:t>It's a coding dojo</a:t>
+            </a:r>
+          </a:p>
+        </p:txBody>
+      </p:sp>
+      <p:sp>
+        <p:nvSpPr>
+          <p:cNvPr id="4" name="Slide Number Placeholder 3"/>
+          <p:cNvSpPr>
+            <a:spLocks noGrp="1"/>
+          </p:cNvSpPr>
+          <p:nvPr>
+            <p:ph type="sldNum" sz="quarter" idx="5"/>
+          </p:nvPr>
+        </p:nvSpPr>
+        <p:spPr/>
+        <p:txBody>
+          <a:bodyPr/>
+          <a:lstStyle/>
+          <a:p>
+            <a:fld id="{B99E8012-7AEC-4AAD-B52C-DF7E1601EEFE}" type="slidenum">
+              <a:rPr lang="en-GB" smtClean="0"/>
+              <a:t>40</a:t>
+            </a:fld>
+            <a:endParaRPr lang="en-GB"/>
+          </a:p>
+        </p:txBody>
+      </p:sp>
+    </p:spTree>
+    <p:extLst>
+      <p:ext uri="{BB962C8B-B14F-4D97-AF65-F5344CB8AC3E}">
+        <p14:creationId xmlns:p14="http://schemas.microsoft.com/office/powerpoint/2010/main" val="2646008818"/>
+      </p:ext>
+    </p:extLst>
+  </p:cSld>
+  <p:clrMapOvr>
+    <a:masterClrMapping/>
+  </p:clrMapOvr>
+</p:notes>
+</file>
+
+<file path=ppt/notesSlides/notesSlide41.xml><?xml version="1.0" encoding="utf-8"?>
+<p:notes xmlns:a="http://schemas.openxmlformats.org/drawingml/2006/main" xmlns:r="http://schemas.openxmlformats.org/officeDocument/2006/relationships" xmlns:p="http://schemas.openxmlformats.org/presentationml/2006/main">
+  <p:cSld>
+    <p:spTree>
+      <p:nvGrpSpPr>
+        <p:cNvPr id="1" name=""/>
+        <p:cNvGrpSpPr/>
+        <p:nvPr/>
+      </p:nvGrpSpPr>
+      <p:grpSpPr>
+        <a:xfrm>
+          <a:off x="0" y="0"/>
+          <a:ext cx="0" cy="0"/>
+          <a:chOff x="0" y="0"/>
+          <a:chExt cx="0" cy="0"/>
+        </a:xfrm>
+      </p:grpSpPr>
+      <p:sp>
+        <p:nvSpPr>
+          <p:cNvPr id="2" name="Slide Image Placeholder 1"/>
+          <p:cNvSpPr>
+            <a:spLocks noGrp="1" noRot="1" noChangeAspect="1"/>
+          </p:cNvSpPr>
+          <p:nvPr>
+            <p:ph type="sldImg"/>
+          </p:nvPr>
+        </p:nvSpPr>
+        <p:spPr/>
+      </p:sp>
+      <p:sp>
+        <p:nvSpPr>
+          <p:cNvPr id="3" name="Notes Placeholder 2"/>
+          <p:cNvSpPr>
+            <a:spLocks noGrp="1"/>
+          </p:cNvSpPr>
+          <p:nvPr>
+            <p:ph type="body" idx="1"/>
+          </p:nvPr>
+        </p:nvSpPr>
+        <p:spPr/>
+        <p:txBody>
+          <a:bodyPr/>
+          <a:lstStyle/>
+          <a:p>
+            <a:r>
+              <a:rPr lang="en-US" dirty="0"/>
+              <a:t>A coding dojo is where people get together to practice programming.</a:t>
+            </a:r>
+          </a:p>
+          <a:p>
+            <a:endParaRPr lang="en-US" dirty="0"/>
+          </a:p>
+          <a:p>
+            <a:r>
+              <a:rPr lang="en-US" dirty="0"/>
+              <a:t>They do it to learn, to teach, and to have fun.</a:t>
+            </a:r>
+          </a:p>
+          <a:p>
+            <a:endParaRPr lang="en-US" dirty="0"/>
+          </a:p>
+          <a:p>
+            <a:r>
+              <a:rPr lang="en-US" dirty="0"/>
+              <a:t>Earlier this year I setup a dojo in my office</a:t>
+            </a:r>
+            <a:br>
+              <a:rPr lang="en-US" dirty="0"/>
+            </a:br>
+            <a:r>
+              <a:rPr lang="en-US" dirty="0"/>
+              <a:t>It runs every Friday for 90 minutes</a:t>
+            </a:r>
+          </a:p>
+          <a:p>
+            <a:r>
+              <a:rPr lang="en-US" dirty="0"/>
+              <a:t>People from around the company come along</a:t>
+            </a:r>
+          </a:p>
+          <a:p>
+            <a:r>
+              <a:rPr lang="en-US" dirty="0"/>
+              <a:t>We work on katas, which are small programming challenges, together.</a:t>
+            </a:r>
+          </a:p>
+        </p:txBody>
+      </p:sp>
+      <p:sp>
+        <p:nvSpPr>
+          <p:cNvPr id="4" name="Slide Number Placeholder 3"/>
+          <p:cNvSpPr>
+            <a:spLocks noGrp="1"/>
+          </p:cNvSpPr>
+          <p:nvPr>
+            <p:ph type="sldNum" sz="quarter" idx="5"/>
+          </p:nvPr>
+        </p:nvSpPr>
+        <p:spPr/>
+        <p:txBody>
+          <a:bodyPr/>
+          <a:lstStyle/>
+          <a:p>
+            <a:fld id="{B99E8012-7AEC-4AAD-B52C-DF7E1601EEFE}" type="slidenum">
+              <a:rPr lang="en-GB" smtClean="0"/>
+              <a:t>41</a:t>
+            </a:fld>
+            <a:endParaRPr lang="en-GB"/>
+          </a:p>
+        </p:txBody>
+      </p:sp>
+    </p:spTree>
+    <p:extLst>
+      <p:ext uri="{BB962C8B-B14F-4D97-AF65-F5344CB8AC3E}">
+        <p14:creationId xmlns:p14="http://schemas.microsoft.com/office/powerpoint/2010/main" val="3777598625"/>
+      </p:ext>
+    </p:extLst>
+  </p:cSld>
+  <p:clrMapOvr>
+    <a:masterClrMapping/>
+  </p:clrMapOvr>
+</p:notes>
+</file>
+
+<file path=ppt/notesSlides/notesSlide42.xml><?xml version="1.0" encoding="utf-8"?>
+<p:notes xmlns:a="http://schemas.openxmlformats.org/drawingml/2006/main" xmlns:r="http://schemas.openxmlformats.org/officeDocument/2006/relationships" xmlns:p="http://schemas.openxmlformats.org/presentationml/2006/main">
+  <p:cSld>
+    <p:spTree>
+      <p:nvGrpSpPr>
+        <p:cNvPr id="1" name=""/>
+        <p:cNvGrpSpPr/>
+        <p:nvPr/>
+      </p:nvGrpSpPr>
+      <p:grpSpPr>
+        <a:xfrm>
+          <a:off x="0" y="0"/>
+          <a:ext cx="0" cy="0"/>
+          <a:chOff x="0" y="0"/>
+          <a:chExt cx="0" cy="0"/>
+        </a:xfrm>
+      </p:grpSpPr>
+      <p:sp>
+        <p:nvSpPr>
+          <p:cNvPr id="2" name="Slide Image Placeholder 1"/>
+          <p:cNvSpPr>
+            <a:spLocks noGrp="1" noRot="1" noChangeAspect="1"/>
+          </p:cNvSpPr>
+          <p:nvPr>
+            <p:ph type="sldImg"/>
+          </p:nvPr>
+        </p:nvSpPr>
+        <p:spPr/>
+      </p:sp>
+      <p:sp>
+        <p:nvSpPr>
+          <p:cNvPr id="3" name="Notes Placeholder 2"/>
+          <p:cNvSpPr>
+            <a:spLocks noGrp="1"/>
+          </p:cNvSpPr>
+          <p:nvPr>
+            <p:ph type="body" idx="1"/>
+          </p:nvPr>
+        </p:nvSpPr>
+        <p:spPr/>
+        <p:txBody>
+          <a:bodyPr/>
+          <a:lstStyle/>
+          <a:p>
+            <a:endParaRPr lang="en-US" dirty="0"/>
+          </a:p>
+          <a:p>
+            <a:r>
+              <a:rPr lang="en-US" dirty="0"/>
+              <a:t>A lot of dojos will have people working on their own, or pairing</a:t>
+            </a:r>
+          </a:p>
+          <a:p>
+            <a:r>
+              <a:rPr lang="en-US" dirty="0"/>
+              <a:t>But by now, mobbing has spread around the company</a:t>
+            </a:r>
+          </a:p>
+          <a:p>
+            <a:r>
+              <a:rPr lang="en-US" dirty="0"/>
+              <a:t>Most people who come along to the dojo will be used to mobbing regularly, or at least have tried it.</a:t>
+            </a:r>
+          </a:p>
+          <a:p>
+            <a:endParaRPr lang="en-US" dirty="0"/>
+          </a:p>
+          <a:p>
+            <a:r>
+              <a:rPr lang="en-US" dirty="0"/>
+              <a:t>So I thought, let’s try mobbing in the dojo.</a:t>
+            </a:r>
+          </a:p>
+          <a:p>
+            <a:r>
+              <a:rPr lang="en-US" dirty="0"/>
+              <a:t>And it worked really well, for the reasons I’ve talked about earlier.</a:t>
+            </a:r>
+          </a:p>
+          <a:p>
+            <a:r>
+              <a:rPr lang="en-US" dirty="0"/>
+              <a:t>Especially in a coding dojo, it accelerates the learning process.</a:t>
+            </a:r>
+          </a:p>
+          <a:p>
+            <a:endParaRPr lang="en-US" dirty="0"/>
+          </a:p>
+        </p:txBody>
+      </p:sp>
+      <p:sp>
+        <p:nvSpPr>
+          <p:cNvPr id="4" name="Slide Number Placeholder 3"/>
+          <p:cNvSpPr>
+            <a:spLocks noGrp="1"/>
+          </p:cNvSpPr>
+          <p:nvPr>
+            <p:ph type="sldNum" sz="quarter" idx="5"/>
+          </p:nvPr>
+        </p:nvSpPr>
+        <p:spPr/>
+        <p:txBody>
+          <a:bodyPr/>
+          <a:lstStyle/>
+          <a:p>
+            <a:fld id="{B99E8012-7AEC-4AAD-B52C-DF7E1601EEFE}" type="slidenum">
+              <a:rPr lang="en-GB" smtClean="0"/>
+              <a:t>42</a:t>
+            </a:fld>
+            <a:endParaRPr lang="en-GB"/>
+          </a:p>
+        </p:txBody>
+      </p:sp>
+    </p:spTree>
+    <p:extLst>
+      <p:ext uri="{BB962C8B-B14F-4D97-AF65-F5344CB8AC3E}">
+        <p14:creationId xmlns:p14="http://schemas.microsoft.com/office/powerpoint/2010/main" val="1279985005"/>
+      </p:ext>
+    </p:extLst>
+  </p:cSld>
+  <p:clrMapOvr>
+    <a:masterClrMapping/>
+  </p:clrMapOvr>
+</p:notes>
+</file>
+
+<file path=ppt/notesSlides/notesSlide43.xml><?xml version="1.0" encoding="utf-8"?>
+<p:notes xmlns:a="http://schemas.openxmlformats.org/drawingml/2006/main" xmlns:r="http://schemas.openxmlformats.org/officeDocument/2006/relationships" xmlns:p="http://schemas.openxmlformats.org/presentationml/2006/main">
+  <p:cSld>
+    <p:spTree>
+      <p:nvGrpSpPr>
+        <p:cNvPr id="1" name=""/>
+        <p:cNvGrpSpPr/>
+        <p:nvPr/>
+      </p:nvGrpSpPr>
+      <p:grpSpPr>
+        <a:xfrm>
+          <a:off x="0" y="0"/>
+          <a:ext cx="0" cy="0"/>
+          <a:chOff x="0" y="0"/>
+          <a:chExt cx="0" cy="0"/>
+        </a:xfrm>
+      </p:grpSpPr>
+      <p:sp>
+        <p:nvSpPr>
+          <p:cNvPr id="2" name="Slide Image Placeholder 1"/>
+          <p:cNvSpPr>
+            <a:spLocks noGrp="1" noRot="1" noChangeAspect="1"/>
+          </p:cNvSpPr>
+          <p:nvPr>
+            <p:ph type="sldImg"/>
+          </p:nvPr>
+        </p:nvSpPr>
+        <p:spPr/>
+      </p:sp>
+      <p:sp>
+        <p:nvSpPr>
+          <p:cNvPr id="3" name="Notes Placeholder 2"/>
+          <p:cNvSpPr>
+            <a:spLocks noGrp="1"/>
+          </p:cNvSpPr>
+          <p:nvPr>
+            <p:ph type="body" idx="1"/>
+          </p:nvPr>
+        </p:nvSpPr>
+        <p:spPr/>
+        <p:txBody>
+          <a:bodyPr/>
+          <a:lstStyle/>
+          <a:p>
+            <a:r>
+              <a:rPr lang="en-US" dirty="0"/>
+              <a:t>But a coding dojo is different to a normal team environment</a:t>
+            </a:r>
+          </a:p>
+          <a:p>
+            <a:endParaRPr lang="en-US" dirty="0"/>
+          </a:p>
+        </p:txBody>
+      </p:sp>
+      <p:sp>
+        <p:nvSpPr>
+          <p:cNvPr id="4" name="Slide Number Placeholder 3"/>
+          <p:cNvSpPr>
+            <a:spLocks noGrp="1"/>
+          </p:cNvSpPr>
+          <p:nvPr>
+            <p:ph type="sldNum" sz="quarter" idx="5"/>
+          </p:nvPr>
+        </p:nvSpPr>
+        <p:spPr/>
+        <p:txBody>
+          <a:bodyPr/>
+          <a:lstStyle/>
+          <a:p>
+            <a:fld id="{B99E8012-7AEC-4AAD-B52C-DF7E1601EEFE}" type="slidenum">
+              <a:rPr lang="en-GB" smtClean="0"/>
+              <a:t>43</a:t>
+            </a:fld>
+            <a:endParaRPr lang="en-GB"/>
+          </a:p>
+        </p:txBody>
+      </p:sp>
+    </p:spTree>
+    <p:extLst>
+      <p:ext uri="{BB962C8B-B14F-4D97-AF65-F5344CB8AC3E}">
+        <p14:creationId xmlns:p14="http://schemas.microsoft.com/office/powerpoint/2010/main" val="3808849480"/>
+      </p:ext>
+    </p:extLst>
+  </p:cSld>
+  <p:clrMapOvr>
+    <a:masterClrMapping/>
+  </p:clrMapOvr>
+</p:notes>
+</file>
+
+<file path=ppt/notesSlides/notesSlide44.xml><?xml version="1.0" encoding="utf-8"?>
+<p:notes xmlns:a="http://schemas.openxmlformats.org/drawingml/2006/main" xmlns:r="http://schemas.openxmlformats.org/officeDocument/2006/relationships" xmlns:p="http://schemas.openxmlformats.org/presentationml/2006/main">
+  <p:cSld>
+    <p:spTree>
+      <p:nvGrpSpPr>
+        <p:cNvPr id="1" name=""/>
+        <p:cNvGrpSpPr/>
+        <p:nvPr/>
+      </p:nvGrpSpPr>
+      <p:grpSpPr>
+        <a:xfrm>
+          <a:off x="0" y="0"/>
+          <a:ext cx="0" cy="0"/>
+          <a:chOff x="0" y="0"/>
+          <a:chExt cx="0" cy="0"/>
+        </a:xfrm>
+      </p:grpSpPr>
+      <p:sp>
+        <p:nvSpPr>
+          <p:cNvPr id="2" name="Slide Image Placeholder 1"/>
+          <p:cNvSpPr>
+            <a:spLocks noGrp="1" noRot="1" noChangeAspect="1"/>
+          </p:cNvSpPr>
+          <p:nvPr>
+            <p:ph type="sldImg"/>
+          </p:nvPr>
+        </p:nvSpPr>
+        <p:spPr/>
+      </p:sp>
+      <p:sp>
+        <p:nvSpPr>
+          <p:cNvPr id="3" name="Notes Placeholder 2"/>
+          <p:cNvSpPr>
+            <a:spLocks noGrp="1"/>
+          </p:cNvSpPr>
+          <p:nvPr>
+            <p:ph type="body" idx="1"/>
+          </p:nvPr>
+        </p:nvSpPr>
+        <p:spPr/>
+        <p:txBody>
+          <a:bodyPr/>
+          <a:lstStyle/>
+          <a:p>
+            <a:r>
+              <a:rPr lang="en-US" dirty="0"/>
+              <a:t>First off, although there are some regulars, we get different people at most sessions.</a:t>
+            </a:r>
+          </a:p>
+          <a:p>
+            <a:r>
+              <a:rPr lang="en-US" dirty="0"/>
+              <a:t>So we have to be able to start working together quickly, because we only have 90 minutes</a:t>
+            </a:r>
+          </a:p>
+        </p:txBody>
+      </p:sp>
+      <p:sp>
+        <p:nvSpPr>
+          <p:cNvPr id="4" name="Slide Number Placeholder 3"/>
+          <p:cNvSpPr>
+            <a:spLocks noGrp="1"/>
+          </p:cNvSpPr>
+          <p:nvPr>
+            <p:ph type="sldNum" sz="quarter" idx="5"/>
+          </p:nvPr>
+        </p:nvSpPr>
+        <p:spPr/>
+        <p:txBody>
+          <a:bodyPr/>
+          <a:lstStyle/>
+          <a:p>
+            <a:fld id="{B99E8012-7AEC-4AAD-B52C-DF7E1601EEFE}" type="slidenum">
+              <a:rPr lang="en-GB" smtClean="0"/>
+              <a:t>44</a:t>
+            </a:fld>
+            <a:endParaRPr lang="en-GB"/>
+          </a:p>
+        </p:txBody>
+      </p:sp>
+    </p:spTree>
+    <p:extLst>
+      <p:ext uri="{BB962C8B-B14F-4D97-AF65-F5344CB8AC3E}">
+        <p14:creationId xmlns:p14="http://schemas.microsoft.com/office/powerpoint/2010/main" val="3363466588"/>
+      </p:ext>
+    </p:extLst>
+  </p:cSld>
+  <p:clrMapOvr>
+    <a:masterClrMapping/>
+  </p:clrMapOvr>
+</p:notes>
+</file>
+
+<file path=ppt/notesSlides/notesSlide45.xml><?xml version="1.0" encoding="utf-8"?>
+<p:notes xmlns:a="http://schemas.openxmlformats.org/drawingml/2006/main" xmlns:r="http://schemas.openxmlformats.org/officeDocument/2006/relationships" xmlns:p="http://schemas.openxmlformats.org/presentationml/2006/main">
+  <p:cSld>
+    <p:spTree>
+      <p:nvGrpSpPr>
+        <p:cNvPr id="1" name=""/>
+        <p:cNvGrpSpPr/>
+        <p:nvPr/>
+      </p:nvGrpSpPr>
+      <p:grpSpPr>
+        <a:xfrm>
+          <a:off x="0" y="0"/>
+          <a:ext cx="0" cy="0"/>
+          <a:chOff x="0" y="0"/>
+          <a:chExt cx="0" cy="0"/>
+        </a:xfrm>
+      </p:grpSpPr>
+      <p:sp>
+        <p:nvSpPr>
+          <p:cNvPr id="2" name="Slide Image Placeholder 1"/>
+          <p:cNvSpPr>
+            <a:spLocks noGrp="1" noRot="1" noChangeAspect="1"/>
+          </p:cNvSpPr>
+          <p:nvPr>
+            <p:ph type="sldImg"/>
+          </p:nvPr>
+        </p:nvSpPr>
+        <p:spPr/>
+      </p:sp>
+      <p:sp>
+        <p:nvSpPr>
+          <p:cNvPr id="3" name="Notes Placeholder 2"/>
+          <p:cNvSpPr>
+            <a:spLocks noGrp="1"/>
+          </p:cNvSpPr>
+          <p:nvPr>
+            <p:ph type="body" idx="1"/>
+          </p:nvPr>
+        </p:nvSpPr>
+        <p:spPr/>
+        <p:txBody>
+          <a:bodyPr/>
+          <a:lstStyle/>
+          <a:p>
+            <a:r>
+              <a:rPr lang="en-US" dirty="0"/>
+              <a:t>Also, imagine there’s only one person in the mob who understands how to solve a problem.</a:t>
+            </a:r>
+          </a:p>
+          <a:p>
+            <a:r>
+              <a:rPr lang="en-US" dirty="0"/>
+              <a:t>If that one person is doing all the talking, or maybe also doing the typing as well, it’s hard for the others to stay engaged.</a:t>
+            </a:r>
+          </a:p>
+          <a:p>
+            <a:endParaRPr lang="en-US" dirty="0"/>
+          </a:p>
+          <a:p>
+            <a:r>
+              <a:rPr lang="en-US" dirty="0"/>
+              <a:t>Woody Zuill, who was part of the first team that did mob programming, calls this “Programming Theatre”</a:t>
+            </a:r>
+          </a:p>
+          <a:p>
+            <a:endParaRPr lang="en-US" dirty="0"/>
+          </a:p>
+          <a:p>
+            <a:r>
+              <a:rPr lang="en-US" dirty="0"/>
+              <a:t>Now programming theatre is fine for, say a demo, where an expert  shares their knowledge.</a:t>
+            </a:r>
+          </a:p>
+          <a:p>
+            <a:r>
+              <a:rPr lang="en-US" dirty="0"/>
+              <a:t>But to get the best out of everyone, we’d rather everyone was involved.</a:t>
+            </a:r>
+          </a:p>
+        </p:txBody>
+      </p:sp>
+      <p:sp>
+        <p:nvSpPr>
+          <p:cNvPr id="4" name="Slide Number Placeholder 3"/>
+          <p:cNvSpPr>
+            <a:spLocks noGrp="1"/>
+          </p:cNvSpPr>
+          <p:nvPr>
+            <p:ph type="sldNum" sz="quarter" idx="5"/>
+          </p:nvPr>
+        </p:nvSpPr>
+        <p:spPr/>
+        <p:txBody>
+          <a:bodyPr/>
+          <a:lstStyle/>
+          <a:p>
+            <a:fld id="{B99E8012-7AEC-4AAD-B52C-DF7E1601EEFE}" type="slidenum">
+              <a:rPr lang="en-GB" smtClean="0"/>
+              <a:t>45</a:t>
+            </a:fld>
+            <a:endParaRPr lang="en-GB"/>
+          </a:p>
+        </p:txBody>
+      </p:sp>
+    </p:spTree>
+    <p:extLst>
+      <p:ext uri="{BB962C8B-B14F-4D97-AF65-F5344CB8AC3E}">
+        <p14:creationId xmlns:p14="http://schemas.microsoft.com/office/powerpoint/2010/main" val="1701095345"/>
+      </p:ext>
+    </p:extLst>
+  </p:cSld>
+  <p:clrMapOvr>
+    <a:masterClrMapping/>
+  </p:clrMapOvr>
+</p:notes>
+</file>
+
+<file path=ppt/notesSlides/notesSlide46.xml><?xml version="1.0" encoding="utf-8"?>
+<p:notes xmlns:a="http://schemas.openxmlformats.org/drawingml/2006/main" xmlns:r="http://schemas.openxmlformats.org/officeDocument/2006/relationships" xmlns:p="http://schemas.openxmlformats.org/presentationml/2006/main">
+  <p:cSld>
+    <p:spTree>
+      <p:nvGrpSpPr>
+        <p:cNvPr id="1" name=""/>
+        <p:cNvGrpSpPr/>
+        <p:nvPr/>
+      </p:nvGrpSpPr>
+      <p:grpSpPr>
+        <a:xfrm>
+          <a:off x="0" y="0"/>
+          <a:ext cx="0" cy="0"/>
+          <a:chOff x="0" y="0"/>
+          <a:chExt cx="0" cy="0"/>
+        </a:xfrm>
+      </p:grpSpPr>
+      <p:sp>
+        <p:nvSpPr>
+          <p:cNvPr id="2" name="Slide Image Placeholder 1"/>
+          <p:cNvSpPr>
+            <a:spLocks noGrp="1" noRot="1" noChangeAspect="1"/>
+          </p:cNvSpPr>
+          <p:nvPr>
+            <p:ph type="sldImg"/>
+          </p:nvPr>
+        </p:nvSpPr>
+        <p:spPr/>
+      </p:sp>
+      <p:sp>
+        <p:nvSpPr>
+          <p:cNvPr id="3" name="Notes Placeholder 2"/>
+          <p:cNvSpPr>
+            <a:spLocks noGrp="1"/>
+          </p:cNvSpPr>
+          <p:nvPr>
+            <p:ph type="body" idx="1"/>
+          </p:nvPr>
+        </p:nvSpPr>
+        <p:spPr/>
+        <p:txBody>
+          <a:bodyPr/>
+          <a:lstStyle/>
+          <a:p>
+            <a:r>
+              <a:rPr lang="en-US" dirty="0"/>
+              <a:t>It’s good for a mob to debate things.</a:t>
+            </a:r>
+          </a:p>
+          <a:p>
+            <a:r>
+              <a:rPr lang="en-US" dirty="0"/>
+              <a:t>That’s part of what makes mobbing useful</a:t>
+            </a:r>
+          </a:p>
+          <a:p>
+            <a:endParaRPr lang="en-US" dirty="0"/>
+          </a:p>
+          <a:p>
+            <a:r>
+              <a:rPr lang="en-US" dirty="0"/>
+              <a:t>But it’s especially important in a dojo, to not go on for too long., otherwise we’ll spend the entire dojo talking.</a:t>
+            </a:r>
+          </a:p>
+          <a:p>
+            <a:r>
+              <a:rPr lang="en-US" dirty="0"/>
+              <a:t>We need to be able to quickly come to a consensus.</a:t>
+            </a:r>
+          </a:p>
+        </p:txBody>
+      </p:sp>
+      <p:sp>
+        <p:nvSpPr>
+          <p:cNvPr id="4" name="Slide Number Placeholder 3"/>
+          <p:cNvSpPr>
+            <a:spLocks noGrp="1"/>
+          </p:cNvSpPr>
+          <p:nvPr>
+            <p:ph type="sldNum" sz="quarter" idx="5"/>
+          </p:nvPr>
+        </p:nvSpPr>
+        <p:spPr/>
+        <p:txBody>
+          <a:bodyPr/>
+          <a:lstStyle/>
+          <a:p>
+            <a:fld id="{B99E8012-7AEC-4AAD-B52C-DF7E1601EEFE}" type="slidenum">
+              <a:rPr lang="en-GB" smtClean="0"/>
+              <a:t>46</a:t>
+            </a:fld>
+            <a:endParaRPr lang="en-GB"/>
+          </a:p>
+        </p:txBody>
+      </p:sp>
+    </p:spTree>
+    <p:extLst>
+      <p:ext uri="{BB962C8B-B14F-4D97-AF65-F5344CB8AC3E}">
+        <p14:creationId xmlns:p14="http://schemas.microsoft.com/office/powerpoint/2010/main" val="2557750397"/>
+      </p:ext>
+    </p:extLst>
+  </p:cSld>
+  <p:clrMapOvr>
+    <a:masterClrMapping/>
+  </p:clrMapOvr>
+</p:notes>
+</file>
+
+<file path=ppt/notesSlides/notesSlide47.xml><?xml version="1.0" encoding="utf-8"?>
+<p:notes xmlns:a="http://schemas.openxmlformats.org/drawingml/2006/main" xmlns:r="http://schemas.openxmlformats.org/officeDocument/2006/relationships" xmlns:p="http://schemas.openxmlformats.org/presentationml/2006/main">
+  <p:cSld>
+    <p:spTree>
+      <p:nvGrpSpPr>
+        <p:cNvPr id="1" name=""/>
+        <p:cNvGrpSpPr/>
+        <p:nvPr/>
+      </p:nvGrpSpPr>
+      <p:grpSpPr>
+        <a:xfrm>
+          <a:off x="0" y="0"/>
+          <a:ext cx="0" cy="0"/>
+          <a:chOff x="0" y="0"/>
+          <a:chExt cx="0" cy="0"/>
+        </a:xfrm>
+      </p:grpSpPr>
+      <p:sp>
+        <p:nvSpPr>
+          <p:cNvPr id="2" name="Slide Image Placeholder 1"/>
+          <p:cNvSpPr>
+            <a:spLocks noGrp="1" noRot="1" noChangeAspect="1"/>
+          </p:cNvSpPr>
+          <p:nvPr>
+            <p:ph type="sldImg"/>
+          </p:nvPr>
+        </p:nvSpPr>
+        <p:spPr/>
+      </p:sp>
+      <p:sp>
+        <p:nvSpPr>
+          <p:cNvPr id="3" name="Notes Placeholder 2"/>
+          <p:cNvSpPr>
+            <a:spLocks noGrp="1"/>
+          </p:cNvSpPr>
+          <p:nvPr>
+            <p:ph type="body" idx="1"/>
+          </p:nvPr>
+        </p:nvSpPr>
+        <p:spPr/>
+        <p:txBody>
+          <a:bodyPr/>
+          <a:lstStyle/>
+          <a:p>
+            <a:r>
+              <a:rPr lang="en-US" dirty="0"/>
+              <a:t>So as before, we changed how we mobbed to try and address these issues.</a:t>
+            </a:r>
+          </a:p>
+          <a:p>
+            <a:endParaRPr lang="en-US" dirty="0"/>
+          </a:p>
+        </p:txBody>
+      </p:sp>
+      <p:sp>
+        <p:nvSpPr>
+          <p:cNvPr id="4" name="Slide Number Placeholder 3"/>
+          <p:cNvSpPr>
+            <a:spLocks noGrp="1"/>
+          </p:cNvSpPr>
+          <p:nvPr>
+            <p:ph type="sldNum" sz="quarter" idx="5"/>
+          </p:nvPr>
+        </p:nvSpPr>
+        <p:spPr/>
+        <p:txBody>
+          <a:bodyPr/>
+          <a:lstStyle/>
+          <a:p>
+            <a:fld id="{B99E8012-7AEC-4AAD-B52C-DF7E1601EEFE}" type="slidenum">
+              <a:rPr lang="en-GB" smtClean="0"/>
+              <a:t>47</a:t>
+            </a:fld>
+            <a:endParaRPr lang="en-GB"/>
+          </a:p>
+        </p:txBody>
+      </p:sp>
+    </p:spTree>
+    <p:extLst>
+      <p:ext uri="{BB962C8B-B14F-4D97-AF65-F5344CB8AC3E}">
+        <p14:creationId xmlns:p14="http://schemas.microsoft.com/office/powerpoint/2010/main" val="658665075"/>
+      </p:ext>
+    </p:extLst>
+  </p:cSld>
+  <p:clrMapOvr>
+    <a:masterClrMapping/>
+  </p:clrMapOvr>
+</p:notes>
+</file>
+
+<file path=ppt/notesSlides/notesSlide48.xml><?xml version="1.0" encoding="utf-8"?>
+<p:notes xmlns:a="http://schemas.openxmlformats.org/drawingml/2006/main" xmlns:r="http://schemas.openxmlformats.org/officeDocument/2006/relationships" xmlns:p="http://schemas.openxmlformats.org/presentationml/2006/main">
+  <p:cSld>
+    <p:spTree>
+      <p:nvGrpSpPr>
+        <p:cNvPr id="1" name=""/>
+        <p:cNvGrpSpPr/>
+        <p:nvPr/>
+      </p:nvGrpSpPr>
+      <p:grpSpPr>
+        <a:xfrm>
+          <a:off x="0" y="0"/>
+          <a:ext cx="0" cy="0"/>
+          <a:chOff x="0" y="0"/>
+          <a:chExt cx="0" cy="0"/>
+        </a:xfrm>
+      </p:grpSpPr>
+      <p:sp>
+        <p:nvSpPr>
+          <p:cNvPr id="2" name="Slide Image Placeholder 1"/>
+          <p:cNvSpPr>
+            <a:spLocks noGrp="1" noRot="1" noChangeAspect="1"/>
+          </p:cNvSpPr>
+          <p:nvPr>
+            <p:ph type="sldImg"/>
+          </p:nvPr>
+        </p:nvSpPr>
+        <p:spPr/>
+      </p:sp>
+      <p:sp>
+        <p:nvSpPr>
+          <p:cNvPr id="3" name="Notes Placeholder 2"/>
+          <p:cNvSpPr>
+            <a:spLocks noGrp="1"/>
+          </p:cNvSpPr>
+          <p:nvPr>
+            <p:ph type="body" idx="1"/>
+          </p:nvPr>
+        </p:nvSpPr>
+        <p:spPr/>
+        <p:txBody>
+          <a:bodyPr/>
+          <a:lstStyle/>
+          <a:p>
+            <a:r>
+              <a:rPr lang="en-US" dirty="0"/>
+              <a:t>Strong style is a technique where you make the roles of the driver, who types, and the navigator, who says what to to, strict.</a:t>
+            </a:r>
+          </a:p>
+          <a:p>
+            <a:r>
+              <a:rPr lang="en-US" dirty="0"/>
+              <a:t>The driver is just typing</a:t>
+            </a:r>
+          </a:p>
+          <a:p>
+            <a:endParaRPr lang="en-US" dirty="0"/>
+          </a:p>
+          <a:p>
+            <a:r>
+              <a:rPr lang="en-US" dirty="0"/>
+              <a:t>In the case where one person is the expert, when they’re driving, it encourages others to speak.</a:t>
+            </a:r>
+          </a:p>
+          <a:p>
+            <a:endParaRPr lang="en-US" dirty="0"/>
+          </a:p>
+        </p:txBody>
+      </p:sp>
+      <p:sp>
+        <p:nvSpPr>
+          <p:cNvPr id="4" name="Slide Number Placeholder 3"/>
+          <p:cNvSpPr>
+            <a:spLocks noGrp="1"/>
+          </p:cNvSpPr>
+          <p:nvPr>
+            <p:ph type="sldNum" sz="quarter" idx="5"/>
+          </p:nvPr>
+        </p:nvSpPr>
+        <p:spPr/>
+        <p:txBody>
+          <a:bodyPr/>
+          <a:lstStyle/>
+          <a:p>
+            <a:fld id="{B99E8012-7AEC-4AAD-B52C-DF7E1601EEFE}" type="slidenum">
+              <a:rPr lang="en-GB" smtClean="0"/>
+              <a:t>48</a:t>
+            </a:fld>
+            <a:endParaRPr lang="en-GB"/>
+          </a:p>
+        </p:txBody>
+      </p:sp>
+    </p:spTree>
+    <p:extLst>
+      <p:ext uri="{BB962C8B-B14F-4D97-AF65-F5344CB8AC3E}">
+        <p14:creationId xmlns:p14="http://schemas.microsoft.com/office/powerpoint/2010/main" val="1283256338"/>
+      </p:ext>
+    </p:extLst>
+  </p:cSld>
+  <p:clrMapOvr>
+    <a:masterClrMapping/>
+  </p:clrMapOvr>
+</p:notes>
+</file>
+
+<file path=ppt/notesSlides/notesSlide49.xml><?xml version="1.0" encoding="utf-8"?>
+<p:notes xmlns:a="http://schemas.openxmlformats.org/drawingml/2006/main" xmlns:r="http://schemas.openxmlformats.org/officeDocument/2006/relationships" xmlns:p="http://schemas.openxmlformats.org/presentationml/2006/main">
+  <p:cSld>
+    <p:spTree>
+      <p:nvGrpSpPr>
+        <p:cNvPr id="1" name=""/>
+        <p:cNvGrpSpPr/>
+        <p:nvPr/>
+      </p:nvGrpSpPr>
+      <p:grpSpPr>
+        <a:xfrm>
+          <a:off x="0" y="0"/>
+          <a:ext cx="0" cy="0"/>
+          <a:chOff x="0" y="0"/>
+          <a:chExt cx="0" cy="0"/>
+        </a:xfrm>
+      </p:grpSpPr>
+      <p:sp>
+        <p:nvSpPr>
+          <p:cNvPr id="2" name="Slide Image Placeholder 1"/>
+          <p:cNvSpPr>
+            <a:spLocks noGrp="1" noRot="1" noChangeAspect="1"/>
+          </p:cNvSpPr>
+          <p:nvPr>
+            <p:ph type="sldImg"/>
+          </p:nvPr>
+        </p:nvSpPr>
+        <p:spPr/>
+      </p:sp>
+      <p:sp>
+        <p:nvSpPr>
+          <p:cNvPr id="3" name="Notes Placeholder 2"/>
+          <p:cNvSpPr>
+            <a:spLocks noGrp="1"/>
+          </p:cNvSpPr>
+          <p:nvPr>
+            <p:ph type="body" idx="1"/>
+          </p:nvPr>
+        </p:nvSpPr>
+        <p:spPr/>
+        <p:txBody>
+          <a:bodyPr/>
+          <a:lstStyle/>
+          <a:p>
+            <a:r>
+              <a:rPr lang="en-US" dirty="0"/>
+              <a:t>As well as following rules more strictly, we also tried tweaking other rules.</a:t>
+            </a:r>
+          </a:p>
+          <a:p>
+            <a:endParaRPr lang="en-US" dirty="0"/>
+          </a:p>
+          <a:p>
+            <a:r>
+              <a:rPr lang="en-US" dirty="0" err="1"/>
+              <a:t>Wheras</a:t>
+            </a:r>
+            <a:r>
+              <a:rPr lang="en-US" dirty="0"/>
+              <a:t> in a normal team environment, we might swap the driver every 30 minutes or so,</a:t>
+            </a:r>
+          </a:p>
+          <a:p>
+            <a:r>
+              <a:rPr lang="en-US" dirty="0"/>
+              <a:t>In a dojo environment, we found shorter rotations, say 10 minutes were better to mix things up</a:t>
+            </a:r>
+          </a:p>
+          <a:p>
+            <a:endParaRPr lang="en-US" dirty="0"/>
+          </a:p>
+          <a:p>
+            <a:r>
+              <a:rPr lang="en-US" dirty="0"/>
+              <a:t>We also experimented with rules </a:t>
+            </a:r>
+            <a:r>
+              <a:rPr lang="en-US" dirty="0" err="1"/>
+              <a:t>thatmake</a:t>
+            </a:r>
+            <a:r>
+              <a:rPr lang="en-US" dirty="0"/>
+              <a:t> things fun but also each new </a:t>
+            </a:r>
+            <a:r>
+              <a:rPr lang="en-US" dirty="0" err="1"/>
+              <a:t>stkills</a:t>
+            </a:r>
+            <a:r>
+              <a:rPr lang="en-US" dirty="0"/>
+              <a:t>, like</a:t>
+            </a:r>
+          </a:p>
+          <a:p>
+            <a:r>
+              <a:rPr lang="en-US" dirty="0"/>
+              <a:t>today no using the mouse, we’ve got to figure out all of those keyboard shortcuts</a:t>
+            </a:r>
+          </a:p>
+          <a:p>
+            <a:r>
+              <a:rPr lang="en-US" dirty="0"/>
+              <a:t>today no if statements are allowed</a:t>
+            </a:r>
+          </a:p>
+        </p:txBody>
+      </p:sp>
+      <p:sp>
+        <p:nvSpPr>
+          <p:cNvPr id="4" name="Slide Number Placeholder 3"/>
+          <p:cNvSpPr>
+            <a:spLocks noGrp="1"/>
+          </p:cNvSpPr>
+          <p:nvPr>
+            <p:ph type="sldNum" sz="quarter" idx="5"/>
+          </p:nvPr>
+        </p:nvSpPr>
+        <p:spPr/>
+        <p:txBody>
+          <a:bodyPr/>
+          <a:lstStyle/>
+          <a:p>
+            <a:fld id="{B99E8012-7AEC-4AAD-B52C-DF7E1601EEFE}" type="slidenum">
+              <a:rPr lang="en-GB" smtClean="0"/>
+              <a:t>49</a:t>
+            </a:fld>
+            <a:endParaRPr lang="en-GB"/>
+          </a:p>
+        </p:txBody>
+      </p:sp>
+    </p:spTree>
+    <p:extLst>
+      <p:ext uri="{BB962C8B-B14F-4D97-AF65-F5344CB8AC3E}">
+        <p14:creationId xmlns:p14="http://schemas.microsoft.com/office/powerpoint/2010/main" val="3548995686"/>
+      </p:ext>
+    </p:extLst>
+  </p:cSld>
+  <p:clrMapOvr>
+    <a:masterClrMapping/>
+  </p:clrMapOvr>
+</p:notes>
+</file>
+
 <file path=ppt/notesSlides/notesSlide5.xml><?xml version="1.0" encoding="utf-8"?>
 <p:notes xmlns:a="http://schemas.openxmlformats.org/drawingml/2006/main" xmlns:r="http://schemas.openxmlformats.org/officeDocument/2006/relationships" xmlns:p="http://schemas.openxmlformats.org/presentationml/2006/main">
   <p:cSld>
@@ -4649,6 +5736,244 @@
     <p:extLst>
       <p:ext uri="{BB962C8B-B14F-4D97-AF65-F5344CB8AC3E}">
         <p14:creationId xmlns:p14="http://schemas.microsoft.com/office/powerpoint/2010/main" val="1745041807"/>
+      </p:ext>
+    </p:extLst>
+  </p:cSld>
+  <p:clrMapOvr>
+    <a:masterClrMapping/>
+  </p:clrMapOvr>
+</p:notes>
+</file>
+
+<file path=ppt/notesSlides/notesSlide50.xml><?xml version="1.0" encoding="utf-8"?>
+<p:notes xmlns:a="http://schemas.openxmlformats.org/drawingml/2006/main" xmlns:r="http://schemas.openxmlformats.org/officeDocument/2006/relationships" xmlns:p="http://schemas.openxmlformats.org/presentationml/2006/main">
+  <p:cSld>
+    <p:spTree>
+      <p:nvGrpSpPr>
+        <p:cNvPr id="1" name=""/>
+        <p:cNvGrpSpPr/>
+        <p:nvPr/>
+      </p:nvGrpSpPr>
+      <p:grpSpPr>
+        <a:xfrm>
+          <a:off x="0" y="0"/>
+          <a:ext cx="0" cy="0"/>
+          <a:chOff x="0" y="0"/>
+          <a:chExt cx="0" cy="0"/>
+        </a:xfrm>
+      </p:grpSpPr>
+      <p:sp>
+        <p:nvSpPr>
+          <p:cNvPr id="2" name="Slide Image Placeholder 1"/>
+          <p:cNvSpPr>
+            <a:spLocks noGrp="1" noRot="1" noChangeAspect="1"/>
+          </p:cNvSpPr>
+          <p:nvPr>
+            <p:ph type="sldImg"/>
+          </p:nvPr>
+        </p:nvSpPr>
+        <p:spPr/>
+      </p:sp>
+      <p:sp>
+        <p:nvSpPr>
+          <p:cNvPr id="3" name="Notes Placeholder 2"/>
+          <p:cNvSpPr>
+            <a:spLocks noGrp="1"/>
+          </p:cNvSpPr>
+          <p:nvPr>
+            <p:ph type="body" idx="1"/>
+          </p:nvPr>
+        </p:nvSpPr>
+        <p:spPr/>
+        <p:txBody>
+          <a:bodyPr/>
+          <a:lstStyle/>
+          <a:p>
+            <a:r>
+              <a:rPr lang="en-US" dirty="0"/>
+              <a:t>Like any other kind of meeting, a </a:t>
+            </a:r>
+            <a:r>
+              <a:rPr lang="en-US" dirty="0" err="1"/>
+              <a:t>faciltator</a:t>
+            </a:r>
+            <a:r>
+              <a:rPr lang="en-US" dirty="0"/>
+              <a:t> can get the best out of people</a:t>
+            </a:r>
+          </a:p>
+          <a:p>
+            <a:r>
+              <a:rPr lang="en-US" dirty="0"/>
+              <a:t>By having someone who’s taken a step back and guides the mob, they can find the best way of working, for them at that moment.</a:t>
+            </a:r>
+          </a:p>
+        </p:txBody>
+      </p:sp>
+      <p:sp>
+        <p:nvSpPr>
+          <p:cNvPr id="4" name="Slide Number Placeholder 3"/>
+          <p:cNvSpPr>
+            <a:spLocks noGrp="1"/>
+          </p:cNvSpPr>
+          <p:nvPr>
+            <p:ph type="sldNum" sz="quarter" idx="5"/>
+          </p:nvPr>
+        </p:nvSpPr>
+        <p:spPr/>
+        <p:txBody>
+          <a:bodyPr/>
+          <a:lstStyle/>
+          <a:p>
+            <a:fld id="{B99E8012-7AEC-4AAD-B52C-DF7E1601EEFE}" type="slidenum">
+              <a:rPr lang="en-GB" smtClean="0"/>
+              <a:t>50</a:t>
+            </a:fld>
+            <a:endParaRPr lang="en-GB"/>
+          </a:p>
+        </p:txBody>
+      </p:sp>
+    </p:spTree>
+    <p:extLst>
+      <p:ext uri="{BB962C8B-B14F-4D97-AF65-F5344CB8AC3E}">
+        <p14:creationId xmlns:p14="http://schemas.microsoft.com/office/powerpoint/2010/main" val="1829516419"/>
+      </p:ext>
+    </p:extLst>
+  </p:cSld>
+  <p:clrMapOvr>
+    <a:masterClrMapping/>
+  </p:clrMapOvr>
+</p:notes>
+</file>
+
+<file path=ppt/notesSlides/notesSlide51.xml><?xml version="1.0" encoding="utf-8"?>
+<p:notes xmlns:a="http://schemas.openxmlformats.org/drawingml/2006/main" xmlns:r="http://schemas.openxmlformats.org/officeDocument/2006/relationships" xmlns:p="http://schemas.openxmlformats.org/presentationml/2006/main">
+  <p:cSld>
+    <p:spTree>
+      <p:nvGrpSpPr>
+        <p:cNvPr id="1" name=""/>
+        <p:cNvGrpSpPr/>
+        <p:nvPr/>
+      </p:nvGrpSpPr>
+      <p:grpSpPr>
+        <a:xfrm>
+          <a:off x="0" y="0"/>
+          <a:ext cx="0" cy="0"/>
+          <a:chOff x="0" y="0"/>
+          <a:chExt cx="0" cy="0"/>
+        </a:xfrm>
+      </p:grpSpPr>
+      <p:sp>
+        <p:nvSpPr>
+          <p:cNvPr id="2" name="Slide Image Placeholder 1"/>
+          <p:cNvSpPr>
+            <a:spLocks noGrp="1" noRot="1" noChangeAspect="1"/>
+          </p:cNvSpPr>
+          <p:nvPr>
+            <p:ph type="sldImg"/>
+          </p:nvPr>
+        </p:nvSpPr>
+        <p:spPr/>
+      </p:sp>
+      <p:sp>
+        <p:nvSpPr>
+          <p:cNvPr id="3" name="Notes Placeholder 2"/>
+          <p:cNvSpPr>
+            <a:spLocks noGrp="1"/>
+          </p:cNvSpPr>
+          <p:nvPr>
+            <p:ph type="body" idx="1"/>
+          </p:nvPr>
+        </p:nvSpPr>
+        <p:spPr/>
+        <p:txBody>
+          <a:bodyPr/>
+          <a:lstStyle/>
+          <a:p>
+            <a:r>
+              <a:rPr lang="en-US" dirty="0"/>
+              <a:t>The dojo is a bit of an extreme situation: potentially strangers building something together in 90 minutes</a:t>
+            </a:r>
+          </a:p>
+          <a:p>
+            <a:r>
+              <a:rPr lang="en-US" dirty="0"/>
+              <a:t>But what we learned can be applied to normal teams, which is that we should experiment</a:t>
+            </a:r>
+          </a:p>
+          <a:p>
+            <a:endParaRPr lang="en-US" dirty="0"/>
+          </a:p>
+          <a:p>
+            <a:r>
+              <a:rPr lang="en-US" dirty="0"/>
+              <a:t>Every mob is different, so it makes sense to experiment and find the process that make your mob work the best.</a:t>
+            </a:r>
+          </a:p>
+          <a:p>
+            <a:r>
+              <a:rPr lang="en-US" dirty="0"/>
+              <a:t>And this process is continually evolving.</a:t>
+            </a:r>
+          </a:p>
+          <a:p>
+            <a:r>
+              <a:rPr lang="en-US" dirty="0"/>
+              <a:t>Good facilitation helps teams do this.</a:t>
+            </a:r>
+          </a:p>
+          <a:p>
+            <a:endParaRPr lang="en-US" dirty="0"/>
+          </a:p>
+          <a:p>
+            <a:r>
+              <a:rPr lang="en-US" dirty="0"/>
+              <a:t>The first bit of the agile manifesto says “We are uncovering better ways of developing software”</a:t>
+            </a:r>
+          </a:p>
+          <a:p>
+            <a:r>
+              <a:rPr lang="en-US" dirty="0"/>
+              <a:t>And what’s best for me may not </a:t>
+            </a:r>
+            <a:r>
+              <a:rPr lang="en-US"/>
+              <a:t>be what’s best for you.</a:t>
+            </a:r>
+            <a:endParaRPr lang="en-US" dirty="0"/>
+          </a:p>
+          <a:p>
+            <a:endParaRPr lang="en-US" dirty="0"/>
+          </a:p>
+        </p:txBody>
+      </p:sp>
+      <p:sp>
+        <p:nvSpPr>
+          <p:cNvPr id="4" name="Slide Number Placeholder 3"/>
+          <p:cNvSpPr>
+            <a:spLocks noGrp="1"/>
+          </p:cNvSpPr>
+          <p:nvPr>
+            <p:ph type="sldNum" sz="quarter" idx="5"/>
+          </p:nvPr>
+        </p:nvSpPr>
+        <p:spPr/>
+        <p:txBody>
+          <a:bodyPr/>
+          <a:lstStyle/>
+          <a:p>
+            <a:fld id="{B99E8012-7AEC-4AAD-B52C-DF7E1601EEFE}" type="slidenum">
+              <a:rPr lang="en-GB" smtClean="0"/>
+              <a:t>51</a:t>
+            </a:fld>
+            <a:endParaRPr lang="en-GB"/>
+          </a:p>
+        </p:txBody>
+      </p:sp>
+    </p:spTree>
+    <p:extLst>
+      <p:ext uri="{BB962C8B-B14F-4D97-AF65-F5344CB8AC3E}">
+        <p14:creationId xmlns:p14="http://schemas.microsoft.com/office/powerpoint/2010/main" val="804619200"/>
       </p:ext>
     </p:extLst>
   </p:cSld>
@@ -18783,7 +20108,7 @@
             <a:pPr algn="ctr"/>
             <a:r>
               <a:rPr lang="en-GB" sz="9600" dirty="0"/>
-              <a:t>Many Teams</a:t>
+              <a:t>Experienced</a:t>
             </a:r>
             <a:endParaRPr lang="en-GB" sz="7200" i="1" dirty="0"/>
           </a:p>
@@ -19212,8 +20537,8 @@
         </p:nvSpPr>
         <p:spPr>
           <a:xfrm>
-            <a:off x="1211464" y="3176198"/>
-            <a:ext cx="9769072" cy="505604"/>
+            <a:off x="1678346" y="3176198"/>
+            <a:ext cx="8835309" cy="505604"/>
           </a:xfrm>
         </p:spPr>
         <p:txBody>
@@ -19223,7 +20548,7 @@
             <a:pPr algn="ctr"/>
             <a:r>
               <a:rPr lang="en-GB" sz="9600" dirty="0"/>
-              <a:t>Strong Style 💪</a:t>
+              <a:t>Continuous Improvement</a:t>
             </a:r>
             <a:endParaRPr lang="en-GB" sz="7200" i="1" dirty="0"/>
           </a:p>
@@ -19234,7 +20559,7 @@
           <p:cNvPr id="5" name="Date Placeholder 4">
             <a:extLst>
               <a:ext uri="{FF2B5EF4-FFF2-40B4-BE49-F238E27FC236}">
-                <a16:creationId xmlns:a16="http://schemas.microsoft.com/office/drawing/2014/main" id="{DEC9A0F5-80F9-7E4A-9BFE-4B446ECF7BD6}"/>
+                <a16:creationId xmlns:a16="http://schemas.microsoft.com/office/drawing/2014/main" id="{F63CA60B-A483-7345-A8F7-831C696472D8}"/>
               </a:ext>
             </a:extLst>
           </p:cNvPr>
@@ -19261,7 +20586,7 @@
     </p:spTree>
     <p:extLst>
       <p:ext uri="{BB962C8B-B14F-4D97-AF65-F5344CB8AC3E}">
-        <p14:creationId xmlns:p14="http://schemas.microsoft.com/office/powerpoint/2010/main" val="1196197241"/>
+        <p14:creationId xmlns:p14="http://schemas.microsoft.com/office/powerpoint/2010/main" val="3823375212"/>
       </p:ext>
     </p:extLst>
   </p:cSld>
@@ -19311,7 +20636,7 @@
             <a:pPr algn="ctr"/>
             <a:r>
               <a:rPr lang="en-GB" sz="9600" dirty="0"/>
-              <a:t>Tweak Rules❗</a:t>
+              <a:t>Strong Style 💪</a:t>
             </a:r>
             <a:endParaRPr lang="en-GB" sz="7200" i="1" dirty="0"/>
           </a:p>
@@ -19322,7 +20647,7 @@
           <p:cNvPr id="5" name="Date Placeholder 4">
             <a:extLst>
               <a:ext uri="{FF2B5EF4-FFF2-40B4-BE49-F238E27FC236}">
-                <a16:creationId xmlns:a16="http://schemas.microsoft.com/office/drawing/2014/main" id="{416E96E3-EB76-9A4D-A574-4070FDFC3701}"/>
+                <a16:creationId xmlns:a16="http://schemas.microsoft.com/office/drawing/2014/main" id="{DEC9A0F5-80F9-7E4A-9BFE-4B446ECF7BD6}"/>
               </a:ext>
             </a:extLst>
           </p:cNvPr>
@@ -19349,7 +20674,7 @@
     </p:spTree>
     <p:extLst>
       <p:ext uri="{BB962C8B-B14F-4D97-AF65-F5344CB8AC3E}">
-        <p14:creationId xmlns:p14="http://schemas.microsoft.com/office/powerpoint/2010/main" val="242817773"/>
+        <p14:creationId xmlns:p14="http://schemas.microsoft.com/office/powerpoint/2010/main" val="1196197241"/>
       </p:ext>
     </p:extLst>
   </p:cSld>
@@ -19399,11 +20724,7 @@
             <a:pPr algn="ctr"/>
             <a:r>
               <a:rPr lang="en-GB" sz="9600" dirty="0"/>
-              <a:t>Facilitation </a:t>
-            </a:r>
-            <a:r>
-              <a:rPr lang="en-GB" sz="7200" dirty="0"/>
-              <a:t>🔦</a:t>
+              <a:t>Tweak Rules❗</a:t>
             </a:r>
             <a:endParaRPr lang="en-GB" sz="7200" i="1" dirty="0"/>
           </a:p>
@@ -19414,7 +20735,7 @@
           <p:cNvPr id="5" name="Date Placeholder 4">
             <a:extLst>
               <a:ext uri="{FF2B5EF4-FFF2-40B4-BE49-F238E27FC236}">
-                <a16:creationId xmlns:a16="http://schemas.microsoft.com/office/drawing/2014/main" id="{888E4550-2D55-1949-AF9C-1CACE93D9A0F}"/>
+                <a16:creationId xmlns:a16="http://schemas.microsoft.com/office/drawing/2014/main" id="{416E96E3-EB76-9A4D-A574-4070FDFC3701}"/>
               </a:ext>
             </a:extLst>
           </p:cNvPr>
@@ -19441,7 +20762,7 @@
     </p:spTree>
     <p:extLst>
       <p:ext uri="{BB962C8B-B14F-4D97-AF65-F5344CB8AC3E}">
-        <p14:creationId xmlns:p14="http://schemas.microsoft.com/office/powerpoint/2010/main" val="2801792324"/>
+        <p14:creationId xmlns:p14="http://schemas.microsoft.com/office/powerpoint/2010/main" val="242817773"/>
       </p:ext>
     </p:extLst>
   </p:cSld>
@@ -19539,6 +20860,98 @@
 </file>
 
 <file path=ppt/slides/slide50.xml><?xml version="1.0" encoding="utf-8"?>
+<p:sld xmlns:a="http://schemas.openxmlformats.org/drawingml/2006/main" xmlns:r="http://schemas.openxmlformats.org/officeDocument/2006/relationships" xmlns:p="http://schemas.openxmlformats.org/presentationml/2006/main">
+  <p:cSld>
+    <p:spTree>
+      <p:nvGrpSpPr>
+        <p:cNvPr id="1" name=""/>
+        <p:cNvGrpSpPr/>
+        <p:nvPr/>
+      </p:nvGrpSpPr>
+      <p:grpSpPr>
+        <a:xfrm>
+          <a:off x="0" y="0"/>
+          <a:ext cx="0" cy="0"/>
+          <a:chOff x="0" y="0"/>
+          <a:chExt cx="0" cy="0"/>
+        </a:xfrm>
+      </p:grpSpPr>
+      <p:sp>
+        <p:nvSpPr>
+          <p:cNvPr id="2" name="Title 1"/>
+          <p:cNvSpPr>
+            <a:spLocks noGrp="1"/>
+          </p:cNvSpPr>
+          <p:nvPr>
+            <p:ph type="title"/>
+          </p:nvPr>
+        </p:nvSpPr>
+        <p:spPr>
+          <a:xfrm>
+            <a:off x="1211464" y="3176198"/>
+            <a:ext cx="9769072" cy="505604"/>
+          </a:xfrm>
+        </p:spPr>
+        <p:txBody>
+          <a:bodyPr/>
+          <a:lstStyle/>
+          <a:p>
+            <a:pPr algn="ctr"/>
+            <a:r>
+              <a:rPr lang="en-GB" sz="9600" dirty="0"/>
+              <a:t>Facilitation </a:t>
+            </a:r>
+            <a:r>
+              <a:rPr lang="en-GB" sz="7200" dirty="0"/>
+              <a:t>🔦</a:t>
+            </a:r>
+            <a:endParaRPr lang="en-GB" sz="7200" i="1" dirty="0"/>
+          </a:p>
+        </p:txBody>
+      </p:sp>
+      <p:sp>
+        <p:nvSpPr>
+          <p:cNvPr id="5" name="Date Placeholder 4">
+            <a:extLst>
+              <a:ext uri="{FF2B5EF4-FFF2-40B4-BE49-F238E27FC236}">
+                <a16:creationId xmlns:a16="http://schemas.microsoft.com/office/drawing/2014/main" id="{888E4550-2D55-1949-AF9C-1CACE93D9A0F}"/>
+              </a:ext>
+            </a:extLst>
+          </p:cNvPr>
+          <p:cNvSpPr>
+            <a:spLocks noGrp="1"/>
+          </p:cNvSpPr>
+          <p:nvPr>
+            <p:ph type="dt" sz="half" idx="10"/>
+          </p:nvPr>
+        </p:nvSpPr>
+        <p:spPr/>
+        <p:txBody>
+          <a:bodyPr/>
+          <a:lstStyle/>
+          <a:p>
+            <a:r>
+              <a:rPr lang="en-GB"/>
+              <a:t>@owennell</a:t>
+            </a:r>
+            <a:endParaRPr lang="en-US" dirty="0"/>
+          </a:p>
+        </p:txBody>
+      </p:sp>
+    </p:spTree>
+    <p:extLst>
+      <p:ext uri="{BB962C8B-B14F-4D97-AF65-F5344CB8AC3E}">
+        <p14:creationId xmlns:p14="http://schemas.microsoft.com/office/powerpoint/2010/main" val="2801792324"/>
+      </p:ext>
+    </p:extLst>
+  </p:cSld>
+  <p:clrMapOvr>
+    <a:masterClrMapping/>
+  </p:clrMapOvr>
+</p:sld>
+</file>
+
+<file path=ppt/slides/slide51.xml><?xml version="1.0" encoding="utf-8"?>
 <p:sld xmlns:a="http://schemas.openxmlformats.org/drawingml/2006/main" xmlns:r="http://schemas.openxmlformats.org/officeDocument/2006/relationships" xmlns:p="http://schemas.openxmlformats.org/presentationml/2006/main">
   <p:cSld>
     <p:spTree>
@@ -19757,94 +21170,6 @@
 </p:sld>
 </file>
 
-<file path=ppt/slides/slide51.xml><?xml version="1.0" encoding="utf-8"?>
-<p:sld xmlns:a="http://schemas.openxmlformats.org/drawingml/2006/main" xmlns:r="http://schemas.openxmlformats.org/officeDocument/2006/relationships" xmlns:p="http://schemas.openxmlformats.org/presentationml/2006/main">
-  <p:cSld>
-    <p:spTree>
-      <p:nvGrpSpPr>
-        <p:cNvPr id="1" name=""/>
-        <p:cNvGrpSpPr/>
-        <p:nvPr/>
-      </p:nvGrpSpPr>
-      <p:grpSpPr>
-        <a:xfrm>
-          <a:off x="0" y="0"/>
-          <a:ext cx="0" cy="0"/>
-          <a:chOff x="0" y="0"/>
-          <a:chExt cx="0" cy="0"/>
-        </a:xfrm>
-      </p:grpSpPr>
-      <p:sp>
-        <p:nvSpPr>
-          <p:cNvPr id="2" name="Title 1"/>
-          <p:cNvSpPr>
-            <a:spLocks noGrp="1"/>
-          </p:cNvSpPr>
-          <p:nvPr>
-            <p:ph type="title"/>
-          </p:nvPr>
-        </p:nvSpPr>
-        <p:spPr>
-          <a:xfrm>
-            <a:off x="1678346" y="3176198"/>
-            <a:ext cx="8835309" cy="505604"/>
-          </a:xfrm>
-        </p:spPr>
-        <p:txBody>
-          <a:bodyPr/>
-          <a:lstStyle/>
-          <a:p>
-            <a:pPr algn="ctr"/>
-            <a:r>
-              <a:rPr lang="en-GB" sz="8800" dirty="0"/>
-              <a:t>The Future 🤖</a:t>
-            </a:r>
-            <a:endParaRPr lang="en-GB" dirty="0"/>
-          </a:p>
-        </p:txBody>
-      </p:sp>
-      <p:sp>
-        <p:nvSpPr>
-          <p:cNvPr id="5" name="Date Placeholder 4">
-            <a:extLst>
-              <a:ext uri="{FF2B5EF4-FFF2-40B4-BE49-F238E27FC236}">
-                <a16:creationId xmlns:a16="http://schemas.microsoft.com/office/drawing/2014/main" id="{CAC72B13-A2AB-4444-A32E-45E07B537B1E}"/>
-              </a:ext>
-            </a:extLst>
-          </p:cNvPr>
-          <p:cNvSpPr>
-            <a:spLocks noGrp="1"/>
-          </p:cNvSpPr>
-          <p:nvPr>
-            <p:ph type="dt" sz="half" idx="10"/>
-          </p:nvPr>
-        </p:nvSpPr>
-        <p:spPr/>
-        <p:txBody>
-          <a:bodyPr/>
-          <a:lstStyle/>
-          <a:p>
-            <a:r>
-              <a:rPr lang="en-GB"/>
-              <a:t>@owennell</a:t>
-            </a:r>
-            <a:endParaRPr lang="en-US" dirty="0"/>
-          </a:p>
-        </p:txBody>
-      </p:sp>
-    </p:spTree>
-    <p:extLst>
-      <p:ext uri="{BB962C8B-B14F-4D97-AF65-F5344CB8AC3E}">
-        <p14:creationId xmlns:p14="http://schemas.microsoft.com/office/powerpoint/2010/main" val="654815947"/>
-      </p:ext>
-    </p:extLst>
-  </p:cSld>
-  <p:clrMapOvr>
-    <a:masterClrMapping/>
-  </p:clrMapOvr>
-</p:sld>
-</file>
-
 <file path=ppt/slides/slide52.xml><?xml version="1.0" encoding="utf-8"?>
 <p:sld xmlns:a="http://schemas.openxmlformats.org/drawingml/2006/main" xmlns:r="http://schemas.openxmlformats.org/officeDocument/2006/relationships" xmlns:p="http://schemas.openxmlformats.org/presentationml/2006/main">
   <p:cSld>
@@ -19885,7 +21210,7 @@
             <a:pPr algn="ctr"/>
             <a:r>
               <a:rPr lang="en-GB" sz="8800" dirty="0"/>
-              <a:t>Remote 🎧</a:t>
+              <a:t>The Future 🤖</a:t>
             </a:r>
             <a:endParaRPr lang="en-GB" dirty="0"/>
           </a:p>
@@ -19896,7 +21221,7 @@
           <p:cNvPr id="5" name="Date Placeholder 4">
             <a:extLst>
               <a:ext uri="{FF2B5EF4-FFF2-40B4-BE49-F238E27FC236}">
-                <a16:creationId xmlns:a16="http://schemas.microsoft.com/office/drawing/2014/main" id="{26D6769B-860C-034D-9FBA-52F1CC75AAD2}"/>
+                <a16:creationId xmlns:a16="http://schemas.microsoft.com/office/drawing/2014/main" id="{CAC72B13-A2AB-4444-A32E-45E07B537B1E}"/>
               </a:ext>
             </a:extLst>
           </p:cNvPr>
@@ -19923,7 +21248,7 @@
     </p:spTree>
     <p:extLst>
       <p:ext uri="{BB962C8B-B14F-4D97-AF65-F5344CB8AC3E}">
-        <p14:creationId xmlns:p14="http://schemas.microsoft.com/office/powerpoint/2010/main" val="2671301233"/>
+        <p14:creationId xmlns:p14="http://schemas.microsoft.com/office/powerpoint/2010/main" val="654815947"/>
       </p:ext>
     </p:extLst>
   </p:cSld>
@@ -19973,7 +21298,7 @@
             <a:pPr algn="ctr"/>
             <a:r>
               <a:rPr lang="en-GB" sz="8800" dirty="0"/>
-              <a:t>Tools 🔧</a:t>
+              <a:t>Remote 🎧</a:t>
             </a:r>
             <a:endParaRPr lang="en-GB" dirty="0"/>
           </a:p>
@@ -19984,7 +21309,7 @@
           <p:cNvPr id="5" name="Date Placeholder 4">
             <a:extLst>
               <a:ext uri="{FF2B5EF4-FFF2-40B4-BE49-F238E27FC236}">
-                <a16:creationId xmlns:a16="http://schemas.microsoft.com/office/drawing/2014/main" id="{9824FFE3-6C5B-B840-BE38-DAB059A1D5BC}"/>
+                <a16:creationId xmlns:a16="http://schemas.microsoft.com/office/drawing/2014/main" id="{26D6769B-860C-034D-9FBA-52F1CC75AAD2}"/>
               </a:ext>
             </a:extLst>
           </p:cNvPr>
@@ -20011,7 +21336,7 @@
     </p:spTree>
     <p:extLst>
       <p:ext uri="{BB962C8B-B14F-4D97-AF65-F5344CB8AC3E}">
-        <p14:creationId xmlns:p14="http://schemas.microsoft.com/office/powerpoint/2010/main" val="3006730636"/>
+        <p14:creationId xmlns:p14="http://schemas.microsoft.com/office/powerpoint/2010/main" val="2671301233"/>
       </p:ext>
     </p:extLst>
   </p:cSld>
@@ -20061,7 +21386,7 @@
             <a:pPr algn="ctr"/>
             <a:r>
               <a:rPr lang="en-GB" sz="8800" dirty="0"/>
-              <a:t>Community 🌍</a:t>
+              <a:t>Tools 🔧</a:t>
             </a:r>
             <a:endParaRPr lang="en-GB" dirty="0"/>
           </a:p>
@@ -20072,7 +21397,7 @@
           <p:cNvPr id="5" name="Date Placeholder 4">
             <a:extLst>
               <a:ext uri="{FF2B5EF4-FFF2-40B4-BE49-F238E27FC236}">
-                <a16:creationId xmlns:a16="http://schemas.microsoft.com/office/drawing/2014/main" id="{4C4B0612-36B4-7A42-A7F4-653A4D6FFDB4}"/>
+                <a16:creationId xmlns:a16="http://schemas.microsoft.com/office/drawing/2014/main" id="{9824FFE3-6C5B-B840-BE38-DAB059A1D5BC}"/>
               </a:ext>
             </a:extLst>
           </p:cNvPr>
@@ -20099,7 +21424,7 @@
     </p:spTree>
     <p:extLst>
       <p:ext uri="{BB962C8B-B14F-4D97-AF65-F5344CB8AC3E}">
-        <p14:creationId xmlns:p14="http://schemas.microsoft.com/office/powerpoint/2010/main" val="3398786595"/>
+        <p14:creationId xmlns:p14="http://schemas.microsoft.com/office/powerpoint/2010/main" val="3006730636"/>
       </p:ext>
     </p:extLst>
   </p:cSld>
@@ -20149,6 +21474,94 @@
             <a:pPr algn="ctr"/>
             <a:r>
               <a:rPr lang="en-GB" sz="8800" dirty="0"/>
+              <a:t>Community 🌍</a:t>
+            </a:r>
+            <a:endParaRPr lang="en-GB" dirty="0"/>
+          </a:p>
+        </p:txBody>
+      </p:sp>
+      <p:sp>
+        <p:nvSpPr>
+          <p:cNvPr id="5" name="Date Placeholder 4">
+            <a:extLst>
+              <a:ext uri="{FF2B5EF4-FFF2-40B4-BE49-F238E27FC236}">
+                <a16:creationId xmlns:a16="http://schemas.microsoft.com/office/drawing/2014/main" id="{4C4B0612-36B4-7A42-A7F4-653A4D6FFDB4}"/>
+              </a:ext>
+            </a:extLst>
+          </p:cNvPr>
+          <p:cNvSpPr>
+            <a:spLocks noGrp="1"/>
+          </p:cNvSpPr>
+          <p:nvPr>
+            <p:ph type="dt" sz="half" idx="10"/>
+          </p:nvPr>
+        </p:nvSpPr>
+        <p:spPr/>
+        <p:txBody>
+          <a:bodyPr/>
+          <a:lstStyle/>
+          <a:p>
+            <a:r>
+              <a:rPr lang="en-GB"/>
+              <a:t>@owennell</a:t>
+            </a:r>
+            <a:endParaRPr lang="en-US" dirty="0"/>
+          </a:p>
+        </p:txBody>
+      </p:sp>
+    </p:spTree>
+    <p:extLst>
+      <p:ext uri="{BB962C8B-B14F-4D97-AF65-F5344CB8AC3E}">
+        <p14:creationId xmlns:p14="http://schemas.microsoft.com/office/powerpoint/2010/main" val="3398786595"/>
+      </p:ext>
+    </p:extLst>
+  </p:cSld>
+  <p:clrMapOvr>
+    <a:masterClrMapping/>
+  </p:clrMapOvr>
+</p:sld>
+</file>
+
+<file path=ppt/slides/slide56.xml><?xml version="1.0" encoding="utf-8"?>
+<p:sld xmlns:a="http://schemas.openxmlformats.org/drawingml/2006/main" xmlns:r="http://schemas.openxmlformats.org/officeDocument/2006/relationships" xmlns:p="http://schemas.openxmlformats.org/presentationml/2006/main">
+  <p:cSld>
+    <p:spTree>
+      <p:nvGrpSpPr>
+        <p:cNvPr id="1" name=""/>
+        <p:cNvGrpSpPr/>
+        <p:nvPr/>
+      </p:nvGrpSpPr>
+      <p:grpSpPr>
+        <a:xfrm>
+          <a:off x="0" y="0"/>
+          <a:ext cx="0" cy="0"/>
+          <a:chOff x="0" y="0"/>
+          <a:chExt cx="0" cy="0"/>
+        </a:xfrm>
+      </p:grpSpPr>
+      <p:sp>
+        <p:nvSpPr>
+          <p:cNvPr id="2" name="Title 1"/>
+          <p:cNvSpPr>
+            <a:spLocks noGrp="1"/>
+          </p:cNvSpPr>
+          <p:nvPr>
+            <p:ph type="title"/>
+          </p:nvPr>
+        </p:nvSpPr>
+        <p:spPr>
+          <a:xfrm>
+            <a:off x="1678346" y="3176198"/>
+            <a:ext cx="8835309" cy="505604"/>
+          </a:xfrm>
+        </p:spPr>
+        <p:txBody>
+          <a:bodyPr/>
+          <a:lstStyle/>
+          <a:p>
+            <a:pPr algn="ctr"/>
+            <a:r>
+              <a:rPr lang="en-GB" sz="8800" dirty="0"/>
               <a:t>(Nearly) The End</a:t>
             </a:r>
             <a:endParaRPr lang="en-GB" dirty="0"/>
@@ -20197,7 +21610,7 @@
 </p:sld>
 </file>
 
-<file path=ppt/slides/slide56.xml><?xml version="1.0" encoding="utf-8"?>
+<file path=ppt/slides/slide57.xml><?xml version="1.0" encoding="utf-8"?>
 <p:sld xmlns:a="http://schemas.openxmlformats.org/drawingml/2006/main" xmlns:r="http://schemas.openxmlformats.org/officeDocument/2006/relationships" xmlns:p="http://schemas.openxmlformats.org/presentationml/2006/main">
   <p:cSld>
     <p:spTree>
@@ -20561,7 +21974,7 @@
 </p:sld>
 </file>
 
-<file path=ppt/slides/slide57.xml><?xml version="1.0" encoding="utf-8"?>
+<file path=ppt/slides/slide58.xml><?xml version="1.0" encoding="utf-8"?>
 <p:sld xmlns:a="http://schemas.openxmlformats.org/drawingml/2006/main" xmlns:r="http://schemas.openxmlformats.org/officeDocument/2006/relationships" xmlns:p="http://schemas.openxmlformats.org/presentationml/2006/main">
   <p:cSld>
     <p:spTree>
@@ -20649,7 +22062,7 @@
 </p:sld>
 </file>
 
-<file path=ppt/slides/slide58.xml><?xml version="1.0" encoding="utf-8"?>
+<file path=ppt/slides/slide59.xml><?xml version="1.0" encoding="utf-8"?>
 <p:sld xmlns:a="http://schemas.openxmlformats.org/drawingml/2006/main" xmlns:r="http://schemas.openxmlformats.org/officeDocument/2006/relationships" xmlns:p="http://schemas.openxmlformats.org/presentationml/2006/main">
   <p:cSld>
     <p:spTree>
@@ -22079,15 +23492,6 @@
 </file>
 
 <file path=customXml/item1.xml><?xml version="1.0" encoding="utf-8"?>
-<?mso-contentType ?>
-<FormTemplates xmlns="http://schemas.microsoft.com/sharepoint/v3/contenttype/forms">
-  <Display>DocumentLibraryForm</Display>
-  <Edit>DocumentLibraryForm</Edit>
-  <New>DocumentLibraryForm</New>
-</FormTemplates>
-</file>
-
-<file path=customXml/item2.xml><?xml version="1.0" encoding="utf-8"?>
 <ct:contentTypeSchema xmlns:ct="http://schemas.microsoft.com/office/2006/metadata/contentType" xmlns:ma="http://schemas.microsoft.com/office/2006/metadata/properties/metaAttributes" ct:_="" ma:_="" ma:contentTypeName="Document" ma:contentTypeID="0x0101005BEB3BB5FC069E4A8B1077D5FD23943C" ma:contentTypeVersion="2" ma:contentTypeDescription="Create a new document." ma:contentTypeScope="" ma:versionID="47ddf1554eeafa4d79d0318e64abc4a7">
   <xsd:schema xmlns:xsd="http://www.w3.org/2001/XMLSchema" xmlns:xs="http://www.w3.org/2001/XMLSchema" xmlns:p="http://schemas.microsoft.com/office/2006/metadata/properties" xmlns:ns2="d1b01c81-120a-4560-9817-a2c229f7d73c" targetNamespace="http://schemas.microsoft.com/office/2006/metadata/properties" ma:root="true" ma:fieldsID="1a8928d985599b3cc8311f2e57b9aa78" ns2:_="">
     <xsd:import namespace="d1b01c81-120a-4560-9817-a2c229f7d73c"/>
@@ -22235,21 +23639,22 @@
 </ct:contentTypeSchema>
 </file>
 
-<file path=customXml/item3.xml><?xml version="1.0" encoding="utf-8"?>
+<file path=customXml/item2.xml><?xml version="1.0" encoding="utf-8"?>
 <p:properties xmlns:p="http://schemas.microsoft.com/office/2006/metadata/properties" xmlns:xsi="http://www.w3.org/2001/XMLSchema-instance">
   <documentManagement/>
 </p:properties>
 </file>
 
-<file path=customXml/itemProps1.xml><?xml version="1.0" encoding="utf-8"?>
-<ds:datastoreItem xmlns:ds="http://schemas.openxmlformats.org/officeDocument/2006/customXml" ds:itemID="{5B0221C8-8D1F-449C-9E02-3B69D2872205}">
-  <ds:schemaRefs>
-    <ds:schemaRef ds:uri="http://schemas.microsoft.com/sharepoint/v3/contenttype/forms"/>
-  </ds:schemaRefs>
-</ds:datastoreItem>
+<file path=customXml/item3.xml><?xml version="1.0" encoding="utf-8"?>
+<?mso-contentType ?>
+<FormTemplates xmlns="http://schemas.microsoft.com/sharepoint/v3/contenttype/forms">
+  <Display>DocumentLibraryForm</Display>
+  <Edit>DocumentLibraryForm</Edit>
+  <New>DocumentLibraryForm</New>
+</FormTemplates>
 </file>
 
-<file path=customXml/itemProps2.xml><?xml version="1.0" encoding="utf-8"?>
+<file path=customXml/itemProps1.xml><?xml version="1.0" encoding="utf-8"?>
 <ds:datastoreItem xmlns:ds="http://schemas.openxmlformats.org/officeDocument/2006/customXml" ds:itemID="{B9E90AD6-4848-4215-B912-DB92A776088F}">
   <ds:schemaRefs>
     <ds:schemaRef ds:uri="http://schemas.microsoft.com/office/2006/metadata/contentType"/>
@@ -22267,10 +23672,18 @@
 </ds:datastoreItem>
 </file>
 
-<file path=customXml/itemProps3.xml><?xml version="1.0" encoding="utf-8"?>
+<file path=customXml/itemProps2.xml><?xml version="1.0" encoding="utf-8"?>
 <ds:datastoreItem xmlns:ds="http://schemas.openxmlformats.org/officeDocument/2006/customXml" ds:itemID="{28288C4A-FB4D-4A80-A265-5C3EA7C36918}">
   <ds:schemaRefs>
     <ds:schemaRef ds:uri="http://schemas.microsoft.com/office/2006/metadata/properties"/>
   </ds:schemaRefs>
 </ds:datastoreItem>
+</file>
+
+<file path=customXml/itemProps3.xml><?xml version="1.0" encoding="utf-8"?>
+<ds:datastoreItem xmlns:ds="http://schemas.openxmlformats.org/officeDocument/2006/customXml" ds:itemID="{5B0221C8-8D1F-449C-9E02-3B69D2872205}">
+  <ds:schemaRefs>
+    <ds:schemaRef ds:uri="http://schemas.microsoft.com/sharepoint/v3/contenttype/forms"/>
+  </ds:schemaRefs>
+</ds:datastoreItem>
 </file>
</xml_diff>

<commit_message>
All the notes now
</commit_message>
<xml_diff>
--- a/a-mob-mentality.pptx
+++ b/a-mob-mentality.pptx
@@ -2870,12 +2870,8 @@
           </a:p>
           <a:p>
             <a:r>
-              <a:rPr lang="en-GB"/>
-              <a:t>Mobbing </a:t>
-            </a:r>
-            <a:r>
               <a:rPr lang="en-GB" dirty="0"/>
-              <a:t>takes all the good things about pair programming and amplifies them</a:t>
+              <a:t>Mobbing takes all the good things about pair programming and amplifies them</a:t>
             </a:r>
           </a:p>
           <a:p>
@@ -3278,6 +3274,22 @@
               <a:rPr lang="en-GB" dirty="0"/>
               <a:t>or if you already have, find ways to experiment and perhaps make your mobs even better.</a:t>
             </a:r>
+          </a:p>
+          <a:p>
+            <a:endParaRPr lang="en-GB" dirty="0"/>
+          </a:p>
+          <a:p>
+            <a:r>
+              <a:rPr lang="en-GB" dirty="0"/>
+              <a:t>If you have any questions, I’d be happy to answer them at the end</a:t>
+            </a:r>
+            <a:br>
+              <a:rPr lang="en-GB" dirty="0"/>
+            </a:br>
+            <a:r>
+              <a:rPr lang="en-GB" dirty="0"/>
+              <a:t>Or come up and talk to me afterwards, I’m here for the whole conference</a:t>
+            </a:r>
             <a:endParaRPr lang="en-US" dirty="0"/>
           </a:p>
         </p:txBody>
@@ -5569,23 +5581,16 @@
           <a:p>
             <a:r>
               <a:rPr lang="en-US" dirty="0"/>
-              <a:t>We also experimented with rules </a:t>
-            </a:r>
-            <a:r>
-              <a:rPr lang="en-US" dirty="0" err="1"/>
-              <a:t>thatmake</a:t>
-            </a:r>
-            <a:r>
-              <a:rPr lang="en-US" dirty="0"/>
-              <a:t> things fun but also each new </a:t>
-            </a:r>
-            <a:r>
-              <a:rPr lang="en-US" dirty="0" err="1"/>
-              <a:t>stkills</a:t>
-            </a:r>
-            <a:r>
-              <a:rPr lang="en-US" dirty="0"/>
-              <a:t>, like</a:t>
+              <a:t>We’d have micro retros after each rotation.</a:t>
+            </a:r>
+          </a:p>
+          <a:p>
+            <a:endParaRPr lang="en-US" dirty="0"/>
+          </a:p>
+          <a:p>
+            <a:r>
+              <a:rPr lang="en-US" dirty="0"/>
+              <a:t>We also experimented with rules that make things fun but also each new skills, like</a:t>
             </a:r>
           </a:p>
           <a:p>
@@ -5791,22 +5796,32 @@
           <a:p>
             <a:r>
               <a:rPr lang="en-US" dirty="0"/>
-              <a:t>Like any other kind of meeting, a </a:t>
-            </a:r>
-            <a:r>
-              <a:rPr lang="en-US" dirty="0" err="1"/>
-              <a:t>faciltator</a:t>
-            </a:r>
-            <a:r>
-              <a:rPr lang="en-US" dirty="0"/>
-              <a:t> can get the best out of people</a:t>
-            </a:r>
-          </a:p>
-          <a:p>
-            <a:r>
-              <a:rPr lang="en-US" dirty="0"/>
-              <a:t>By having someone who’s taken a step back and guides the mob, they can find the best way of working, for them at that moment.</a:t>
-            </a:r>
+              <a:t>Like any other kind of meeting, a facilitator can get the best out of people</a:t>
+            </a:r>
+          </a:p>
+          <a:p>
+            <a:endParaRPr lang="en-US" dirty="0"/>
+          </a:p>
+          <a:p>
+            <a:r>
+              <a:rPr lang="en-US" dirty="0"/>
+              <a:t>They can suggest things when they get stuck</a:t>
+            </a:r>
+          </a:p>
+          <a:p>
+            <a:r>
+              <a:rPr lang="en-US" dirty="0"/>
+              <a:t>They can help when people can’t agree</a:t>
+            </a:r>
+          </a:p>
+          <a:p>
+            <a:r>
+              <a:rPr lang="en-US" dirty="0"/>
+              <a:t>They can encourage people who are a bit quiet to give their opinions</a:t>
+            </a:r>
+          </a:p>
+          <a:p>
+            <a:endParaRPr lang="en-US" dirty="0"/>
           </a:p>
         </p:txBody>
       </p:sp>
@@ -5913,7 +5928,7 @@
           <a:p>
             <a:r>
               <a:rPr lang="en-US" dirty="0"/>
-              <a:t>And this process is continually evolving.</a:t>
+              <a:t>And this process needs to continually evolve as the team and the situation change.</a:t>
             </a:r>
           </a:p>
           <a:p>
@@ -5934,13 +5949,8 @@
           <a:p>
             <a:r>
               <a:rPr lang="en-US" dirty="0"/>
-              <a:t>And what’s best for me may not </a:t>
-            </a:r>
-            <a:r>
-              <a:rPr lang="en-US"/>
-              <a:t>be what’s best for you.</a:t>
-            </a:r>
-            <a:endParaRPr lang="en-US" dirty="0"/>
+              <a:t>And what’s best for me may not be what’s best for you.</a:t>
+            </a:r>
           </a:p>
           <a:p>
             <a:endParaRPr lang="en-US" dirty="0"/>
@@ -5974,6 +5984,884 @@
     <p:extLst>
       <p:ext uri="{BB962C8B-B14F-4D97-AF65-F5344CB8AC3E}">
         <p14:creationId xmlns:p14="http://schemas.microsoft.com/office/powerpoint/2010/main" val="804619200"/>
+      </p:ext>
+    </p:extLst>
+  </p:cSld>
+  <p:clrMapOvr>
+    <a:masterClrMapping/>
+  </p:clrMapOvr>
+</p:notes>
+</file>
+
+<file path=ppt/notesSlides/notesSlide52.xml><?xml version="1.0" encoding="utf-8"?>
+<p:notes xmlns:a="http://schemas.openxmlformats.org/drawingml/2006/main" xmlns:r="http://schemas.openxmlformats.org/officeDocument/2006/relationships" xmlns:p="http://schemas.openxmlformats.org/presentationml/2006/main">
+  <p:cSld>
+    <p:spTree>
+      <p:nvGrpSpPr>
+        <p:cNvPr id="1" name=""/>
+        <p:cNvGrpSpPr/>
+        <p:nvPr/>
+      </p:nvGrpSpPr>
+      <p:grpSpPr>
+        <a:xfrm>
+          <a:off x="0" y="0"/>
+          <a:ext cx="0" cy="0"/>
+          <a:chOff x="0" y="0"/>
+          <a:chExt cx="0" cy="0"/>
+        </a:xfrm>
+      </p:grpSpPr>
+      <p:sp>
+        <p:nvSpPr>
+          <p:cNvPr id="2" name="Slide Image Placeholder 1"/>
+          <p:cNvSpPr>
+            <a:spLocks noGrp="1" noRot="1" noChangeAspect="1"/>
+          </p:cNvSpPr>
+          <p:nvPr>
+            <p:ph type="sldImg"/>
+          </p:nvPr>
+        </p:nvSpPr>
+        <p:spPr/>
+      </p:sp>
+      <p:sp>
+        <p:nvSpPr>
+          <p:cNvPr id="3" name="Notes Placeholder 2"/>
+          <p:cNvSpPr>
+            <a:spLocks noGrp="1"/>
+          </p:cNvSpPr>
+          <p:nvPr>
+            <p:ph type="body" idx="1"/>
+          </p:nvPr>
+        </p:nvSpPr>
+        <p:spPr/>
+        <p:txBody>
+          <a:bodyPr/>
+          <a:lstStyle/>
+          <a:p>
+            <a:r>
+              <a:rPr lang="en-US" dirty="0"/>
+              <a:t>I’ve talked about three mobs over time, but mobbing isn’t done</a:t>
+            </a:r>
+          </a:p>
+          <a:p>
+            <a:r>
+              <a:rPr lang="en-US" dirty="0"/>
+              <a:t>People are still trying new things.</a:t>
+            </a:r>
+          </a:p>
+        </p:txBody>
+      </p:sp>
+      <p:sp>
+        <p:nvSpPr>
+          <p:cNvPr id="4" name="Slide Number Placeholder 3"/>
+          <p:cNvSpPr>
+            <a:spLocks noGrp="1"/>
+          </p:cNvSpPr>
+          <p:nvPr>
+            <p:ph type="sldNum" sz="quarter" idx="5"/>
+          </p:nvPr>
+        </p:nvSpPr>
+        <p:spPr/>
+        <p:txBody>
+          <a:bodyPr/>
+          <a:lstStyle/>
+          <a:p>
+            <a:fld id="{B99E8012-7AEC-4AAD-B52C-DF7E1601EEFE}" type="slidenum">
+              <a:rPr lang="en-GB" smtClean="0"/>
+              <a:t>52</a:t>
+            </a:fld>
+            <a:endParaRPr lang="en-GB"/>
+          </a:p>
+        </p:txBody>
+      </p:sp>
+    </p:spTree>
+    <p:extLst>
+      <p:ext uri="{BB962C8B-B14F-4D97-AF65-F5344CB8AC3E}">
+        <p14:creationId xmlns:p14="http://schemas.microsoft.com/office/powerpoint/2010/main" val="3632136308"/>
+      </p:ext>
+    </p:extLst>
+  </p:cSld>
+  <p:clrMapOvr>
+    <a:masterClrMapping/>
+  </p:clrMapOvr>
+</p:notes>
+</file>
+
+<file path=ppt/notesSlides/notesSlide53.xml><?xml version="1.0" encoding="utf-8"?>
+<p:notes xmlns:a="http://schemas.openxmlformats.org/drawingml/2006/main" xmlns:r="http://schemas.openxmlformats.org/officeDocument/2006/relationships" xmlns:p="http://schemas.openxmlformats.org/presentationml/2006/main">
+  <p:cSld>
+    <p:spTree>
+      <p:nvGrpSpPr>
+        <p:cNvPr id="1" name=""/>
+        <p:cNvGrpSpPr/>
+        <p:nvPr/>
+      </p:nvGrpSpPr>
+      <p:grpSpPr>
+        <a:xfrm>
+          <a:off x="0" y="0"/>
+          <a:ext cx="0" cy="0"/>
+          <a:chOff x="0" y="0"/>
+          <a:chExt cx="0" cy="0"/>
+        </a:xfrm>
+      </p:grpSpPr>
+      <p:sp>
+        <p:nvSpPr>
+          <p:cNvPr id="2" name="Slide Image Placeholder 1"/>
+          <p:cNvSpPr>
+            <a:spLocks noGrp="1" noRot="1" noChangeAspect="1"/>
+          </p:cNvSpPr>
+          <p:nvPr>
+            <p:ph type="sldImg"/>
+          </p:nvPr>
+        </p:nvSpPr>
+        <p:spPr/>
+      </p:sp>
+      <p:sp>
+        <p:nvSpPr>
+          <p:cNvPr id="3" name="Notes Placeholder 2"/>
+          <p:cNvSpPr>
+            <a:spLocks noGrp="1"/>
+          </p:cNvSpPr>
+          <p:nvPr>
+            <p:ph type="body" idx="1"/>
+          </p:nvPr>
+        </p:nvSpPr>
+        <p:spPr/>
+        <p:txBody>
+          <a:bodyPr/>
+          <a:lstStyle/>
+          <a:p>
+            <a:r>
+              <a:rPr lang="en-US" dirty="0"/>
+              <a:t>I’ve been in mobs where some or all of us are remote</a:t>
+            </a:r>
+          </a:p>
+          <a:p>
+            <a:r>
+              <a:rPr lang="en-US" dirty="0"/>
+              <a:t>We use screen sharing and voice chat to mob together and it works ok</a:t>
+            </a:r>
+            <a:br>
+              <a:rPr lang="en-US" dirty="0"/>
+            </a:br>
+            <a:endParaRPr lang="en-US" dirty="0"/>
+          </a:p>
+          <a:p>
+            <a:r>
+              <a:rPr lang="en-US" dirty="0"/>
+              <a:t>If anyone’s ever had remote meetings, you get the same kind of issues</a:t>
+            </a:r>
+          </a:p>
+          <a:p>
+            <a:r>
+              <a:rPr lang="en-US" dirty="0"/>
+              <a:t>Connections can be unreliable</a:t>
+            </a:r>
+          </a:p>
+          <a:p>
+            <a:r>
+              <a:rPr lang="en-US" dirty="0"/>
+              <a:t>And you lose being able to use body language to communicate</a:t>
+            </a:r>
+          </a:p>
+          <a:p>
+            <a:endParaRPr lang="en-US" dirty="0"/>
+          </a:p>
+          <a:p>
+            <a:r>
+              <a:rPr lang="en-US" dirty="0"/>
+              <a:t>But I’m hoping this can get even better, with more reliable connections</a:t>
+            </a:r>
+            <a:br>
+              <a:rPr lang="en-US" dirty="0"/>
+            </a:br>
+            <a:r>
+              <a:rPr lang="en-US" dirty="0"/>
+              <a:t>Maybe even VR will allow us to use body language after all</a:t>
+            </a:r>
+          </a:p>
+        </p:txBody>
+      </p:sp>
+      <p:sp>
+        <p:nvSpPr>
+          <p:cNvPr id="4" name="Slide Number Placeholder 3"/>
+          <p:cNvSpPr>
+            <a:spLocks noGrp="1"/>
+          </p:cNvSpPr>
+          <p:nvPr>
+            <p:ph type="sldNum" sz="quarter" idx="5"/>
+          </p:nvPr>
+        </p:nvSpPr>
+        <p:spPr/>
+        <p:txBody>
+          <a:bodyPr/>
+          <a:lstStyle/>
+          <a:p>
+            <a:fld id="{B99E8012-7AEC-4AAD-B52C-DF7E1601EEFE}" type="slidenum">
+              <a:rPr lang="en-GB" smtClean="0"/>
+              <a:t>53</a:t>
+            </a:fld>
+            <a:endParaRPr lang="en-GB"/>
+          </a:p>
+        </p:txBody>
+      </p:sp>
+    </p:spTree>
+    <p:extLst>
+      <p:ext uri="{BB962C8B-B14F-4D97-AF65-F5344CB8AC3E}">
+        <p14:creationId xmlns:p14="http://schemas.microsoft.com/office/powerpoint/2010/main" val="4083507257"/>
+      </p:ext>
+    </p:extLst>
+  </p:cSld>
+  <p:clrMapOvr>
+    <a:masterClrMapping/>
+  </p:clrMapOvr>
+</p:notes>
+</file>
+
+<file path=ppt/notesSlides/notesSlide54.xml><?xml version="1.0" encoding="utf-8"?>
+<p:notes xmlns:a="http://schemas.openxmlformats.org/drawingml/2006/main" xmlns:r="http://schemas.openxmlformats.org/officeDocument/2006/relationships" xmlns:p="http://schemas.openxmlformats.org/presentationml/2006/main">
+  <p:cSld>
+    <p:spTree>
+      <p:nvGrpSpPr>
+        <p:cNvPr id="1" name=""/>
+        <p:cNvGrpSpPr/>
+        <p:nvPr/>
+      </p:nvGrpSpPr>
+      <p:grpSpPr>
+        <a:xfrm>
+          <a:off x="0" y="0"/>
+          <a:ext cx="0" cy="0"/>
+          <a:chOff x="0" y="0"/>
+          <a:chExt cx="0" cy="0"/>
+        </a:xfrm>
+      </p:grpSpPr>
+      <p:sp>
+        <p:nvSpPr>
+          <p:cNvPr id="2" name="Slide Image Placeholder 1"/>
+          <p:cNvSpPr>
+            <a:spLocks noGrp="1" noRot="1" noChangeAspect="1"/>
+          </p:cNvSpPr>
+          <p:nvPr>
+            <p:ph type="sldImg"/>
+          </p:nvPr>
+        </p:nvSpPr>
+        <p:spPr/>
+      </p:sp>
+      <p:sp>
+        <p:nvSpPr>
+          <p:cNvPr id="3" name="Notes Placeholder 2"/>
+          <p:cNvSpPr>
+            <a:spLocks noGrp="1"/>
+          </p:cNvSpPr>
+          <p:nvPr>
+            <p:ph type="body" idx="1"/>
+          </p:nvPr>
+        </p:nvSpPr>
+        <p:spPr/>
+        <p:txBody>
+          <a:bodyPr/>
+          <a:lstStyle/>
+          <a:p>
+            <a:r>
+              <a:rPr lang="en-US" dirty="0"/>
+              <a:t>The tools out there are evolving too</a:t>
+            </a:r>
+          </a:p>
+          <a:p>
+            <a:endParaRPr lang="en-US" dirty="0"/>
+          </a:p>
+          <a:p>
+            <a:r>
+              <a:rPr lang="en-US" dirty="0"/>
+              <a:t>IDEs are starting to allow you to share your editor with others, so they can drive too</a:t>
+            </a:r>
+            <a:br>
+              <a:rPr lang="en-US" dirty="0"/>
+            </a:br>
+            <a:r>
+              <a:rPr lang="en-US" dirty="0"/>
+              <a:t>There are tools like mobbing timers, to let you know when you need to rotate drivers</a:t>
+            </a:r>
+          </a:p>
+          <a:p>
+            <a:endParaRPr lang="en-US" dirty="0"/>
+          </a:p>
+        </p:txBody>
+      </p:sp>
+      <p:sp>
+        <p:nvSpPr>
+          <p:cNvPr id="4" name="Slide Number Placeholder 3"/>
+          <p:cNvSpPr>
+            <a:spLocks noGrp="1"/>
+          </p:cNvSpPr>
+          <p:nvPr>
+            <p:ph type="sldNum" sz="quarter" idx="5"/>
+          </p:nvPr>
+        </p:nvSpPr>
+        <p:spPr/>
+        <p:txBody>
+          <a:bodyPr/>
+          <a:lstStyle/>
+          <a:p>
+            <a:fld id="{B99E8012-7AEC-4AAD-B52C-DF7E1601EEFE}" type="slidenum">
+              <a:rPr lang="en-GB" smtClean="0"/>
+              <a:t>54</a:t>
+            </a:fld>
+            <a:endParaRPr lang="en-GB"/>
+          </a:p>
+        </p:txBody>
+      </p:sp>
+    </p:spTree>
+    <p:extLst>
+      <p:ext uri="{BB962C8B-B14F-4D97-AF65-F5344CB8AC3E}">
+        <p14:creationId xmlns:p14="http://schemas.microsoft.com/office/powerpoint/2010/main" val="3036134761"/>
+      </p:ext>
+    </p:extLst>
+  </p:cSld>
+  <p:clrMapOvr>
+    <a:masterClrMapping/>
+  </p:clrMapOvr>
+</p:notes>
+</file>
+
+<file path=ppt/notesSlides/notesSlide55.xml><?xml version="1.0" encoding="utf-8"?>
+<p:notes xmlns:a="http://schemas.openxmlformats.org/drawingml/2006/main" xmlns:r="http://schemas.openxmlformats.org/officeDocument/2006/relationships" xmlns:p="http://schemas.openxmlformats.org/presentationml/2006/main">
+  <p:cSld>
+    <p:spTree>
+      <p:nvGrpSpPr>
+        <p:cNvPr id="1" name=""/>
+        <p:cNvGrpSpPr/>
+        <p:nvPr/>
+      </p:nvGrpSpPr>
+      <p:grpSpPr>
+        <a:xfrm>
+          <a:off x="0" y="0"/>
+          <a:ext cx="0" cy="0"/>
+          <a:chOff x="0" y="0"/>
+          <a:chExt cx="0" cy="0"/>
+        </a:xfrm>
+      </p:grpSpPr>
+      <p:sp>
+        <p:nvSpPr>
+          <p:cNvPr id="2" name="Slide Image Placeholder 1"/>
+          <p:cNvSpPr>
+            <a:spLocks noGrp="1" noRot="1" noChangeAspect="1"/>
+          </p:cNvSpPr>
+          <p:nvPr>
+            <p:ph type="sldImg"/>
+          </p:nvPr>
+        </p:nvSpPr>
+        <p:spPr/>
+      </p:sp>
+      <p:sp>
+        <p:nvSpPr>
+          <p:cNvPr id="3" name="Notes Placeholder 2"/>
+          <p:cNvSpPr>
+            <a:spLocks noGrp="1"/>
+          </p:cNvSpPr>
+          <p:nvPr>
+            <p:ph type="body" idx="1"/>
+          </p:nvPr>
+        </p:nvSpPr>
+        <p:spPr/>
+        <p:txBody>
+          <a:bodyPr/>
+          <a:lstStyle/>
+          <a:p>
+            <a:r>
+              <a:rPr lang="en-US" dirty="0"/>
+              <a:t>But best of all, there’s a whole bunch of people around the world trying out mobbing</a:t>
+            </a:r>
+          </a:p>
+          <a:p>
+            <a:r>
+              <a:rPr lang="en-US" dirty="0"/>
+              <a:t>They’re experimenting and sharing their experiences</a:t>
+            </a:r>
+          </a:p>
+          <a:p>
+            <a:r>
+              <a:rPr lang="en-US" dirty="0"/>
+              <a:t>And we can all learn from each other</a:t>
+            </a:r>
+          </a:p>
+        </p:txBody>
+      </p:sp>
+      <p:sp>
+        <p:nvSpPr>
+          <p:cNvPr id="4" name="Slide Number Placeholder 3"/>
+          <p:cNvSpPr>
+            <a:spLocks noGrp="1"/>
+          </p:cNvSpPr>
+          <p:nvPr>
+            <p:ph type="sldNum" sz="quarter" idx="5"/>
+          </p:nvPr>
+        </p:nvSpPr>
+        <p:spPr/>
+        <p:txBody>
+          <a:bodyPr/>
+          <a:lstStyle/>
+          <a:p>
+            <a:fld id="{B99E8012-7AEC-4AAD-B52C-DF7E1601EEFE}" type="slidenum">
+              <a:rPr lang="en-GB" smtClean="0"/>
+              <a:t>55</a:t>
+            </a:fld>
+            <a:endParaRPr lang="en-GB"/>
+          </a:p>
+        </p:txBody>
+      </p:sp>
+    </p:spTree>
+    <p:extLst>
+      <p:ext uri="{BB962C8B-B14F-4D97-AF65-F5344CB8AC3E}">
+        <p14:creationId xmlns:p14="http://schemas.microsoft.com/office/powerpoint/2010/main" val="162785280"/>
+      </p:ext>
+    </p:extLst>
+  </p:cSld>
+  <p:clrMapOvr>
+    <a:masterClrMapping/>
+  </p:clrMapOvr>
+</p:notes>
+</file>
+
+<file path=ppt/notesSlides/notesSlide56.xml><?xml version="1.0" encoding="utf-8"?>
+<p:notes xmlns:a="http://schemas.openxmlformats.org/drawingml/2006/main" xmlns:r="http://schemas.openxmlformats.org/officeDocument/2006/relationships" xmlns:p="http://schemas.openxmlformats.org/presentationml/2006/main">
+  <p:cSld>
+    <p:spTree>
+      <p:nvGrpSpPr>
+        <p:cNvPr id="1" name=""/>
+        <p:cNvGrpSpPr/>
+        <p:nvPr/>
+      </p:nvGrpSpPr>
+      <p:grpSpPr>
+        <a:xfrm>
+          <a:off x="0" y="0"/>
+          <a:ext cx="0" cy="0"/>
+          <a:chOff x="0" y="0"/>
+          <a:chExt cx="0" cy="0"/>
+        </a:xfrm>
+      </p:grpSpPr>
+      <p:sp>
+        <p:nvSpPr>
+          <p:cNvPr id="2" name="Slide Image Placeholder 1"/>
+          <p:cNvSpPr>
+            <a:spLocks noGrp="1" noRot="1" noChangeAspect="1"/>
+          </p:cNvSpPr>
+          <p:nvPr>
+            <p:ph type="sldImg"/>
+          </p:nvPr>
+        </p:nvSpPr>
+        <p:spPr/>
+      </p:sp>
+      <p:sp>
+        <p:nvSpPr>
+          <p:cNvPr id="3" name="Notes Placeholder 2"/>
+          <p:cNvSpPr>
+            <a:spLocks noGrp="1"/>
+          </p:cNvSpPr>
+          <p:nvPr>
+            <p:ph type="body" idx="1"/>
+          </p:nvPr>
+        </p:nvSpPr>
+        <p:spPr/>
+        <p:txBody>
+          <a:bodyPr/>
+          <a:lstStyle/>
+          <a:p>
+            <a:r>
+              <a:rPr lang="en-US" dirty="0"/>
+              <a:t>So it’s nearly the end</a:t>
+            </a:r>
+          </a:p>
+        </p:txBody>
+      </p:sp>
+      <p:sp>
+        <p:nvSpPr>
+          <p:cNvPr id="4" name="Slide Number Placeholder 3"/>
+          <p:cNvSpPr>
+            <a:spLocks noGrp="1"/>
+          </p:cNvSpPr>
+          <p:nvPr>
+            <p:ph type="sldNum" sz="quarter" idx="5"/>
+          </p:nvPr>
+        </p:nvSpPr>
+        <p:spPr/>
+        <p:txBody>
+          <a:bodyPr/>
+          <a:lstStyle/>
+          <a:p>
+            <a:fld id="{B99E8012-7AEC-4AAD-B52C-DF7E1601EEFE}" type="slidenum">
+              <a:rPr lang="en-GB" smtClean="0"/>
+              <a:t>56</a:t>
+            </a:fld>
+            <a:endParaRPr lang="en-GB"/>
+          </a:p>
+        </p:txBody>
+      </p:sp>
+    </p:spTree>
+    <p:extLst>
+      <p:ext uri="{BB962C8B-B14F-4D97-AF65-F5344CB8AC3E}">
+        <p14:creationId xmlns:p14="http://schemas.microsoft.com/office/powerpoint/2010/main" val="3708235082"/>
+      </p:ext>
+    </p:extLst>
+  </p:cSld>
+  <p:clrMapOvr>
+    <a:masterClrMapping/>
+  </p:clrMapOvr>
+</p:notes>
+</file>
+
+<file path=ppt/notesSlides/notesSlide57.xml><?xml version="1.0" encoding="utf-8"?>
+<p:notes xmlns:a="http://schemas.openxmlformats.org/drawingml/2006/main" xmlns:r="http://schemas.openxmlformats.org/officeDocument/2006/relationships" xmlns:p="http://schemas.openxmlformats.org/presentationml/2006/main">
+  <p:cSld>
+    <p:spTree>
+      <p:nvGrpSpPr>
+        <p:cNvPr id="1" name=""/>
+        <p:cNvGrpSpPr/>
+        <p:nvPr/>
+      </p:nvGrpSpPr>
+      <p:grpSpPr>
+        <a:xfrm>
+          <a:off x="0" y="0"/>
+          <a:ext cx="0" cy="0"/>
+          <a:chOff x="0" y="0"/>
+          <a:chExt cx="0" cy="0"/>
+        </a:xfrm>
+      </p:grpSpPr>
+      <p:sp>
+        <p:nvSpPr>
+          <p:cNvPr id="2" name="Slide Image Placeholder 1"/>
+          <p:cNvSpPr>
+            <a:spLocks noGrp="1" noRot="1" noChangeAspect="1"/>
+          </p:cNvSpPr>
+          <p:nvPr>
+            <p:ph type="sldImg"/>
+          </p:nvPr>
+        </p:nvSpPr>
+        <p:spPr/>
+      </p:sp>
+      <p:sp>
+        <p:nvSpPr>
+          <p:cNvPr id="3" name="Notes Placeholder 2"/>
+          <p:cNvSpPr>
+            <a:spLocks noGrp="1"/>
+          </p:cNvSpPr>
+          <p:nvPr>
+            <p:ph type="body" idx="1"/>
+          </p:nvPr>
+        </p:nvSpPr>
+        <p:spPr/>
+        <p:txBody>
+          <a:bodyPr/>
+          <a:lstStyle/>
+          <a:p>
+            <a:r>
+              <a:rPr lang="en-US" dirty="0"/>
+              <a:t>Mobbing is an amplifier</a:t>
+            </a:r>
+          </a:p>
+          <a:p>
+            <a:r>
+              <a:rPr lang="en-US" dirty="0"/>
+              <a:t>It amplifies good things, but beware of amplification the bad things too</a:t>
+            </a:r>
+          </a:p>
+          <a:p>
+            <a:endParaRPr lang="en-US" dirty="0"/>
+          </a:p>
+          <a:p>
+            <a:r>
+              <a:rPr lang="en-US" dirty="0"/>
+              <a:t>Mobbing is a tool you can use at the right time and in the right place</a:t>
+            </a:r>
+            <a:br>
+              <a:rPr lang="en-US" dirty="0"/>
+            </a:br>
+            <a:br>
+              <a:rPr lang="en-US" dirty="0"/>
+            </a:br>
+            <a:r>
+              <a:rPr lang="en-US" dirty="0"/>
+              <a:t>Each mob, mobs differently. And that’s a good thing. Find what works for you and keep experimenting.</a:t>
+            </a:r>
+          </a:p>
+        </p:txBody>
+      </p:sp>
+      <p:sp>
+        <p:nvSpPr>
+          <p:cNvPr id="4" name="Slide Number Placeholder 3"/>
+          <p:cNvSpPr>
+            <a:spLocks noGrp="1"/>
+          </p:cNvSpPr>
+          <p:nvPr>
+            <p:ph type="sldNum" sz="quarter" idx="5"/>
+          </p:nvPr>
+        </p:nvSpPr>
+        <p:spPr/>
+        <p:txBody>
+          <a:bodyPr/>
+          <a:lstStyle/>
+          <a:p>
+            <a:fld id="{B99E8012-7AEC-4AAD-B52C-DF7E1601EEFE}" type="slidenum">
+              <a:rPr lang="en-GB" smtClean="0"/>
+              <a:t>57</a:t>
+            </a:fld>
+            <a:endParaRPr lang="en-GB"/>
+          </a:p>
+        </p:txBody>
+      </p:sp>
+    </p:spTree>
+    <p:extLst>
+      <p:ext uri="{BB962C8B-B14F-4D97-AF65-F5344CB8AC3E}">
+        <p14:creationId xmlns:p14="http://schemas.microsoft.com/office/powerpoint/2010/main" val="4167207322"/>
+      </p:ext>
+    </p:extLst>
+  </p:cSld>
+  <p:clrMapOvr>
+    <a:masterClrMapping/>
+  </p:clrMapOvr>
+</p:notes>
+</file>
+
+<file path=ppt/notesSlides/notesSlide58.xml><?xml version="1.0" encoding="utf-8"?>
+<p:notes xmlns:a="http://schemas.openxmlformats.org/drawingml/2006/main" xmlns:r="http://schemas.openxmlformats.org/officeDocument/2006/relationships" xmlns:p="http://schemas.openxmlformats.org/presentationml/2006/main">
+  <p:cSld>
+    <p:spTree>
+      <p:nvGrpSpPr>
+        <p:cNvPr id="1" name=""/>
+        <p:cNvGrpSpPr/>
+        <p:nvPr/>
+      </p:nvGrpSpPr>
+      <p:grpSpPr>
+        <a:xfrm>
+          <a:off x="0" y="0"/>
+          <a:ext cx="0" cy="0"/>
+          <a:chOff x="0" y="0"/>
+          <a:chExt cx="0" cy="0"/>
+        </a:xfrm>
+      </p:grpSpPr>
+      <p:sp>
+        <p:nvSpPr>
+          <p:cNvPr id="2" name="Slide Image Placeholder 1"/>
+          <p:cNvSpPr>
+            <a:spLocks noGrp="1" noRot="1" noChangeAspect="1"/>
+          </p:cNvSpPr>
+          <p:nvPr>
+            <p:ph type="sldImg"/>
+          </p:nvPr>
+        </p:nvSpPr>
+        <p:spPr/>
+      </p:sp>
+      <p:sp>
+        <p:nvSpPr>
+          <p:cNvPr id="3" name="Notes Placeholder 2"/>
+          <p:cNvSpPr>
+            <a:spLocks noGrp="1"/>
+          </p:cNvSpPr>
+          <p:nvPr>
+            <p:ph type="body" idx="1"/>
+          </p:nvPr>
+        </p:nvSpPr>
+        <p:spPr/>
+        <p:txBody>
+          <a:bodyPr/>
+          <a:lstStyle/>
+          <a:p>
+            <a:r>
+              <a:rPr lang="en-US" dirty="0"/>
+              <a:t>So maybe you’ve not mobbed before but you’d like to have a go?</a:t>
+            </a:r>
+            <a:br>
+              <a:rPr lang="en-US" dirty="0"/>
+            </a:br>
+            <a:endParaRPr lang="en-US" dirty="0"/>
+          </a:p>
+          <a:p>
+            <a:r>
+              <a:rPr lang="en-US" dirty="0"/>
+              <a:t>First off you’ll need to pick a topic. Maybe you could...</a:t>
+            </a:r>
+          </a:p>
+          <a:p>
+            <a:r>
+              <a:rPr lang="en-US" dirty="0"/>
+              <a:t>Do a kata, to have fun and learn together</a:t>
+            </a:r>
+          </a:p>
+          <a:p>
+            <a:r>
+              <a:rPr lang="en-US" dirty="0"/>
+              <a:t>Or maybe there’s some legacy code that people are scared to touch on their own</a:t>
+            </a:r>
+          </a:p>
+          <a:p>
+            <a:r>
+              <a:rPr lang="en-US" dirty="0"/>
+              <a:t>Or maybe there’s a new technology the team needs to get up to speed with</a:t>
+            </a:r>
+          </a:p>
+          <a:p>
+            <a:br>
+              <a:rPr lang="en-US" dirty="0"/>
+            </a:br>
+            <a:r>
+              <a:rPr lang="en-US" dirty="0"/>
+              <a:t>And then help the team by being a facilitator</a:t>
+            </a:r>
+            <a:br>
+              <a:rPr lang="en-US" dirty="0"/>
+            </a:br>
+            <a:r>
+              <a:rPr lang="en-US" dirty="0"/>
+              <a:t>That could involve finding a nice place with a big screen for them to use</a:t>
+            </a:r>
+            <a:br>
+              <a:rPr lang="en-US" dirty="0"/>
+            </a:br>
+            <a:r>
+              <a:rPr lang="en-US" dirty="0"/>
+              <a:t>Encouraging them to take regular breaks and have a retrospective</a:t>
+            </a:r>
+          </a:p>
+        </p:txBody>
+      </p:sp>
+      <p:sp>
+        <p:nvSpPr>
+          <p:cNvPr id="4" name="Slide Number Placeholder 3"/>
+          <p:cNvSpPr>
+            <a:spLocks noGrp="1"/>
+          </p:cNvSpPr>
+          <p:nvPr>
+            <p:ph type="sldNum" sz="quarter" idx="5"/>
+          </p:nvPr>
+        </p:nvSpPr>
+        <p:spPr/>
+        <p:txBody>
+          <a:bodyPr/>
+          <a:lstStyle/>
+          <a:p>
+            <a:fld id="{B99E8012-7AEC-4AAD-B52C-DF7E1601EEFE}" type="slidenum">
+              <a:rPr lang="en-GB" smtClean="0"/>
+              <a:t>58</a:t>
+            </a:fld>
+            <a:endParaRPr lang="en-GB"/>
+          </a:p>
+        </p:txBody>
+      </p:sp>
+    </p:spTree>
+    <p:extLst>
+      <p:ext uri="{BB962C8B-B14F-4D97-AF65-F5344CB8AC3E}">
+        <p14:creationId xmlns:p14="http://schemas.microsoft.com/office/powerpoint/2010/main" val="3999229775"/>
+      </p:ext>
+    </p:extLst>
+  </p:cSld>
+  <p:clrMapOvr>
+    <a:masterClrMapping/>
+  </p:clrMapOvr>
+</p:notes>
+</file>
+
+<file path=ppt/notesSlides/notesSlide59.xml><?xml version="1.0" encoding="utf-8"?>
+<p:notes xmlns:a="http://schemas.openxmlformats.org/drawingml/2006/main" xmlns:r="http://schemas.openxmlformats.org/officeDocument/2006/relationships" xmlns:p="http://schemas.openxmlformats.org/presentationml/2006/main">
+  <p:cSld>
+    <p:spTree>
+      <p:nvGrpSpPr>
+        <p:cNvPr id="1" name=""/>
+        <p:cNvGrpSpPr/>
+        <p:nvPr/>
+      </p:nvGrpSpPr>
+      <p:grpSpPr>
+        <a:xfrm>
+          <a:off x="0" y="0"/>
+          <a:ext cx="0" cy="0"/>
+          <a:chOff x="0" y="0"/>
+          <a:chExt cx="0" cy="0"/>
+        </a:xfrm>
+      </p:grpSpPr>
+      <p:sp>
+        <p:nvSpPr>
+          <p:cNvPr id="2" name="Slide Image Placeholder 1"/>
+          <p:cNvSpPr>
+            <a:spLocks noGrp="1" noRot="1" noChangeAspect="1"/>
+          </p:cNvSpPr>
+          <p:nvPr>
+            <p:ph type="sldImg"/>
+          </p:nvPr>
+        </p:nvSpPr>
+        <p:spPr/>
+      </p:sp>
+      <p:sp>
+        <p:nvSpPr>
+          <p:cNvPr id="3" name="Notes Placeholder 2"/>
+          <p:cNvSpPr>
+            <a:spLocks noGrp="1"/>
+          </p:cNvSpPr>
+          <p:nvPr>
+            <p:ph type="body" idx="1"/>
+          </p:nvPr>
+        </p:nvSpPr>
+        <p:spPr/>
+        <p:txBody>
+          <a:bodyPr/>
+          <a:lstStyle/>
+          <a:p>
+            <a:r>
+              <a:rPr lang="en-US" dirty="0"/>
+              <a:t>And here are some links that you may find useful.</a:t>
+            </a:r>
+          </a:p>
+          <a:p>
+            <a:r>
+              <a:rPr lang="en-US" dirty="0"/>
+              <a:t>I’ll be tweeting these slides out on the Agile Cambridge hashtag on twitter shortly</a:t>
+            </a:r>
+          </a:p>
+          <a:p>
+            <a:endParaRPr lang="en-US" dirty="0"/>
+          </a:p>
+          <a:p>
+            <a:r>
+              <a:rPr lang="en-US" dirty="0"/>
+              <a:t>Any questions?</a:t>
+            </a:r>
+          </a:p>
+          <a:p>
+            <a:endParaRPr lang="en-US" dirty="0"/>
+          </a:p>
+          <a:p>
+            <a:r>
+              <a:rPr lang="en-US"/>
+              <a:t>Thank you</a:t>
+            </a:r>
+            <a:endParaRPr lang="en-US" dirty="0"/>
+          </a:p>
+        </p:txBody>
+      </p:sp>
+      <p:sp>
+        <p:nvSpPr>
+          <p:cNvPr id="4" name="Slide Number Placeholder 3"/>
+          <p:cNvSpPr>
+            <a:spLocks noGrp="1"/>
+          </p:cNvSpPr>
+          <p:nvPr>
+            <p:ph type="sldNum" sz="quarter" idx="5"/>
+          </p:nvPr>
+        </p:nvSpPr>
+        <p:spPr/>
+        <p:txBody>
+          <a:bodyPr/>
+          <a:lstStyle/>
+          <a:p>
+            <a:fld id="{B99E8012-7AEC-4AAD-B52C-DF7E1601EEFE}" type="slidenum">
+              <a:rPr lang="en-GB" smtClean="0"/>
+              <a:t>59</a:t>
+            </a:fld>
+            <a:endParaRPr lang="en-GB"/>
+          </a:p>
+        </p:txBody>
+      </p:sp>
+    </p:spTree>
+    <p:extLst>
+      <p:ext uri="{BB962C8B-B14F-4D97-AF65-F5344CB8AC3E}">
+        <p14:creationId xmlns:p14="http://schemas.microsoft.com/office/powerpoint/2010/main" val="3276869117"/>
       </p:ext>
     </p:extLst>
   </p:cSld>
@@ -21476,6 +22364,17 @@
               <a:rPr lang="en-GB" sz="8800" dirty="0"/>
               <a:t>Community 🌍</a:t>
             </a:r>
+            <a:br>
+              <a:rPr lang="en-GB" sz="8800" dirty="0"/>
+            </a:br>
+            <a:r>
+              <a:rPr lang="en-GB" sz="6600" dirty="0"/>
+              <a:t>#</a:t>
+            </a:r>
+            <a:r>
+              <a:rPr lang="en-GB" sz="6600" dirty="0" err="1"/>
+              <a:t>mobprogramming</a:t>
+            </a:r>
             <a:endParaRPr lang="en-GB" dirty="0"/>
           </a:p>
         </p:txBody>
@@ -22003,7 +22902,7 @@
         </p:nvSpPr>
         <p:spPr>
           <a:xfrm>
-            <a:off x="1678346" y="3176198"/>
+            <a:off x="1678345" y="1071626"/>
             <a:ext cx="8835309" cy="505604"/>
           </a:xfrm>
         </p:spPr>
@@ -22046,6 +22945,108 @@
               <a:t>@owennell</a:t>
             </a:r>
             <a:endParaRPr lang="en-US" dirty="0"/>
+          </a:p>
+        </p:txBody>
+      </p:sp>
+      <p:sp>
+        <p:nvSpPr>
+          <p:cNvPr id="4" name="Title 1">
+            <a:extLst>
+              <a:ext uri="{FF2B5EF4-FFF2-40B4-BE49-F238E27FC236}">
+                <a16:creationId xmlns:a16="http://schemas.microsoft.com/office/drawing/2014/main" id="{8EB3386E-86FD-424C-BEBD-7DAF32E94067}"/>
+              </a:ext>
+            </a:extLst>
+          </p:cNvPr>
+          <p:cNvSpPr txBox="1">
+            <a:spLocks/>
+          </p:cNvSpPr>
+          <p:nvPr/>
+        </p:nvSpPr>
+        <p:spPr>
+          <a:xfrm>
+            <a:off x="1676169" y="2969116"/>
+            <a:ext cx="8835309" cy="505604"/>
+          </a:xfrm>
+          <a:prstGeom prst="rect">
+            <a:avLst/>
+          </a:prstGeom>
+        </p:spPr>
+        <p:txBody>
+          <a:bodyPr vert="horz" lIns="0" tIns="38963" rIns="77925" bIns="38963" rtlCol="0" anchor="ctr">
+            <a:noAutofit/>
+          </a:bodyPr>
+          <a:lstStyle>
+            <a:lvl1pPr algn="l" defTabSz="389626" rtl="0" eaLnBrk="1" latinLnBrk="0" hangingPunct="1">
+              <a:spcBef>
+                <a:spcPct val="0"/>
+              </a:spcBef>
+              <a:buNone/>
+              <a:defRPr sz="4200" b="0" i="0" kern="1200" baseline="0">
+                <a:solidFill>
+                  <a:schemeClr val="bg1"/>
+                </a:solidFill>
+                <a:latin typeface="+mn-lt"/>
+                <a:ea typeface="Arial" charset="0"/>
+                <a:cs typeface="Arial" charset="0"/>
+              </a:defRPr>
+            </a:lvl1pPr>
+          </a:lstStyle>
+          <a:p>
+            <a:r>
+              <a:rPr lang="en-GB" sz="6600" dirty="0"/>
+              <a:t> Pick a Topic</a:t>
+            </a:r>
+          </a:p>
+        </p:txBody>
+      </p:sp>
+      <p:sp>
+        <p:nvSpPr>
+          <p:cNvPr id="7" name="Title 1">
+            <a:extLst>
+              <a:ext uri="{FF2B5EF4-FFF2-40B4-BE49-F238E27FC236}">
+                <a16:creationId xmlns:a16="http://schemas.microsoft.com/office/drawing/2014/main" id="{5048D400-335B-EB42-B632-E1960255037B}"/>
+              </a:ext>
+            </a:extLst>
+          </p:cNvPr>
+          <p:cNvSpPr txBox="1">
+            <a:spLocks/>
+          </p:cNvSpPr>
+          <p:nvPr/>
+        </p:nvSpPr>
+        <p:spPr>
+          <a:xfrm>
+            <a:off x="1676166" y="4040807"/>
+            <a:ext cx="8835309" cy="505604"/>
+          </a:xfrm>
+          <a:prstGeom prst="rect">
+            <a:avLst/>
+          </a:prstGeom>
+        </p:spPr>
+        <p:txBody>
+          <a:bodyPr vert="horz" lIns="0" tIns="38963" rIns="77925" bIns="38963" rtlCol="0" anchor="ctr">
+            <a:noAutofit/>
+          </a:bodyPr>
+          <a:lstStyle>
+            <a:lvl1pPr algn="l" defTabSz="389626" rtl="0" eaLnBrk="1" latinLnBrk="0" hangingPunct="1">
+              <a:spcBef>
+                <a:spcPct val="0"/>
+              </a:spcBef>
+              <a:buNone/>
+              <a:defRPr sz="4200" b="0" i="0" kern="1200" baseline="0">
+                <a:solidFill>
+                  <a:schemeClr val="bg1"/>
+                </a:solidFill>
+                <a:latin typeface="+mn-lt"/>
+                <a:ea typeface="Arial" charset="0"/>
+                <a:cs typeface="Arial" charset="0"/>
+              </a:defRPr>
+            </a:lvl1pPr>
+          </a:lstStyle>
+          <a:p>
+            <a:r>
+              <a:rPr lang="en-GB" sz="6600" dirty="0"/>
+              <a:t> Facilitate</a:t>
+            </a:r>
           </a:p>
         </p:txBody>
       </p:sp>
@@ -22059,6 +23060,176 @@
   <p:clrMapOvr>
     <a:masterClrMapping/>
   </p:clrMapOvr>
+  <p:timing>
+    <p:tnLst>
+      <p:par>
+        <p:cTn id="1" dur="indefinite" restart="never" nodeType="tmRoot">
+          <p:childTnLst>
+            <p:seq concurrent="1" nextAc="seek">
+              <p:cTn id="2" dur="indefinite" nodeType="mainSeq">
+                <p:childTnLst>
+                  <p:par>
+                    <p:cTn id="3" fill="hold">
+                      <p:stCondLst>
+                        <p:cond delay="indefinite"/>
+                      </p:stCondLst>
+                      <p:childTnLst>
+                        <p:par>
+                          <p:cTn id="4" fill="hold">
+                            <p:stCondLst>
+                              <p:cond delay="0"/>
+                            </p:stCondLst>
+                            <p:childTnLst>
+                              <p:par>
+                                <p:cTn id="5" presetID="1" presetClass="entr" presetSubtype="0" fill="hold" grpId="0" nodeType="clickEffect">
+                                  <p:stCondLst>
+                                    <p:cond delay="0"/>
+                                  </p:stCondLst>
+                                  <p:childTnLst>
+                                    <p:set>
+                                      <p:cBhvr>
+                                        <p:cTn id="6" dur="1" fill="hold">
+                                          <p:stCondLst>
+                                            <p:cond delay="0"/>
+                                          </p:stCondLst>
+                                        </p:cTn>
+                                        <p:tgtEl>
+                                          <p:spTgt spid="4"/>
+                                        </p:tgtEl>
+                                        <p:attrNameLst>
+                                          <p:attrName>style.visibility</p:attrName>
+                                        </p:attrNameLst>
+                                      </p:cBhvr>
+                                      <p:to>
+                                        <p:strVal val="visible"/>
+                                      </p:to>
+                                    </p:set>
+                                  </p:childTnLst>
+                                </p:cTn>
+                              </p:par>
+                            </p:childTnLst>
+                          </p:cTn>
+                        </p:par>
+                      </p:childTnLst>
+                    </p:cTn>
+                  </p:par>
+                  <p:par>
+                    <p:cTn id="7" fill="hold">
+                      <p:stCondLst>
+                        <p:cond delay="indefinite"/>
+                      </p:stCondLst>
+                      <p:childTnLst>
+                        <p:par>
+                          <p:cTn id="8" fill="hold">
+                            <p:stCondLst>
+                              <p:cond delay="0"/>
+                            </p:stCondLst>
+                            <p:childTnLst>
+                              <p:par>
+                                <p:cTn id="9" presetID="1" presetClass="entr" presetSubtype="0" fill="hold" grpId="0" nodeType="clickEffect">
+                                  <p:stCondLst>
+                                    <p:cond delay="0"/>
+                                  </p:stCondLst>
+                                  <p:childTnLst>
+                                    <p:set>
+                                      <p:cBhvr>
+                                        <p:cTn id="10" dur="1" fill="hold">
+                                          <p:stCondLst>
+                                            <p:cond delay="0"/>
+                                          </p:stCondLst>
+                                        </p:cTn>
+                                        <p:tgtEl>
+                                          <p:spTgt spid="7"/>
+                                        </p:tgtEl>
+                                        <p:attrNameLst>
+                                          <p:attrName>style.visibility</p:attrName>
+                                        </p:attrNameLst>
+                                      </p:cBhvr>
+                                      <p:to>
+                                        <p:strVal val="visible"/>
+                                      </p:to>
+                                    </p:set>
+                                  </p:childTnLst>
+                                </p:cTn>
+                              </p:par>
+                            </p:childTnLst>
+                          </p:cTn>
+                        </p:par>
+                      </p:childTnLst>
+                    </p:cTn>
+                  </p:par>
+                  <p:par>
+                    <p:cTn id="11" fill="hold">
+                      <p:stCondLst>
+                        <p:cond delay="indefinite"/>
+                      </p:stCondLst>
+                      <p:childTnLst>
+                        <p:par>
+                          <p:cTn id="12" fill="hold">
+                            <p:stCondLst>
+                              <p:cond delay="0"/>
+                            </p:stCondLst>
+                            <p:childTnLst>
+                              <p:par>
+                                <p:cTn id="13" presetID="1" presetClass="entr" presetSubtype="0" fill="hold" grpId="1" nodeType="clickEffect">
+                                  <p:stCondLst>
+                                    <p:cond delay="0"/>
+                                  </p:stCondLst>
+                                  <p:childTnLst>
+                                    <p:set>
+                                      <p:cBhvr>
+                                        <p:cTn id="14" dur="1" fill="hold">
+                                          <p:stCondLst>
+                                            <p:cond delay="0"/>
+                                          </p:stCondLst>
+                                        </p:cTn>
+                                        <p:tgtEl>
+                                          <p:spTgt spid="4"/>
+                                        </p:tgtEl>
+                                        <p:attrNameLst>
+                                          <p:attrName>style.visibility</p:attrName>
+                                        </p:attrNameLst>
+                                      </p:cBhvr>
+                                      <p:to>
+                                        <p:strVal val="visible"/>
+                                      </p:to>
+                                    </p:set>
+                                  </p:childTnLst>
+                                </p:cTn>
+                              </p:par>
+                            </p:childTnLst>
+                          </p:cTn>
+                        </p:par>
+                      </p:childTnLst>
+                    </p:cTn>
+                  </p:par>
+                </p:childTnLst>
+              </p:cTn>
+              <p:prevCondLst>
+                <p:cond evt="onPrev" delay="0">
+                  <p:tgtEl>
+                    <p:sldTgt/>
+                  </p:tgtEl>
+                </p:cond>
+              </p:prevCondLst>
+              <p:nextCondLst>
+                <p:cond evt="onNext" delay="0">
+                  <p:tgtEl>
+                    <p:sldTgt/>
+                  </p:tgtEl>
+                </p:cond>
+              </p:nextCondLst>
+            </p:seq>
+          </p:childTnLst>
+        </p:cTn>
+      </p:par>
+    </p:tnLst>
+    <p:bldLst>
+      <p:bldP spid="4" grpId="0"/>
+      <p:bldP spid="4" grpId="1"/>
+      <p:bldP spid="7" grpId="0"/>
+    </p:bldLst>
+  </p:timing>
 </p:sld>
 </file>
 
@@ -22101,7 +23272,7 @@
           <a:p>
             <a:r>
               <a:rPr lang="en-GB" sz="3200" dirty="0">
-                <a:hlinkClick r:id="rId2"/>
+                <a:hlinkClick r:id="rId3"/>
               </a:rPr>
               <a:t>Mob Programming book</a:t>
             </a:r>
@@ -22139,7 +23310,7 @@
             </a:br>
             <a:r>
               <a:rPr lang="en-GB" sz="3200" dirty="0">
-                <a:hlinkClick r:id="rId3"/>
+                <a:hlinkClick r:id="rId4"/>
               </a:rPr>
               <a:t>remotemobprogramming.org</a:t>
             </a:r>
@@ -22151,7 +23322,7 @@
             </a:br>
             <a:r>
               <a:rPr lang="en-GB" sz="3200" dirty="0">
-                <a:hlinkClick r:id="rId4"/>
+                <a:hlinkClick r:id="rId5"/>
               </a:rPr>
               <a:t>Mob Mentality Show</a:t>
             </a:r>

</xml_diff>

<commit_message>
Final slides and pdf version. Probably.
</commit_message>
<xml_diff>
--- a/a-mob-mentality.pptx
+++ b/a-mob-mentality.pptx
@@ -68,7 +68,7 @@
     <p:sldId id="377" r:id="rId59"/>
     <p:sldId id="371" r:id="rId60"/>
     <p:sldId id="374" r:id="rId61"/>
-    <p:sldId id="375" r:id="rId62"/>
+    <p:sldId id="378" r:id="rId62"/>
   </p:sldIdLst>
   <p:sldSz cx="12192000" cy="6858000"/>
   <p:notesSz cx="6858000" cy="9144000"/>
@@ -271,7 +271,7 @@
           <a:p>
             <a:fld id="{7BBE8AEC-3485-8F42-8DAA-65AC687FA28D}" type="datetimeFigureOut">
               <a:rPr lang="en-US" smtClean="0"/>
-              <a:t>9/29/19</a:t>
+              <a:t>9/30/19</a:t>
             </a:fld>
             <a:endParaRPr lang="en-US"/>
           </a:p>
@@ -436,7 +436,7 @@
           <a:p>
             <a:fld id="{F8C37668-4783-4882-B2E6-3A4D0BC25785}" type="datetimeFigureOut">
               <a:rPr lang="en-GB" smtClean="0"/>
-              <a:t>29/09/2019</a:t>
+              <a:t>30/09/2019</a:t>
             </a:fld>
             <a:endParaRPr lang="en-GB"/>
           </a:p>
@@ -1417,6 +1417,15 @@
               <a:t>There may or may not be actual unicorns.</a:t>
             </a:r>
           </a:p>
+          <a:p>
+            <a:endParaRPr lang="en-US" dirty="0"/>
+          </a:p>
+          <a:p>
+            <a:r>
+              <a:rPr lang="en-US" dirty="0"/>
+              <a:t>Unicorn programming</a:t>
+            </a:r>
+          </a:p>
         </p:txBody>
       </p:sp>
       <p:sp>
@@ -6560,11 +6569,7 @@
           <a:p>
             <a:r>
               <a:rPr lang="en-US" dirty="0"/>
-              <a:t>But what’s going to </a:t>
-            </a:r>
-            <a:r>
-              <a:rPr lang="en-US"/>
-              <a:t>happen next?</a:t>
+              <a:t>But what’s going to happen next?</a:t>
             </a:r>
           </a:p>
         </p:txBody>
@@ -6943,7 +6948,7 @@
     </p:spTree>
     <p:extLst>
       <p:ext uri="{BB962C8B-B14F-4D97-AF65-F5344CB8AC3E}">
-        <p14:creationId xmlns:p14="http://schemas.microsoft.com/office/powerpoint/2010/main" val="3276869117"/>
+        <p14:creationId xmlns:p14="http://schemas.microsoft.com/office/powerpoint/2010/main" val="3685417224"/>
       </p:ext>
     </p:extLst>
   </p:cSld>
@@ -22509,7 +22514,7 @@
           <a:p>
             <a:r>
               <a:rPr lang="en-GB" sz="7200" dirty="0"/>
-              <a:t>Experiment 🔬</a:t>
+              <a:t>Experiment 🔬🔦</a:t>
             </a:r>
             <a:endParaRPr lang="en-GB" dirty="0"/>
           </a:p>
@@ -23257,8 +23262,8 @@
         </p:nvSpPr>
         <p:spPr>
           <a:xfrm>
-            <a:off x="1678345" y="3964580"/>
-            <a:ext cx="8835309" cy="505604"/>
+            <a:off x="1678345" y="2018365"/>
+            <a:ext cx="8835309" cy="3930539"/>
           </a:xfrm>
         </p:spPr>
         <p:txBody>
@@ -23266,81 +23271,90 @@
           <a:lstStyle/>
           <a:p>
             <a:r>
-              <a:rPr lang="en-GB" sz="3200" dirty="0">
+              <a:rPr lang="en-GB" sz="2400" dirty="0"/>
+              <a:t>#</a:t>
+            </a:r>
+            <a:r>
+              <a:rPr lang="en-GB" sz="2400" dirty="0" err="1"/>
+              <a:t>MobProgramming</a:t>
+            </a:r>
+            <a:r>
+              <a:rPr lang="en-GB" sz="2400" dirty="0"/>
+              <a:t> on Twitter</a:t>
+            </a:r>
+            <a:br>
+              <a:rPr lang="en-GB" sz="2400" dirty="0"/>
+            </a:br>
+            <a:br>
+              <a:rPr lang="en-GB" sz="2400" dirty="0"/>
+            </a:br>
+            <a:r>
+              <a:rPr lang="en-GB" sz="2400" dirty="0"/>
+              <a:t>The Mob Programming book</a:t>
+            </a:r>
+            <a:br>
+              <a:rPr lang="en-GB" sz="2400" dirty="0"/>
+            </a:br>
+            <a:r>
+              <a:rPr lang="en-GB" sz="2400" dirty="0">
                 <a:hlinkClick r:id="rId3"/>
               </a:rPr>
-              <a:t>Mob Programming book</a:t>
-            </a:r>
-            <a:r>
-              <a:rPr lang="en-GB" sz="3200" dirty="0"/>
-              <a:t> on </a:t>
-            </a:r>
-            <a:r>
-              <a:rPr lang="en-GB" sz="3200" dirty="0" err="1"/>
-              <a:t>Leanpub</a:t>
+              <a:t>https://leanpub.com/mobprogramming</a:t>
             </a:r>
             <a:br>
-              <a:rPr lang="en-GB" sz="3200" dirty="0"/>
+              <a:rPr lang="en-GB" sz="2400" dirty="0"/>
             </a:br>
             <a:br>
-              <a:rPr lang="en-GB" sz="3200" dirty="0"/>
+              <a:rPr lang="en-GB" sz="2400" dirty="0"/>
             </a:br>
             <a:r>
-              <a:rPr lang="en-GB" sz="3200" dirty="0"/>
-              <a:t>#</a:t>
-            </a:r>
-            <a:r>
-              <a:rPr lang="en-GB" sz="3200" dirty="0" err="1"/>
-              <a:t>mobprogramming</a:t>
-            </a:r>
-            <a:r>
-              <a:rPr lang="en-GB" sz="3200" dirty="0"/>
-              <a:t> on Twitter</a:t>
+              <a:rPr lang="en-GB" sz="2400" dirty="0"/>
+              <a:t>How one team mobs remotely</a:t>
             </a:r>
             <a:br>
-              <a:rPr lang="en-GB" sz="3200" dirty="0"/>
+              <a:rPr lang="en-GB" sz="2400" dirty="0"/>
             </a:br>
-            <a:br>
-              <a:rPr lang="en-GB" sz="3200" dirty="0"/>
-            </a:br>
-            <a:r>
-              <a:rPr lang="en-GB" sz="3200" dirty="0">
+            <a:r>
+              <a:rPr lang="en-GB" sz="2400" dirty="0">
                 <a:hlinkClick r:id="rId4"/>
               </a:rPr>
               <a:t>remotemobprogramming.org</a:t>
             </a:r>
             <a:br>
-              <a:rPr lang="en-GB" sz="3200" dirty="0"/>
+              <a:rPr lang="en-GB" sz="2400" dirty="0"/>
             </a:br>
             <a:br>
-              <a:rPr lang="en-GB" sz="3200" dirty="0"/>
+              <a:rPr lang="en-GB" sz="2400" dirty="0"/>
             </a:br>
             <a:r>
-              <a:rPr lang="en-GB" sz="3200" dirty="0">
+              <a:rPr lang="en-GB" sz="2400" dirty="0"/>
+              <a:t>Mob Mentality Show</a:t>
+            </a:r>
+            <a:br>
+              <a:rPr lang="en-GB" sz="2400" dirty="0"/>
+            </a:br>
+            <a:r>
+              <a:rPr lang="en-GB" sz="2400" dirty="0">
                 <a:hlinkClick r:id="rId5"/>
               </a:rPr>
-              <a:t>Mob Mentality Show</a:t>
-            </a:r>
-            <a:r>
-              <a:rPr lang="en-GB" sz="3200" dirty="0"/>
-              <a:t> on YouTube</a:t>
+              <a:t>https://www.youtube.com/channel/UCgt1lVMrdwlZKBaerxxp2iQ</a:t>
             </a:r>
             <a:br>
-              <a:rPr lang="en-GB" sz="3200" dirty="0"/>
+              <a:rPr lang="en-GB" sz="2400" dirty="0"/>
             </a:br>
             <a:r>
-              <a:rPr lang="en-GB" sz="1800" i="1" dirty="0"/>
+              <a:rPr lang="en-GB" sz="2400" i="1" dirty="0"/>
               <a:t>(I wasn't involved, the name is a coincidence! </a:t>
             </a:r>
             <a:r>
-              <a:rPr lang="en-GB" sz="1800" dirty="0"/>
+              <a:rPr lang="en-GB" sz="2400" dirty="0"/>
               <a:t>😆</a:t>
             </a:r>
             <a:r>
-              <a:rPr lang="en-GB" sz="1800" i="1" dirty="0"/>
+              <a:rPr lang="en-GB" sz="2400" i="1" dirty="0"/>
               <a:t>)</a:t>
             </a:r>
-            <a:endParaRPr lang="en-GB" sz="3200" i="1" dirty="0"/>
+            <a:endParaRPr lang="en-GB" sz="2400" dirty="0"/>
           </a:p>
         </p:txBody>
       </p:sp>
@@ -23426,10 +23440,58 @@
           </a:p>
         </p:txBody>
       </p:sp>
+      <p:sp>
+        <p:nvSpPr>
+          <p:cNvPr id="7" name="Title 1">
+            <a:extLst>
+              <a:ext uri="{FF2B5EF4-FFF2-40B4-BE49-F238E27FC236}">
+                <a16:creationId xmlns:a16="http://schemas.microsoft.com/office/drawing/2014/main" id="{C5939747-9639-3C44-8A12-672D73997D26}"/>
+              </a:ext>
+            </a:extLst>
+          </p:cNvPr>
+          <p:cNvSpPr txBox="1">
+            <a:spLocks/>
+          </p:cNvSpPr>
+          <p:nvPr/>
+        </p:nvSpPr>
+        <p:spPr>
+          <a:xfrm>
+            <a:off x="1678345" y="1993188"/>
+            <a:ext cx="8835309" cy="505604"/>
+          </a:xfrm>
+          <a:prstGeom prst="rect">
+            <a:avLst/>
+          </a:prstGeom>
+        </p:spPr>
+        <p:txBody>
+          <a:bodyPr vert="horz" lIns="0" tIns="38963" rIns="77925" bIns="38963" rtlCol="0" anchor="ctr">
+            <a:noAutofit/>
+          </a:bodyPr>
+          <a:lstStyle>
+            <a:lvl1pPr algn="l" defTabSz="389626" rtl="0" eaLnBrk="1" latinLnBrk="0" hangingPunct="1">
+              <a:spcBef>
+                <a:spcPct val="0"/>
+              </a:spcBef>
+              <a:buNone/>
+              <a:defRPr sz="4200" b="0" i="0" kern="1200" baseline="0">
+                <a:solidFill>
+                  <a:schemeClr val="bg1"/>
+                </a:solidFill>
+                <a:latin typeface="+mn-lt"/>
+                <a:ea typeface="Arial" charset="0"/>
+                <a:cs typeface="Arial" charset="0"/>
+              </a:defRPr>
+            </a:lvl1pPr>
+          </a:lstStyle>
+          <a:p>
+            <a:endParaRPr lang="en-GB" sz="3200" i="1" dirty="0"/>
+          </a:p>
+        </p:txBody>
+      </p:sp>
     </p:spTree>
     <p:extLst>
       <p:ext uri="{BB962C8B-B14F-4D97-AF65-F5344CB8AC3E}">
-        <p14:creationId xmlns:p14="http://schemas.microsoft.com/office/powerpoint/2010/main" val="1180917442"/>
+        <p14:creationId xmlns:p14="http://schemas.microsoft.com/office/powerpoint/2010/main" val="3927669071"/>
       </p:ext>
     </p:extLst>
   </p:cSld>
@@ -24654,6 +24716,21 @@
 </file>
 
 <file path=customXml/item1.xml><?xml version="1.0" encoding="utf-8"?>
+<p:properties xmlns:p="http://schemas.microsoft.com/office/2006/metadata/properties" xmlns:xsi="http://www.w3.org/2001/XMLSchema-instance">
+  <documentManagement/>
+</p:properties>
+</file>
+
+<file path=customXml/item2.xml><?xml version="1.0" encoding="utf-8"?>
+<?mso-contentType ?>
+<FormTemplates xmlns="http://schemas.microsoft.com/sharepoint/v3/contenttype/forms">
+  <Display>DocumentLibraryForm</Display>
+  <Edit>DocumentLibraryForm</Edit>
+  <New>DocumentLibraryForm</New>
+</FormTemplates>
+</file>
+
+<file path=customXml/item3.xml><?xml version="1.0" encoding="utf-8"?>
 <ct:contentTypeSchema xmlns:ct="http://schemas.microsoft.com/office/2006/metadata/contentType" xmlns:ma="http://schemas.microsoft.com/office/2006/metadata/properties/metaAttributes" ct:_="" ma:_="" ma:contentTypeName="Document" ma:contentTypeID="0x0101005BEB3BB5FC069E4A8B1077D5FD23943C" ma:contentTypeVersion="2" ma:contentTypeDescription="Create a new document." ma:contentTypeScope="" ma:versionID="47ddf1554eeafa4d79d0318e64abc4a7">
   <xsd:schema xmlns:xsd="http://www.w3.org/2001/XMLSchema" xmlns:xs="http://www.w3.org/2001/XMLSchema" xmlns:p="http://schemas.microsoft.com/office/2006/metadata/properties" xmlns:ns2="d1b01c81-120a-4560-9817-a2c229f7d73c" targetNamespace="http://schemas.microsoft.com/office/2006/metadata/properties" ma:root="true" ma:fieldsID="1a8928d985599b3cc8311f2e57b9aa78" ns2:_="">
     <xsd:import namespace="d1b01c81-120a-4560-9817-a2c229f7d73c"/>
@@ -24801,22 +24878,23 @@
 </ct:contentTypeSchema>
 </file>
 
-<file path=customXml/item2.xml><?xml version="1.0" encoding="utf-8"?>
-<p:properties xmlns:p="http://schemas.microsoft.com/office/2006/metadata/properties" xmlns:xsi="http://www.w3.org/2001/XMLSchema-instance">
-  <documentManagement/>
-</p:properties>
+<file path=customXml/itemProps1.xml><?xml version="1.0" encoding="utf-8"?>
+<ds:datastoreItem xmlns:ds="http://schemas.openxmlformats.org/officeDocument/2006/customXml" ds:itemID="{28288C4A-FB4D-4A80-A265-5C3EA7C36918}">
+  <ds:schemaRefs>
+    <ds:schemaRef ds:uri="http://schemas.microsoft.com/office/2006/metadata/properties"/>
+  </ds:schemaRefs>
+</ds:datastoreItem>
 </file>
 
-<file path=customXml/item3.xml><?xml version="1.0" encoding="utf-8"?>
-<?mso-contentType ?>
-<FormTemplates xmlns="http://schemas.microsoft.com/sharepoint/v3/contenttype/forms">
-  <Display>DocumentLibraryForm</Display>
-  <Edit>DocumentLibraryForm</Edit>
-  <New>DocumentLibraryForm</New>
-</FormTemplates>
+<file path=customXml/itemProps2.xml><?xml version="1.0" encoding="utf-8"?>
+<ds:datastoreItem xmlns:ds="http://schemas.openxmlformats.org/officeDocument/2006/customXml" ds:itemID="{5B0221C8-8D1F-449C-9E02-3B69D2872205}">
+  <ds:schemaRefs>
+    <ds:schemaRef ds:uri="http://schemas.microsoft.com/sharepoint/v3/contenttype/forms"/>
+  </ds:schemaRefs>
+</ds:datastoreItem>
 </file>
 
-<file path=customXml/itemProps1.xml><?xml version="1.0" encoding="utf-8"?>
+<file path=customXml/itemProps3.xml><?xml version="1.0" encoding="utf-8"?>
 <ds:datastoreItem xmlns:ds="http://schemas.openxmlformats.org/officeDocument/2006/customXml" ds:itemID="{B9E90AD6-4848-4215-B912-DB92A776088F}">
   <ds:schemaRefs>
     <ds:schemaRef ds:uri="http://schemas.microsoft.com/office/2006/metadata/contentType"/>
@@ -24832,20 +24910,4 @@
     <ds:schemaRef ds:uri="http://schemas.microsoft.com/internal/obd"/>
   </ds:schemaRefs>
 </ds:datastoreItem>
-</file>
-
-<file path=customXml/itemProps2.xml><?xml version="1.0" encoding="utf-8"?>
-<ds:datastoreItem xmlns:ds="http://schemas.openxmlformats.org/officeDocument/2006/customXml" ds:itemID="{28288C4A-FB4D-4A80-A265-5C3EA7C36918}">
-  <ds:schemaRefs>
-    <ds:schemaRef ds:uri="http://schemas.microsoft.com/office/2006/metadata/properties"/>
-  </ds:schemaRefs>
-</ds:datastoreItem>
-</file>
-
-<file path=customXml/itemProps3.xml><?xml version="1.0" encoding="utf-8"?>
-<ds:datastoreItem xmlns:ds="http://schemas.openxmlformats.org/officeDocument/2006/customXml" ds:itemID="{5B0221C8-8D1F-449C-9E02-3B69D2872205}">
-  <ds:schemaRefs>
-    <ds:schemaRef ds:uri="http://schemas.microsoft.com/sharepoint/v3/contenttype/forms"/>
-  </ds:schemaRefs>
-</ds:datastoreItem>
 </file>
</xml_diff>